<commit_message>
Under Sampling and Over Sampling
</commit_message>
<xml_diff>
--- a/CS769 Presentation.pptx
+++ b/CS769 Presentation.pptx
@@ -14,28 +14,31 @@
     <p:sldId id="259" r:id="rId9"/>
     <p:sldId id="260" r:id="rId10"/>
     <p:sldId id="261" r:id="rId11"/>
+    <p:sldId id="262" r:id="rId12"/>
+    <p:sldId id="263" r:id="rId13"/>
+    <p:sldId id="264" r:id="rId14"/>
   </p:sldIdLst>
   <p:sldSz cy="5143500" cx="9144000"/>
   <p:notesSz cx="6858000" cy="9144000"/>
   <p:embeddedFontLst>
     <p:embeddedFont>
       <p:font typeface="Playfair Display"/>
-      <p:regular r:id="rId12"/>
-      <p:bold r:id="rId13"/>
-      <p:italic r:id="rId14"/>
-      <p:boldItalic r:id="rId15"/>
+      <p:regular r:id="rId15"/>
+      <p:bold r:id="rId16"/>
+      <p:italic r:id="rId17"/>
+      <p:boldItalic r:id="rId18"/>
     </p:embeddedFont>
     <p:embeddedFont>
       <p:font typeface="Montserrat"/>
-      <p:regular r:id="rId16"/>
-      <p:bold r:id="rId17"/>
-      <p:italic r:id="rId18"/>
-      <p:boldItalic r:id="rId19"/>
+      <p:regular r:id="rId19"/>
+      <p:bold r:id="rId20"/>
+      <p:italic r:id="rId21"/>
+      <p:boldItalic r:id="rId22"/>
     </p:embeddedFont>
     <p:embeddedFont>
       <p:font typeface="Oswald"/>
-      <p:regular r:id="rId20"/>
-      <p:bold r:id="rId21"/>
+      <p:regular r:id="rId23"/>
+      <p:bold r:id="rId24"/>
     </p:embeddedFont>
   </p:embeddedFontLst>
   <p:defaultTextStyle>
@@ -816,7 +819,7 @@
   <p:cSld>
     <p:spTree>
       <p:nvGrpSpPr>
-        <p:cNvPr id="60" name="Shape 60"/>
+        <p:cNvPr id="62" name="Shape 62"/>
         <p:cNvGrpSpPr/>
         <p:nvPr/>
       </p:nvGrpSpPr>
@@ -830,7 +833,7 @@
       </p:grpSpPr>
       <p:sp>
         <p:nvSpPr>
-          <p:cNvPr id="61" name="Google Shape;61;g126a86fd376_0_49:notes"/>
+          <p:cNvPr id="63" name="Google Shape;63;g126a86fd376_0_49:notes"/>
           <p:cNvSpPr/>
           <p:nvPr>
             <p:ph idx="2" type="sldImg"/>
@@ -865,7 +868,7 @@
       </p:sp>
       <p:sp>
         <p:nvSpPr>
-          <p:cNvPr id="62" name="Google Shape;62;g126a86fd376_0_49:notes"/>
+          <p:cNvPr id="64" name="Google Shape;64;g126a86fd376_0_49:notes"/>
           <p:cNvSpPr txBox="1"/>
           <p:nvPr>
             <p:ph idx="1" type="body"/>
@@ -915,7 +918,7 @@
   <p:cSld>
     <p:spTree>
       <p:nvGrpSpPr>
-        <p:cNvPr id="66" name="Shape 66"/>
+        <p:cNvPr id="69" name="Shape 69"/>
         <p:cNvGrpSpPr/>
         <p:nvPr/>
       </p:nvGrpSpPr>
@@ -929,7 +932,7 @@
       </p:grpSpPr>
       <p:sp>
         <p:nvSpPr>
-          <p:cNvPr id="67" name="Google Shape;67;g126a86fd376_0_54:notes"/>
+          <p:cNvPr id="70" name="Google Shape;70;g126a86fd376_0_54:notes"/>
           <p:cNvSpPr/>
           <p:nvPr>
             <p:ph idx="2" type="sldImg"/>
@@ -964,7 +967,7 @@
       </p:sp>
       <p:sp>
         <p:nvSpPr>
-          <p:cNvPr id="68" name="Google Shape;68;g126a86fd376_0_54:notes"/>
+          <p:cNvPr id="71" name="Google Shape;71;g126a86fd376_0_54:notes"/>
           <p:cNvSpPr txBox="1"/>
           <p:nvPr>
             <p:ph idx="1" type="body"/>
@@ -1014,7 +1017,7 @@
   <p:cSld>
     <p:spTree>
       <p:nvGrpSpPr>
-        <p:cNvPr id="72" name="Shape 72"/>
+        <p:cNvPr id="75" name="Shape 75"/>
         <p:cNvGrpSpPr/>
         <p:nvPr/>
       </p:nvGrpSpPr>
@@ -1028,7 +1031,7 @@
       </p:grpSpPr>
       <p:sp>
         <p:nvSpPr>
-          <p:cNvPr id="73" name="Google Shape;73;g126a86fd376_0_59:notes"/>
+          <p:cNvPr id="76" name="Google Shape;76;g126a86fd376_0_145:notes"/>
           <p:cNvSpPr/>
           <p:nvPr>
             <p:ph idx="2" type="sldImg"/>
@@ -1063,7 +1066,7 @@
       </p:sp>
       <p:sp>
         <p:nvSpPr>
-          <p:cNvPr id="74" name="Google Shape;74;g126a86fd376_0_59:notes"/>
+          <p:cNvPr id="77" name="Google Shape;77;g126a86fd376_0_145:notes"/>
           <p:cNvSpPr txBox="1"/>
           <p:nvPr>
             <p:ph idx="1" type="body"/>
@@ -1113,7 +1116,7 @@
   <p:cSld>
     <p:spTree>
       <p:nvGrpSpPr>
-        <p:cNvPr id="78" name="Shape 78"/>
+        <p:cNvPr id="81" name="Shape 81"/>
         <p:cNvGrpSpPr/>
         <p:nvPr/>
       </p:nvGrpSpPr>
@@ -1127,7 +1130,7 @@
       </p:grpSpPr>
       <p:sp>
         <p:nvSpPr>
-          <p:cNvPr id="79" name="Google Shape;79;g126a86fd376_0_64:notes"/>
+          <p:cNvPr id="82" name="Google Shape;82;g126a86fd376_0_59:notes"/>
           <p:cNvSpPr/>
           <p:nvPr>
             <p:ph idx="2" type="sldImg"/>
@@ -1162,7 +1165,7 @@
       </p:sp>
       <p:sp>
         <p:nvSpPr>
-          <p:cNvPr id="80" name="Google Shape;80;g126a86fd376_0_64:notes"/>
+          <p:cNvPr id="83" name="Google Shape;83;g126a86fd376_0_59:notes"/>
           <p:cNvSpPr txBox="1"/>
           <p:nvPr>
             <p:ph idx="1" type="body"/>
@@ -1212,7 +1215,7 @@
   <p:cSld>
     <p:spTree>
       <p:nvGrpSpPr>
-        <p:cNvPr id="84" name="Shape 84"/>
+        <p:cNvPr id="87" name="Shape 87"/>
         <p:cNvGrpSpPr/>
         <p:nvPr/>
       </p:nvGrpSpPr>
@@ -1226,7 +1229,7 @@
       </p:grpSpPr>
       <p:sp>
         <p:nvSpPr>
-          <p:cNvPr id="85" name="Google Shape;85;g126a86fd376_0_69:notes"/>
+          <p:cNvPr id="88" name="Google Shape;88;g126a86fd376_0_64:notes"/>
           <p:cNvSpPr/>
           <p:nvPr>
             <p:ph idx="2" type="sldImg"/>
@@ -1261,7 +1264,304 @@
       </p:sp>
       <p:sp>
         <p:nvSpPr>
-          <p:cNvPr id="86" name="Google Shape;86;g126a86fd376_0_69:notes"/>
+          <p:cNvPr id="89" name="Google Shape;89;g126a86fd376_0_64:notes"/>
+          <p:cNvSpPr txBox="1"/>
+          <p:nvPr>
+            <p:ph idx="1" type="body"/>
+          </p:nvPr>
+        </p:nvSpPr>
+        <p:spPr>
+          <a:xfrm>
+            <a:off x="685800" y="4343400"/>
+            <a:ext cx="5486400" cy="4114800"/>
+          </a:xfrm>
+          <a:prstGeom prst="rect">
+            <a:avLst/>
+          </a:prstGeom>
+        </p:spPr>
+        <p:txBody>
+          <a:bodyPr anchorCtr="0" anchor="t" bIns="91425" lIns="91425" spcFirstLastPara="1" rIns="91425" wrap="square" tIns="91425">
+            <a:noAutofit/>
+          </a:bodyPr>
+          <a:lstStyle/>
+          <a:p>
+            <a:pPr indent="0" lvl="0" marL="0" rtl="0" algn="l">
+              <a:spcBef>
+                <a:spcPts val="0"/>
+              </a:spcBef>
+              <a:spcAft>
+                <a:spcPts val="0"/>
+              </a:spcAft>
+              <a:buNone/>
+            </a:pPr>
+            <a:r>
+              <a:t/>
+            </a:r>
+            <a:endParaRPr/>
+          </a:p>
+        </p:txBody>
+      </p:sp>
+    </p:spTree>
+  </p:cSld>
+  <p:clrMapOvr>
+    <a:masterClrMapping/>
+  </p:clrMapOvr>
+</p:notes>
+</file>
+
+<file path=ppt/notesSlides/notesSlide7.xml><?xml version="1.0" encoding="utf-8"?>
+<p:notes xmlns:a="http://schemas.openxmlformats.org/drawingml/2006/main" xmlns:r="http://schemas.openxmlformats.org/officeDocument/2006/relationships" xmlns:mc="http://schemas.openxmlformats.org/markup-compatibility/2006" xmlns:mv="urn:schemas-microsoft-com:mac:vml" xmlns:p="http://schemas.openxmlformats.org/presentationml/2006/main" xmlns:c="http://schemas.openxmlformats.org/drawingml/2006/chart" xmlns:dgm="http://schemas.openxmlformats.org/drawingml/2006/diagram" xmlns:o="urn:schemas-microsoft-com:office:office" xmlns:v="urn:schemas-microsoft-com:vml" xmlns:pvml="urn:schemas-microsoft-com:office:powerpoint" xmlns:com="http://schemas.openxmlformats.org/drawingml/2006/compatibility" xmlns:p14="http://schemas.microsoft.com/office/powerpoint/2010/main" xmlns:p15="http://schemas.microsoft.com/office/powerpoint/2012/main" xmlns:ahyp="http://schemas.microsoft.com/office/drawing/2018/hyperlinkcolor" showMasterPhAnim="0" showMasterSp="0">
+  <p:cSld>
+    <p:spTree>
+      <p:nvGrpSpPr>
+        <p:cNvPr id="96" name="Shape 96"/>
+        <p:cNvGrpSpPr/>
+        <p:nvPr/>
+      </p:nvGrpSpPr>
+      <p:grpSpPr>
+        <a:xfrm>
+          <a:off x="0" y="0"/>
+          <a:ext cx="0" cy="0"/>
+          <a:chOff x="0" y="0"/>
+          <a:chExt cx="0" cy="0"/>
+        </a:xfrm>
+      </p:grpSpPr>
+      <p:sp>
+        <p:nvSpPr>
+          <p:cNvPr id="97" name="Google Shape;97;g126a86fd376_0_103:notes"/>
+          <p:cNvSpPr/>
+          <p:nvPr>
+            <p:ph idx="2" type="sldImg"/>
+          </p:nvPr>
+        </p:nvSpPr>
+        <p:spPr>
+          <a:xfrm>
+            <a:off x="381300" y="685800"/>
+            <a:ext cx="6096000" cy="3429000"/>
+          </a:xfrm>
+          <a:custGeom>
+            <a:rect b="b" l="l" r="r" t="t"/>
+            <a:pathLst>
+              <a:path extrusionOk="0" h="120000" w="120000">
+                <a:moveTo>
+                  <a:pt x="0" y="0"/>
+                </a:moveTo>
+                <a:lnTo>
+                  <a:pt x="120000" y="0"/>
+                </a:lnTo>
+                <a:lnTo>
+                  <a:pt x="120000" y="120000"/>
+                </a:lnTo>
+                <a:lnTo>
+                  <a:pt x="0" y="120000"/>
+                </a:lnTo>
+                <a:close/>
+              </a:path>
+            </a:pathLst>
+          </a:custGeom>
+        </p:spPr>
+      </p:sp>
+      <p:sp>
+        <p:nvSpPr>
+          <p:cNvPr id="98" name="Google Shape;98;g126a86fd376_0_103:notes"/>
+          <p:cNvSpPr txBox="1"/>
+          <p:nvPr>
+            <p:ph idx="1" type="body"/>
+          </p:nvPr>
+        </p:nvSpPr>
+        <p:spPr>
+          <a:xfrm>
+            <a:off x="685800" y="4343400"/>
+            <a:ext cx="5486400" cy="4114800"/>
+          </a:xfrm>
+          <a:prstGeom prst="rect">
+            <a:avLst/>
+          </a:prstGeom>
+        </p:spPr>
+        <p:txBody>
+          <a:bodyPr anchorCtr="0" anchor="t" bIns="91425" lIns="91425" spcFirstLastPara="1" rIns="91425" wrap="square" tIns="91425">
+            <a:noAutofit/>
+          </a:bodyPr>
+          <a:lstStyle/>
+          <a:p>
+            <a:pPr indent="0" lvl="0" marL="0" rtl="0" algn="l">
+              <a:spcBef>
+                <a:spcPts val="0"/>
+              </a:spcBef>
+              <a:spcAft>
+                <a:spcPts val="0"/>
+              </a:spcAft>
+              <a:buNone/>
+            </a:pPr>
+            <a:r>
+              <a:t/>
+            </a:r>
+            <a:endParaRPr/>
+          </a:p>
+        </p:txBody>
+      </p:sp>
+    </p:spTree>
+  </p:cSld>
+  <p:clrMapOvr>
+    <a:masterClrMapping/>
+  </p:clrMapOvr>
+</p:notes>
+</file>
+
+<file path=ppt/notesSlides/notesSlide8.xml><?xml version="1.0" encoding="utf-8"?>
+<p:notes xmlns:a="http://schemas.openxmlformats.org/drawingml/2006/main" xmlns:r="http://schemas.openxmlformats.org/officeDocument/2006/relationships" xmlns:mc="http://schemas.openxmlformats.org/markup-compatibility/2006" xmlns:mv="urn:schemas-microsoft-com:mac:vml" xmlns:p="http://schemas.openxmlformats.org/presentationml/2006/main" xmlns:c="http://schemas.openxmlformats.org/drawingml/2006/chart" xmlns:dgm="http://schemas.openxmlformats.org/drawingml/2006/diagram" xmlns:o="urn:schemas-microsoft-com:office:office" xmlns:v="urn:schemas-microsoft-com:vml" xmlns:pvml="urn:schemas-microsoft-com:office:powerpoint" xmlns:com="http://schemas.openxmlformats.org/drawingml/2006/compatibility" xmlns:p14="http://schemas.microsoft.com/office/powerpoint/2010/main" xmlns:p15="http://schemas.microsoft.com/office/powerpoint/2012/main" xmlns:ahyp="http://schemas.microsoft.com/office/drawing/2018/hyperlinkcolor" showMasterPhAnim="0" showMasterSp="0">
+  <p:cSld>
+    <p:spTree>
+      <p:nvGrpSpPr>
+        <p:cNvPr id="113" name="Shape 113"/>
+        <p:cNvGrpSpPr/>
+        <p:nvPr/>
+      </p:nvGrpSpPr>
+      <p:grpSpPr>
+        <a:xfrm>
+          <a:off x="0" y="0"/>
+          <a:ext cx="0" cy="0"/>
+          <a:chOff x="0" y="0"/>
+          <a:chExt cx="0" cy="0"/>
+        </a:xfrm>
+      </p:grpSpPr>
+      <p:sp>
+        <p:nvSpPr>
+          <p:cNvPr id="114" name="Google Shape;114;g126a86fd376_0_80:notes"/>
+          <p:cNvSpPr/>
+          <p:nvPr>
+            <p:ph idx="2" type="sldImg"/>
+          </p:nvPr>
+        </p:nvSpPr>
+        <p:spPr>
+          <a:xfrm>
+            <a:off x="381300" y="685800"/>
+            <a:ext cx="6096000" cy="3429000"/>
+          </a:xfrm>
+          <a:custGeom>
+            <a:rect b="b" l="l" r="r" t="t"/>
+            <a:pathLst>
+              <a:path extrusionOk="0" h="120000" w="120000">
+                <a:moveTo>
+                  <a:pt x="0" y="0"/>
+                </a:moveTo>
+                <a:lnTo>
+                  <a:pt x="120000" y="0"/>
+                </a:lnTo>
+                <a:lnTo>
+                  <a:pt x="120000" y="120000"/>
+                </a:lnTo>
+                <a:lnTo>
+                  <a:pt x="0" y="120000"/>
+                </a:lnTo>
+                <a:close/>
+              </a:path>
+            </a:pathLst>
+          </a:custGeom>
+        </p:spPr>
+      </p:sp>
+      <p:sp>
+        <p:nvSpPr>
+          <p:cNvPr id="115" name="Google Shape;115;g126a86fd376_0_80:notes"/>
+          <p:cNvSpPr txBox="1"/>
+          <p:nvPr>
+            <p:ph idx="1" type="body"/>
+          </p:nvPr>
+        </p:nvSpPr>
+        <p:spPr>
+          <a:xfrm>
+            <a:off x="685800" y="4343400"/>
+            <a:ext cx="5486400" cy="4114800"/>
+          </a:xfrm>
+          <a:prstGeom prst="rect">
+            <a:avLst/>
+          </a:prstGeom>
+        </p:spPr>
+        <p:txBody>
+          <a:bodyPr anchorCtr="0" anchor="t" bIns="91425" lIns="91425" spcFirstLastPara="1" rIns="91425" wrap="square" tIns="91425">
+            <a:noAutofit/>
+          </a:bodyPr>
+          <a:lstStyle/>
+          <a:p>
+            <a:pPr indent="0" lvl="0" marL="0" rtl="0" algn="l">
+              <a:spcBef>
+                <a:spcPts val="0"/>
+              </a:spcBef>
+              <a:spcAft>
+                <a:spcPts val="0"/>
+              </a:spcAft>
+              <a:buNone/>
+            </a:pPr>
+            <a:r>
+              <a:t/>
+            </a:r>
+            <a:endParaRPr/>
+          </a:p>
+        </p:txBody>
+      </p:sp>
+    </p:spTree>
+  </p:cSld>
+  <p:clrMapOvr>
+    <a:masterClrMapping/>
+  </p:clrMapOvr>
+</p:notes>
+</file>
+
+<file path=ppt/notesSlides/notesSlide9.xml><?xml version="1.0" encoding="utf-8"?>
+<p:notes xmlns:a="http://schemas.openxmlformats.org/drawingml/2006/main" xmlns:r="http://schemas.openxmlformats.org/officeDocument/2006/relationships" xmlns:mc="http://schemas.openxmlformats.org/markup-compatibility/2006" xmlns:mv="urn:schemas-microsoft-com:mac:vml" xmlns:p="http://schemas.openxmlformats.org/presentationml/2006/main" xmlns:c="http://schemas.openxmlformats.org/drawingml/2006/chart" xmlns:dgm="http://schemas.openxmlformats.org/drawingml/2006/diagram" xmlns:o="urn:schemas-microsoft-com:office:office" xmlns:v="urn:schemas-microsoft-com:vml" xmlns:pvml="urn:schemas-microsoft-com:office:powerpoint" xmlns:com="http://schemas.openxmlformats.org/drawingml/2006/compatibility" xmlns:p14="http://schemas.microsoft.com/office/powerpoint/2010/main" xmlns:p15="http://schemas.microsoft.com/office/powerpoint/2012/main" xmlns:ahyp="http://schemas.microsoft.com/office/drawing/2018/hyperlinkcolor" showMasterPhAnim="0" showMasterSp="0">
+  <p:cSld>
+    <p:spTree>
+      <p:nvGrpSpPr>
+        <p:cNvPr id="124" name="Shape 124"/>
+        <p:cNvGrpSpPr/>
+        <p:nvPr/>
+      </p:nvGrpSpPr>
+      <p:grpSpPr>
+        <a:xfrm>
+          <a:off x="0" y="0"/>
+          <a:ext cx="0" cy="0"/>
+          <a:chOff x="0" y="0"/>
+          <a:chExt cx="0" cy="0"/>
+        </a:xfrm>
+      </p:grpSpPr>
+      <p:sp>
+        <p:nvSpPr>
+          <p:cNvPr id="125" name="Google Shape;125;g126a86fd376_0_69:notes"/>
+          <p:cNvSpPr/>
+          <p:nvPr>
+            <p:ph idx="2" type="sldImg"/>
+          </p:nvPr>
+        </p:nvSpPr>
+        <p:spPr>
+          <a:xfrm>
+            <a:off x="381300" y="685800"/>
+            <a:ext cx="6096000" cy="3429000"/>
+          </a:xfrm>
+          <a:custGeom>
+            <a:rect b="b" l="l" r="r" t="t"/>
+            <a:pathLst>
+              <a:path extrusionOk="0" h="120000" w="120000">
+                <a:moveTo>
+                  <a:pt x="0" y="0"/>
+                </a:moveTo>
+                <a:lnTo>
+                  <a:pt x="120000" y="0"/>
+                </a:lnTo>
+                <a:lnTo>
+                  <a:pt x="120000" y="120000"/>
+                </a:lnTo>
+                <a:lnTo>
+                  <a:pt x="0" y="120000"/>
+                </a:lnTo>
+                <a:close/>
+              </a:path>
+            </a:pathLst>
+          </a:custGeom>
+        </p:spPr>
+      </p:sp>
+      <p:sp>
+        <p:nvSpPr>
+          <p:cNvPr id="126" name="Google Shape;126;g126a86fd376_0_69:notes"/>
           <p:cNvSpPr txBox="1"/>
           <p:nvPr>
             <p:ph idx="1" type="body"/>
@@ -6846,7 +7146,7 @@
         </p:nvSpPr>
         <p:spPr>
           <a:xfrm>
-            <a:off x="344250" y="1022950"/>
+            <a:off x="344250" y="1251550"/>
             <a:ext cx="8455500" cy="2187300"/>
           </a:xfrm>
           <a:prstGeom prst="rect">
@@ -6888,7 +7188,31 @@
             </a:pPr>
             <a:r>
               <a:rPr lang="en" sz="4920"/>
-              <a:t>Imbalance</a:t>
+              <a:t>Im</a:t>
+            </a:r>
+            <a:r>
+              <a:rPr lang="en" sz="4920"/>
+              <a:t>b</a:t>
+            </a:r>
+            <a:r>
+              <a:rPr lang="en" sz="4920"/>
+              <a:t>a</a:t>
+            </a:r>
+            <a:r>
+              <a:rPr lang="en" sz="4920"/>
+              <a:t>l</a:t>
+            </a:r>
+            <a:r>
+              <a:rPr lang="en" sz="4920"/>
+              <a:t>an</a:t>
+            </a:r>
+            <a:r>
+              <a:rPr lang="en" sz="4920"/>
+              <a:t>c</a:t>
+            </a:r>
+            <a:r>
+              <a:rPr lang="en" sz="4920"/>
+              <a:t>e</a:t>
             </a:r>
             <a:endParaRPr sz="4920"/>
           </a:p>
@@ -6904,7 +7228,7 @@
         </p:nvSpPr>
         <p:spPr>
           <a:xfrm>
-            <a:off x="376800" y="3287925"/>
+            <a:off x="376800" y="3592725"/>
             <a:ext cx="8423100" cy="1076100"/>
           </a:xfrm>
           <a:prstGeom prst="rect">
@@ -6927,18 +7251,220 @@
               <a:buNone/>
             </a:pPr>
             <a:r>
-              <a:rPr lang="en" sz="2000"/>
+              <a:rPr lang="en" sz="2300"/>
               <a:t>Gagan Gopinath, Sai Raghava Mukund, Tarun Anand</a:t>
             </a:r>
-            <a:endParaRPr sz="2000"/>
+            <a:endParaRPr sz="2300"/>
           </a:p>
         </p:txBody>
       </p:sp>
+      <p:pic>
+        <p:nvPicPr>
+          <p:cNvPr id="60" name="Google Shape;60;p13"/>
+          <p:cNvPicPr preferRelativeResize="0"/>
+          <p:nvPr/>
+        </p:nvPicPr>
+        <p:blipFill rotWithShape="1">
+          <a:blip r:embed="rId3">
+            <a:alphaModFix amt="75000"/>
+          </a:blip>
+          <a:srcRect b="7902" l="11762" r="0" t="0"/>
+          <a:stretch/>
+        </p:blipFill>
+        <p:spPr>
+          <a:xfrm>
+            <a:off x="6714400" y="2465850"/>
+            <a:ext cx="1966625" cy="896850"/>
+          </a:xfrm>
+          <a:prstGeom prst="rect">
+            <a:avLst/>
+          </a:prstGeom>
+          <a:noFill/>
+          <a:ln>
+            <a:noFill/>
+          </a:ln>
+        </p:spPr>
+      </p:pic>
+      <p:pic>
+        <p:nvPicPr>
+          <p:cNvPr id="61" name="Google Shape;61;p13"/>
+          <p:cNvPicPr preferRelativeResize="0"/>
+          <p:nvPr/>
+        </p:nvPicPr>
+        <p:blipFill rotWithShape="1">
+          <a:blip r:embed="rId3">
+            <a:alphaModFix amt="75000"/>
+          </a:blip>
+          <a:srcRect b="7902" l="11762" r="0" t="0"/>
+          <a:stretch/>
+        </p:blipFill>
+        <p:spPr>
+          <a:xfrm flipH="1">
+            <a:off x="459875" y="2465850"/>
+            <a:ext cx="1966625" cy="896850"/>
+          </a:xfrm>
+          <a:prstGeom prst="rect">
+            <a:avLst/>
+          </a:prstGeom>
+          <a:noFill/>
+          <a:ln>
+            <a:noFill/>
+          </a:ln>
+        </p:spPr>
+      </p:pic>
     </p:spTree>
   </p:cSld>
   <p:clrMapOvr>
     <a:masterClrMapping/>
   </p:clrMapOvr>
+  <p:timing>
+    <p:tnLst>
+      <p:par>
+        <p:cTn dur="indefinite" nodeType="tmRoot" restart="never">
+          <p:childTnLst>
+            <p:seq concurrent="1" nextAc="seek">
+              <p:cTn dur="indefinite" id="2" nodeType="mainSeq">
+                <p:childTnLst>
+                  <p:par>
+                    <p:cTn fill="hold">
+                      <p:stCondLst>
+                        <p:cond delay="indefinite"/>
+                      </p:stCondLst>
+                      <p:childTnLst>
+                        <p:par>
+                          <p:cTn fill="hold">
+                            <p:stCondLst>
+                              <p:cond delay="0"/>
+                            </p:stCondLst>
+                            <p:childTnLst>
+                              <p:par>
+                                <p:cTn fill="hold" nodeType="clickEffect" presetClass="entr" presetID="2" presetSubtype="2">
+                                  <p:stCondLst>
+                                    <p:cond delay="0"/>
+                                  </p:stCondLst>
+                                  <p:childTnLst>
+                                    <p:set>
+                                      <p:cBhvr>
+                                        <p:cTn dur="1" fill="hold">
+                                          <p:stCondLst>
+                                            <p:cond delay="0"/>
+                                          </p:stCondLst>
+                                        </p:cTn>
+                                        <p:tgtEl>
+                                          <p:spTgt spid="61"/>
+                                        </p:tgtEl>
+                                        <p:attrNameLst>
+                                          <p:attrName>style.visibility</p:attrName>
+                                        </p:attrNameLst>
+                                      </p:cBhvr>
+                                      <p:to>
+                                        <p:strVal val="visible"/>
+                                      </p:to>
+                                    </p:set>
+                                    <p:anim calcmode="lin" valueType="num">
+                                      <p:cBhvr additive="base">
+                                        <p:cTn dur="1500"/>
+                                        <p:tgtEl>
+                                          <p:spTgt spid="61"/>
+                                        </p:tgtEl>
+                                        <p:attrNameLst>
+                                          <p:attrName>ppt_x</p:attrName>
+                                        </p:attrNameLst>
+                                      </p:cBhvr>
+                                      <p:tavLst>
+                                        <p:tav fmla="" tm="0">
+                                          <p:val>
+                                            <p:strVal val="#ppt_x+1"/>
+                                          </p:val>
+                                        </p:tav>
+                                        <p:tav fmla="" tm="100000">
+                                          <p:val>
+                                            <p:strVal val="#ppt_x"/>
+                                          </p:val>
+                                        </p:tav>
+                                      </p:tavLst>
+                                    </p:anim>
+                                  </p:childTnLst>
+                                </p:cTn>
+                              </p:par>
+                              <p:par>
+                                <p:cTn fill="hold" nodeType="withEffect" presetClass="entr" presetID="2" presetSubtype="8">
+                                  <p:stCondLst>
+                                    <p:cond delay="0"/>
+                                  </p:stCondLst>
+                                  <p:childTnLst>
+                                    <p:set>
+                                      <p:cBhvr>
+                                        <p:cTn dur="1" fill="hold">
+                                          <p:stCondLst>
+                                            <p:cond delay="0"/>
+                                          </p:stCondLst>
+                                        </p:cTn>
+                                        <p:tgtEl>
+                                          <p:spTgt spid="60"/>
+                                        </p:tgtEl>
+                                        <p:attrNameLst>
+                                          <p:attrName>style.visibility</p:attrName>
+                                        </p:attrNameLst>
+                                      </p:cBhvr>
+                                      <p:to>
+                                        <p:strVal val="visible"/>
+                                      </p:to>
+                                    </p:set>
+                                    <p:anim calcmode="lin" valueType="num">
+                                      <p:cBhvr additive="base">
+                                        <p:cTn dur="1500"/>
+                                        <p:tgtEl>
+                                          <p:spTgt spid="60"/>
+                                        </p:tgtEl>
+                                        <p:attrNameLst>
+                                          <p:attrName>ppt_x</p:attrName>
+                                        </p:attrNameLst>
+                                      </p:cBhvr>
+                                      <p:tavLst>
+                                        <p:tav fmla="" tm="0">
+                                          <p:val>
+                                            <p:strVal val="#ppt_x-1"/>
+                                          </p:val>
+                                        </p:tav>
+                                        <p:tav fmla="" tm="100000">
+                                          <p:val>
+                                            <p:strVal val="#ppt_x"/>
+                                          </p:val>
+                                        </p:tav>
+                                      </p:tavLst>
+                                    </p:anim>
+                                  </p:childTnLst>
+                                </p:cTn>
+                              </p:par>
+                            </p:childTnLst>
+                          </p:cTn>
+                        </p:par>
+                      </p:childTnLst>
+                    </p:cTn>
+                  </p:par>
+                </p:childTnLst>
+              </p:cTn>
+              <p:prevCondLst>
+                <p:cond evt="onPrev">
+                  <p:tgtEl>
+                    <p:sldTgt/>
+                  </p:tgtEl>
+                </p:cond>
+              </p:prevCondLst>
+              <p:nextCondLst>
+                <p:cond evt="onNext">
+                  <p:tgtEl>
+                    <p:sldTgt/>
+                  </p:tgtEl>
+                </p:cond>
+              </p:nextCondLst>
+            </p:seq>
+          </p:childTnLst>
+        </p:cTn>
+      </p:par>
+    </p:tnLst>
+  </p:timing>
 </p:sld>
 </file>
 
@@ -6947,7 +7473,7 @@
   <p:cSld>
     <p:spTree>
       <p:nvGrpSpPr>
-        <p:cNvPr id="63" name="Shape 63"/>
+        <p:cNvPr id="65" name="Shape 65"/>
         <p:cNvGrpSpPr/>
         <p:nvPr/>
       </p:nvGrpSpPr>
@@ -6961,7 +7487,7 @@
       </p:grpSpPr>
       <p:sp>
         <p:nvSpPr>
-          <p:cNvPr id="64" name="Google Shape;64;p14"/>
+          <p:cNvPr id="66" name="Google Shape;66;p14"/>
           <p:cNvSpPr txBox="1"/>
           <p:nvPr>
             <p:ph type="title"/>
@@ -7001,7 +7527,7 @@
       </p:sp>
       <p:sp>
         <p:nvSpPr>
-          <p:cNvPr id="65" name="Google Shape;65;p14"/>
+          <p:cNvPr id="67" name="Google Shape;67;p14"/>
           <p:cNvSpPr txBox="1"/>
           <p:nvPr>
             <p:ph idx="1" type="body"/>
@@ -7022,14 +7548,15 @@
           </a:bodyPr>
           <a:lstStyle/>
           <a:p>
-            <a:pPr indent="0" lvl="0" marL="0" rtl="0" algn="l">
-              <a:spcBef>
-                <a:spcPts val="0"/>
-              </a:spcBef>
-              <a:spcAft>
-                <a:spcPts val="0"/>
-              </a:spcAft>
-              <a:buNone/>
+            <a:pPr indent="-342900" lvl="0" marL="457200" rtl="0" algn="l">
+              <a:spcBef>
+                <a:spcPts val="0"/>
+              </a:spcBef>
+              <a:spcAft>
+                <a:spcPts val="0"/>
+              </a:spcAft>
+              <a:buSzPts val="1800"/>
+              <a:buChar char="●"/>
             </a:pPr>
             <a:r>
               <a:rPr lang="en"/>
@@ -7038,42 +7565,36 @@
             <a:endParaRPr/>
           </a:p>
           <a:p>
-            <a:pPr indent="0" lvl="0" marL="0" rtl="0" algn="l">
-              <a:spcBef>
-                <a:spcPts val="1200"/>
-              </a:spcBef>
-              <a:spcAft>
-                <a:spcPts val="0"/>
-              </a:spcAft>
-              <a:buNone/>
+            <a:pPr indent="-342900" lvl="0" marL="457200" rtl="0" algn="l">
+              <a:spcBef>
+                <a:spcPts val="0"/>
+              </a:spcBef>
+              <a:spcAft>
+                <a:spcPts val="0"/>
+              </a:spcAft>
+              <a:buSzPts val="1800"/>
+              <a:buChar char="●"/>
             </a:pPr>
             <a:r>
               <a:rPr lang="en"/>
-              <a:t>Different types and what we are </a:t>
-            </a:r>
-            <a:r>
-              <a:rPr lang="en"/>
-              <a:t>targeting</a:t>
-            </a:r>
-            <a:r>
-              <a:rPr lang="en"/>
-              <a:t>?</a:t>
+              <a:t>Types of Question Answering</a:t>
             </a:r>
             <a:endParaRPr/>
           </a:p>
           <a:p>
-            <a:pPr indent="0" lvl="0" marL="0" rtl="0" algn="l">
-              <a:spcBef>
-                <a:spcPts val="1200"/>
-              </a:spcBef>
-              <a:spcAft>
-                <a:spcPts val="0"/>
-              </a:spcAft>
-              <a:buNone/>
+            <a:pPr indent="-342900" lvl="0" marL="457200" rtl="0" algn="l">
+              <a:spcBef>
+                <a:spcPts val="0"/>
+              </a:spcBef>
+              <a:spcAft>
+                <a:spcPts val="0"/>
+              </a:spcAft>
+              <a:buSzPts val="1800"/>
+              <a:buChar char="●"/>
             </a:pPr>
             <a:r>
               <a:rPr lang="en"/>
-              <a:t>What is Squad?</a:t>
+              <a:t>What is SQuAD?</a:t>
             </a:r>
             <a:endParaRPr/>
           </a:p>
@@ -7094,6 +7615,34 @@
           </a:p>
         </p:txBody>
       </p:sp>
+      <p:pic>
+        <p:nvPicPr>
+          <p:cNvPr id="68" name="Google Shape;68;p14"/>
+          <p:cNvPicPr preferRelativeResize="0"/>
+          <p:nvPr/>
+        </p:nvPicPr>
+        <p:blipFill>
+          <a:blip r:embed="rId3">
+            <a:alphaModFix/>
+          </a:blip>
+          <a:stretch>
+            <a:fillRect/>
+          </a:stretch>
+        </p:blipFill>
+        <p:spPr>
+          <a:xfrm>
+            <a:off x="4572000" y="1017725"/>
+            <a:ext cx="4095326" cy="2730226"/>
+          </a:xfrm>
+          <a:prstGeom prst="rect">
+            <a:avLst/>
+          </a:prstGeom>
+          <a:noFill/>
+          <a:ln>
+            <a:noFill/>
+          </a:ln>
+        </p:spPr>
+      </p:pic>
     </p:spTree>
   </p:cSld>
   <p:clrMapOvr>
@@ -7107,7 +7656,7 @@
   <p:cSld>
     <p:spTree>
       <p:nvGrpSpPr>
-        <p:cNvPr id="69" name="Shape 69"/>
+        <p:cNvPr id="72" name="Shape 72"/>
         <p:cNvGrpSpPr/>
         <p:nvPr/>
       </p:nvGrpSpPr>
@@ -7121,7 +7670,7 @@
       </p:grpSpPr>
       <p:sp>
         <p:nvSpPr>
-          <p:cNvPr id="70" name="Google Shape;70;p15"/>
+          <p:cNvPr id="73" name="Google Shape;73;p15"/>
           <p:cNvSpPr txBox="1"/>
           <p:nvPr>
             <p:ph type="title"/>
@@ -7161,7 +7710,7 @@
       </p:sp>
       <p:sp>
         <p:nvSpPr>
-          <p:cNvPr id="71" name="Google Shape;71;p15"/>
+          <p:cNvPr id="74" name="Google Shape;74;p15"/>
           <p:cNvSpPr txBox="1"/>
           <p:nvPr>
             <p:ph idx="1" type="body"/>
@@ -7212,7 +7761,7 @@
   <p:cSld>
     <p:spTree>
       <p:nvGrpSpPr>
-        <p:cNvPr id="75" name="Shape 75"/>
+        <p:cNvPr id="78" name="Shape 78"/>
         <p:cNvGrpSpPr/>
         <p:nvPr/>
       </p:nvGrpSpPr>
@@ -7226,7 +7775,7 @@
       </p:grpSpPr>
       <p:sp>
         <p:nvSpPr>
-          <p:cNvPr id="76" name="Google Shape;76;p16"/>
+          <p:cNvPr id="79" name="Google Shape;79;p16"/>
           <p:cNvSpPr txBox="1"/>
           <p:nvPr>
             <p:ph type="title"/>
@@ -7258,6 +7807,98 @@
             </a:pPr>
             <a:r>
               <a:rPr lang="en"/>
+              <a:t>Contribution</a:t>
+            </a:r>
+            <a:endParaRPr/>
+          </a:p>
+        </p:txBody>
+      </p:sp>
+      <p:pic>
+        <p:nvPicPr>
+          <p:cNvPr id="80" name="Google Shape;80;p16"/>
+          <p:cNvPicPr preferRelativeResize="0"/>
+          <p:nvPr/>
+        </p:nvPicPr>
+        <p:blipFill rotWithShape="1">
+          <a:blip r:embed="rId3">
+            <a:alphaModFix/>
+          </a:blip>
+          <a:srcRect b="19389" l="0" r="0" t="17267"/>
+          <a:stretch/>
+        </p:blipFill>
+        <p:spPr>
+          <a:xfrm>
+            <a:off x="2845443" y="1941150"/>
+            <a:ext cx="3453119" cy="2187300"/>
+          </a:xfrm>
+          <a:prstGeom prst="rect">
+            <a:avLst/>
+          </a:prstGeom>
+          <a:noFill/>
+          <a:ln>
+            <a:noFill/>
+          </a:ln>
+        </p:spPr>
+      </p:pic>
+    </p:spTree>
+  </p:cSld>
+  <p:clrMapOvr>
+    <a:masterClrMapping/>
+  </p:clrMapOvr>
+</p:sld>
+</file>
+
+<file path=ppt/slides/slide5.xml><?xml version="1.0" encoding="utf-8"?>
+<p:sld xmlns:a="http://schemas.openxmlformats.org/drawingml/2006/main" xmlns:r="http://schemas.openxmlformats.org/officeDocument/2006/relationships" xmlns:mc="http://schemas.openxmlformats.org/markup-compatibility/2006" xmlns:mv="urn:schemas-microsoft-com:mac:vml" xmlns:p="http://schemas.openxmlformats.org/presentationml/2006/main" xmlns:c="http://schemas.openxmlformats.org/drawingml/2006/chart" xmlns:dgm="http://schemas.openxmlformats.org/drawingml/2006/diagram" xmlns:o="urn:schemas-microsoft-com:office:office" xmlns:v="urn:schemas-microsoft-com:vml" xmlns:pvml="urn:schemas-microsoft-com:office:powerpoint" xmlns:com="http://schemas.openxmlformats.org/drawingml/2006/compatibility" xmlns:p14="http://schemas.microsoft.com/office/powerpoint/2010/main" xmlns:p15="http://schemas.microsoft.com/office/powerpoint/2012/main" xmlns:ahyp="http://schemas.microsoft.com/office/drawing/2018/hyperlinkcolor">
+  <p:cSld>
+    <p:spTree>
+      <p:nvGrpSpPr>
+        <p:cNvPr id="84" name="Shape 84"/>
+        <p:cNvGrpSpPr/>
+        <p:nvPr/>
+      </p:nvGrpSpPr>
+      <p:grpSpPr>
+        <a:xfrm>
+          <a:off x="0" y="0"/>
+          <a:ext cx="0" cy="0"/>
+          <a:chOff x="0" y="0"/>
+          <a:chExt cx="0" cy="0"/>
+        </a:xfrm>
+      </p:grpSpPr>
+      <p:sp>
+        <p:nvSpPr>
+          <p:cNvPr id="85" name="Google Shape;85;p17"/>
+          <p:cNvSpPr txBox="1"/>
+          <p:nvPr>
+            <p:ph type="title"/>
+          </p:nvPr>
+        </p:nvSpPr>
+        <p:spPr>
+          <a:xfrm>
+            <a:off x="311700" y="445025"/>
+            <a:ext cx="8520600" cy="572700"/>
+          </a:xfrm>
+          <a:prstGeom prst="rect">
+            <a:avLst/>
+          </a:prstGeom>
+        </p:spPr>
+        <p:txBody>
+          <a:bodyPr anchorCtr="0" anchor="t" bIns="91425" lIns="91425" spcFirstLastPara="1" rIns="91425" wrap="square" tIns="91425">
+            <a:normAutofit fontScale="90000"/>
+          </a:bodyPr>
+          <a:lstStyle/>
+          <a:p>
+            <a:pPr indent="0" lvl="0" marL="0" rtl="0" algn="l">
+              <a:spcBef>
+                <a:spcPts val="0"/>
+              </a:spcBef>
+              <a:spcAft>
+                <a:spcPts val="0"/>
+              </a:spcAft>
+              <a:buNone/>
+            </a:pPr>
+            <a:r>
+              <a:rPr lang="en"/>
               <a:t>Related Work</a:t>
             </a:r>
             <a:endParaRPr/>
@@ -7266,7 +7907,7 @@
       </p:sp>
       <p:sp>
         <p:nvSpPr>
-          <p:cNvPr id="77" name="Google Shape;77;p16"/>
+          <p:cNvPr id="86" name="Google Shape;86;p17"/>
           <p:cNvSpPr txBox="1"/>
           <p:nvPr>
             <p:ph idx="1" type="body"/>
@@ -7311,12 +7952,12 @@
 </p:sld>
 </file>
 
-<file path=ppt/slides/slide5.xml><?xml version="1.0" encoding="utf-8"?>
+<file path=ppt/slides/slide6.xml><?xml version="1.0" encoding="utf-8"?>
 <p:sld xmlns:a="http://schemas.openxmlformats.org/drawingml/2006/main" xmlns:r="http://schemas.openxmlformats.org/officeDocument/2006/relationships" xmlns:mc="http://schemas.openxmlformats.org/markup-compatibility/2006" xmlns:mv="urn:schemas-microsoft-com:mac:vml" xmlns:p="http://schemas.openxmlformats.org/presentationml/2006/main" xmlns:c="http://schemas.openxmlformats.org/drawingml/2006/chart" xmlns:dgm="http://schemas.openxmlformats.org/drawingml/2006/diagram" xmlns:o="urn:schemas-microsoft-com:office:office" xmlns:v="urn:schemas-microsoft-com:vml" xmlns:pvml="urn:schemas-microsoft-com:office:powerpoint" xmlns:com="http://schemas.openxmlformats.org/drawingml/2006/compatibility" xmlns:p14="http://schemas.microsoft.com/office/powerpoint/2010/main" xmlns:p15="http://schemas.microsoft.com/office/powerpoint/2012/main" xmlns:ahyp="http://schemas.microsoft.com/office/drawing/2018/hyperlinkcolor">
   <p:cSld>
     <p:spTree>
       <p:nvGrpSpPr>
-        <p:cNvPr id="81" name="Shape 81"/>
+        <p:cNvPr id="90" name="Shape 90"/>
         <p:cNvGrpSpPr/>
         <p:nvPr/>
       </p:nvGrpSpPr>
@@ -7330,7 +7971,7 @@
       </p:grpSpPr>
       <p:sp>
         <p:nvSpPr>
-          <p:cNvPr id="82" name="Google Shape;82;p17"/>
+          <p:cNvPr id="91" name="Google Shape;91;p18"/>
           <p:cNvSpPr txBox="1"/>
           <p:nvPr>
             <p:ph type="title"/>
@@ -7370,7 +8011,7 @@
       </p:sp>
       <p:sp>
         <p:nvSpPr>
-          <p:cNvPr id="83" name="Google Shape;83;p17"/>
+          <p:cNvPr id="92" name="Google Shape;92;p18"/>
           <p:cNvSpPr txBox="1"/>
           <p:nvPr>
             <p:ph idx="1" type="body"/>
@@ -7405,7 +8046,11 @@
               <a:rPr lang="en"/>
               <a:t>Undersampling</a:t>
             </a:r>
-            <a:endParaRPr/>
+            <a:endParaRPr>
+              <a:solidFill>
+                <a:srgbClr val="D9D9D9"/>
+              </a:solidFill>
+            </a:endParaRPr>
           </a:p>
           <a:p>
             <a:pPr indent="-342900" lvl="0" marL="457200" rtl="0" algn="l">
@@ -7415,14 +8060,25 @@
               <a:spcAft>
                 <a:spcPts val="0"/>
               </a:spcAft>
+              <a:buClr>
+                <a:srgbClr val="D9D9D9"/>
+              </a:buClr>
               <a:buSzPts val="1800"/>
               <a:buAutoNum type="arabicPeriod"/>
             </a:pPr>
             <a:r>
-              <a:rPr lang="en"/>
+              <a:rPr lang="en" sz="1800">
+                <a:solidFill>
+                  <a:srgbClr val="D9D9D9"/>
+                </a:solidFill>
+              </a:rPr>
               <a:t>Question generation</a:t>
             </a:r>
-            <a:endParaRPr/>
+            <a:endParaRPr sz="1800">
+              <a:solidFill>
+                <a:srgbClr val="D9D9D9"/>
+              </a:solidFill>
+            </a:endParaRPr>
           </a:p>
           <a:p>
             <a:pPr indent="-342900" lvl="0" marL="457200" rtl="0" algn="l">
@@ -7432,31 +8088,221 @@
               <a:spcAft>
                 <a:spcPts val="0"/>
               </a:spcAft>
+              <a:buClr>
+                <a:schemeClr val="lt2"/>
+              </a:buClr>
               <a:buSzPts val="1800"/>
               <a:buAutoNum type="arabicPeriod"/>
             </a:pPr>
             <a:r>
-              <a:rPr lang="en"/>
-              <a:t>Coqa dataset</a:t>
+              <a:rPr lang="en">
+                <a:solidFill>
+                  <a:schemeClr val="lt2"/>
+                </a:solidFill>
+              </a:rPr>
+              <a:t>CoQA Dataset</a:t>
             </a:r>
-            <a:endParaRPr/>
+            <a:endParaRPr sz="1800">
+              <a:solidFill>
+                <a:schemeClr val="lt2"/>
+              </a:solidFill>
+            </a:endParaRPr>
           </a:p>
         </p:txBody>
       </p:sp>
+      <p:pic>
+        <p:nvPicPr>
+          <p:cNvPr id="93" name="Google Shape;93;p18"/>
+          <p:cNvPicPr preferRelativeResize="0"/>
+          <p:nvPr/>
+        </p:nvPicPr>
+        <p:blipFill rotWithShape="1">
+          <a:blip r:embed="rId3">
+            <a:alphaModFix/>
+          </a:blip>
+          <a:srcRect b="0" l="11245" r="0" t="52967"/>
+          <a:stretch/>
+        </p:blipFill>
+        <p:spPr>
+          <a:xfrm>
+            <a:off x="4145525" y="2981700"/>
+            <a:ext cx="4641300" cy="1666500"/>
+          </a:xfrm>
+          <a:prstGeom prst="rect">
+            <a:avLst/>
+          </a:prstGeom>
+          <a:noFill/>
+          <a:ln>
+            <a:noFill/>
+          </a:ln>
+        </p:spPr>
+      </p:pic>
+      <p:pic>
+        <p:nvPicPr>
+          <p:cNvPr id="94" name="Google Shape;94;p18"/>
+          <p:cNvPicPr preferRelativeResize="0"/>
+          <p:nvPr/>
+        </p:nvPicPr>
+        <p:blipFill rotWithShape="1">
+          <a:blip r:embed="rId4">
+            <a:alphaModFix/>
+          </a:blip>
+          <a:srcRect b="47036" l="11228" r="5846" t="4297"/>
+          <a:stretch/>
+        </p:blipFill>
+        <p:spPr>
+          <a:xfrm>
+            <a:off x="4145525" y="1257300"/>
+            <a:ext cx="4336500" cy="1724400"/>
+          </a:xfrm>
+          <a:prstGeom prst="rect">
+            <a:avLst/>
+          </a:prstGeom>
+          <a:noFill/>
+          <a:ln>
+            <a:noFill/>
+          </a:ln>
+        </p:spPr>
+      </p:pic>
+      <p:pic>
+        <p:nvPicPr>
+          <p:cNvPr id="95" name="Google Shape;95;p18"/>
+          <p:cNvPicPr preferRelativeResize="0"/>
+          <p:nvPr/>
+        </p:nvPicPr>
+        <p:blipFill rotWithShape="1">
+          <a:blip r:embed="rId5">
+            <a:alphaModFix/>
+          </a:blip>
+          <a:srcRect b="0" l="-1457" r="89562" t="0"/>
+          <a:stretch/>
+        </p:blipFill>
+        <p:spPr>
+          <a:xfrm>
+            <a:off x="3557595" y="1104900"/>
+            <a:ext cx="622025" cy="3543300"/>
+          </a:xfrm>
+          <a:prstGeom prst="rect">
+            <a:avLst/>
+          </a:prstGeom>
+          <a:noFill/>
+          <a:ln>
+            <a:noFill/>
+          </a:ln>
+        </p:spPr>
+      </p:pic>
     </p:spTree>
   </p:cSld>
   <p:clrMapOvr>
     <a:masterClrMapping/>
   </p:clrMapOvr>
+  <p:timing>
+    <p:tnLst>
+      <p:par>
+        <p:cTn dur="indefinite" nodeType="tmRoot" restart="never">
+          <p:childTnLst>
+            <p:seq concurrent="1" nextAc="seek">
+              <p:cTn dur="indefinite" id="2" nodeType="mainSeq">
+                <p:childTnLst>
+                  <p:par>
+                    <p:cTn fill="hold">
+                      <p:stCondLst>
+                        <p:cond delay="indefinite"/>
+                      </p:stCondLst>
+                      <p:childTnLst>
+                        <p:par>
+                          <p:cTn fill="hold">
+                            <p:stCondLst>
+                              <p:cond delay="0"/>
+                            </p:stCondLst>
+                            <p:childTnLst>
+                              <p:par>
+                                <p:cTn fill="hold" nodeType="clickEffect" presetClass="exit" presetID="2" presetSubtype="1">
+                                  <p:stCondLst>
+                                    <p:cond delay="0"/>
+                                  </p:stCondLst>
+                                  <p:childTnLst>
+                                    <p:anim calcmode="lin" valueType="num">
+                                      <p:cBhvr additive="base">
+                                        <p:cTn dur="3000"/>
+                                        <p:tgtEl>
+                                          <p:spTgt spid="94"/>
+                                        </p:tgtEl>
+                                        <p:attrNameLst>
+                                          <p:attrName>ppt_y</p:attrName>
+                                        </p:attrNameLst>
+                                      </p:cBhvr>
+                                      <p:tavLst>
+                                        <p:tav fmla="" tm="0">
+                                          <p:val>
+                                            <p:strVal val="#ppt_y"/>
+                                          </p:val>
+                                        </p:tav>
+                                        <p:tav fmla="" tm="100000">
+                                          <p:val>
+                                            <p:strVal val="#ppt_y-1"/>
+                                          </p:val>
+                                        </p:tav>
+                                      </p:tavLst>
+                                    </p:anim>
+                                    <p:set>
+                                      <p:cBhvr>
+                                        <p:cTn dur="1" fill="hold">
+                                          <p:stCondLst>
+                                            <p:cond delay="3000"/>
+                                          </p:stCondLst>
+                                        </p:cTn>
+                                        <p:tgtEl>
+                                          <p:spTgt spid="94"/>
+                                        </p:tgtEl>
+                                        <p:attrNameLst>
+                                          <p:attrName>style.visibility</p:attrName>
+                                        </p:attrNameLst>
+                                      </p:cBhvr>
+                                      <p:to>
+                                        <p:strVal val="hidden"/>
+                                      </p:to>
+                                    </p:set>
+                                  </p:childTnLst>
+                                </p:cTn>
+                              </p:par>
+                            </p:childTnLst>
+                          </p:cTn>
+                        </p:par>
+                      </p:childTnLst>
+                    </p:cTn>
+                  </p:par>
+                </p:childTnLst>
+              </p:cTn>
+              <p:prevCondLst>
+                <p:cond evt="onPrev">
+                  <p:tgtEl>
+                    <p:sldTgt/>
+                  </p:tgtEl>
+                </p:cond>
+              </p:prevCondLst>
+              <p:nextCondLst>
+                <p:cond evt="onNext">
+                  <p:tgtEl>
+                    <p:sldTgt/>
+                  </p:tgtEl>
+                </p:cond>
+              </p:nextCondLst>
+            </p:seq>
+          </p:childTnLst>
+        </p:cTn>
+      </p:par>
+    </p:tnLst>
+  </p:timing>
 </p:sld>
 </file>
 
-<file path=ppt/slides/slide6.xml><?xml version="1.0" encoding="utf-8"?>
+<file path=ppt/slides/slide7.xml><?xml version="1.0" encoding="utf-8"?>
 <p:sld xmlns:a="http://schemas.openxmlformats.org/drawingml/2006/main" xmlns:r="http://schemas.openxmlformats.org/officeDocument/2006/relationships" xmlns:mc="http://schemas.openxmlformats.org/markup-compatibility/2006" xmlns:mv="urn:schemas-microsoft-com:mac:vml" xmlns:p="http://schemas.openxmlformats.org/presentationml/2006/main" xmlns:c="http://schemas.openxmlformats.org/drawingml/2006/chart" xmlns:dgm="http://schemas.openxmlformats.org/drawingml/2006/diagram" xmlns:o="urn:schemas-microsoft-com:office:office" xmlns:v="urn:schemas-microsoft-com:vml" xmlns:pvml="urn:schemas-microsoft-com:office:powerpoint" xmlns:com="http://schemas.openxmlformats.org/drawingml/2006/compatibility" xmlns:p14="http://schemas.microsoft.com/office/powerpoint/2010/main" xmlns:p15="http://schemas.microsoft.com/office/powerpoint/2012/main" xmlns:ahyp="http://schemas.microsoft.com/office/drawing/2018/hyperlinkcolor">
   <p:cSld>
     <p:spTree>
       <p:nvGrpSpPr>
-        <p:cNvPr id="87" name="Shape 87"/>
+        <p:cNvPr id="99" name="Shape 99"/>
         <p:cNvGrpSpPr/>
         <p:nvPr/>
       </p:nvGrpSpPr>
@@ -7470,7 +8316,7 @@
       </p:grpSpPr>
       <p:sp>
         <p:nvSpPr>
-          <p:cNvPr id="88" name="Google Shape;88;p18"/>
+          <p:cNvPr id="100" name="Google Shape;100;p19"/>
           <p:cNvSpPr txBox="1"/>
           <p:nvPr>
             <p:ph type="title"/>
@@ -7502,6 +8348,1633 @@
             </a:pPr>
             <a:r>
               <a:rPr lang="en"/>
+              <a:t>Approach</a:t>
+            </a:r>
+            <a:endParaRPr/>
+          </a:p>
+        </p:txBody>
+      </p:sp>
+      <p:sp>
+        <p:nvSpPr>
+          <p:cNvPr id="101" name="Google Shape;101;p19"/>
+          <p:cNvSpPr txBox="1"/>
+          <p:nvPr>
+            <p:ph idx="1" type="body"/>
+          </p:nvPr>
+        </p:nvSpPr>
+        <p:spPr>
+          <a:xfrm>
+            <a:off x="311700" y="1234075"/>
+            <a:ext cx="8520600" cy="3334800"/>
+          </a:xfrm>
+          <a:prstGeom prst="rect">
+            <a:avLst/>
+          </a:prstGeom>
+        </p:spPr>
+        <p:txBody>
+          <a:bodyPr anchorCtr="0" anchor="t" bIns="91425" lIns="91425" spcFirstLastPara="1" rIns="91425" wrap="square" tIns="91425">
+            <a:normAutofit/>
+          </a:bodyPr>
+          <a:lstStyle/>
+          <a:p>
+            <a:pPr indent="-342900" lvl="0" marL="457200" rtl="0" algn="l">
+              <a:spcBef>
+                <a:spcPts val="0"/>
+              </a:spcBef>
+              <a:spcAft>
+                <a:spcPts val="0"/>
+              </a:spcAft>
+              <a:buClr>
+                <a:schemeClr val="lt2"/>
+              </a:buClr>
+              <a:buSzPts val="1800"/>
+              <a:buAutoNum type="arabicPeriod"/>
+            </a:pPr>
+            <a:r>
+              <a:rPr lang="en">
+                <a:solidFill>
+                  <a:schemeClr val="lt2"/>
+                </a:solidFill>
+              </a:rPr>
+              <a:t>Undersampling</a:t>
+            </a:r>
+            <a:endParaRPr>
+              <a:solidFill>
+                <a:schemeClr val="lt2"/>
+              </a:solidFill>
+            </a:endParaRPr>
+          </a:p>
+          <a:p>
+            <a:pPr indent="-342900" lvl="0" marL="457200" rtl="0" algn="l">
+              <a:spcBef>
+                <a:spcPts val="0"/>
+              </a:spcBef>
+              <a:spcAft>
+                <a:spcPts val="0"/>
+              </a:spcAft>
+              <a:buSzPts val="1800"/>
+              <a:buAutoNum type="arabicPeriod"/>
+            </a:pPr>
+            <a:r>
+              <a:rPr lang="en" sz="1800"/>
+              <a:t>Question generation</a:t>
+            </a:r>
+            <a:endParaRPr sz="1800"/>
+          </a:p>
+          <a:p>
+            <a:pPr indent="-342900" lvl="0" marL="457200" rtl="0" algn="l">
+              <a:spcBef>
+                <a:spcPts val="0"/>
+              </a:spcBef>
+              <a:spcAft>
+                <a:spcPts val="0"/>
+              </a:spcAft>
+              <a:buClr>
+                <a:schemeClr val="lt2"/>
+              </a:buClr>
+              <a:buSzPts val="1800"/>
+              <a:buAutoNum type="arabicPeriod"/>
+            </a:pPr>
+            <a:r>
+              <a:rPr lang="en">
+                <a:solidFill>
+                  <a:schemeClr val="lt2"/>
+                </a:solidFill>
+              </a:rPr>
+              <a:t>CoQA Dataset</a:t>
+            </a:r>
+            <a:endParaRPr>
+              <a:solidFill>
+                <a:schemeClr val="lt2"/>
+              </a:solidFill>
+            </a:endParaRPr>
+          </a:p>
+        </p:txBody>
+      </p:sp>
+      <p:pic>
+        <p:nvPicPr>
+          <p:cNvPr id="102" name="Google Shape;102;p19"/>
+          <p:cNvPicPr preferRelativeResize="0"/>
+          <p:nvPr/>
+        </p:nvPicPr>
+        <p:blipFill rotWithShape="1">
+          <a:blip r:embed="rId3">
+            <a:alphaModFix/>
+          </a:blip>
+          <a:srcRect b="-24762" l="14954" r="10273" t="100000"/>
+          <a:stretch/>
+        </p:blipFill>
+        <p:spPr>
+          <a:xfrm>
+            <a:off x="3653825" y="2818750"/>
+            <a:ext cx="3909601" cy="877400"/>
+          </a:xfrm>
+          <a:prstGeom prst="rect">
+            <a:avLst/>
+          </a:prstGeom>
+          <a:noFill/>
+          <a:ln>
+            <a:noFill/>
+          </a:ln>
+        </p:spPr>
+      </p:pic>
+      <p:sp>
+        <p:nvSpPr>
+          <p:cNvPr id="103" name="Google Shape;103;p19"/>
+          <p:cNvSpPr/>
+          <p:nvPr/>
+        </p:nvSpPr>
+        <p:spPr>
+          <a:xfrm>
+            <a:off x="5428400" y="548275"/>
+            <a:ext cx="1497300" cy="429900"/>
+          </a:xfrm>
+          <a:prstGeom prst="rect">
+            <a:avLst/>
+          </a:prstGeom>
+          <a:solidFill>
+            <a:srgbClr val="7ECFE5"/>
+          </a:solidFill>
+          <a:ln cap="flat" cmpd="sng" w="9525">
+            <a:solidFill>
+              <a:schemeClr val="dk2"/>
+            </a:solidFill>
+            <a:prstDash val="solid"/>
+            <a:round/>
+            <a:headEnd len="sm" w="sm" type="none"/>
+            <a:tailEnd len="sm" w="sm" type="none"/>
+          </a:ln>
+        </p:spPr>
+        <p:txBody>
+          <a:bodyPr anchorCtr="0" anchor="ctr" bIns="91425" lIns="91425" spcFirstLastPara="1" rIns="91425" wrap="square" tIns="91425">
+            <a:noAutofit/>
+          </a:bodyPr>
+          <a:lstStyle/>
+          <a:p>
+            <a:pPr indent="0" lvl="0" marL="0" rtl="0" algn="ctr">
+              <a:spcBef>
+                <a:spcPts val="0"/>
+              </a:spcBef>
+              <a:spcAft>
+                <a:spcPts val="0"/>
+              </a:spcAft>
+              <a:buNone/>
+            </a:pPr>
+            <a:r>
+              <a:rPr b="1" lang="en" sz="2000"/>
+              <a:t>Passage</a:t>
+            </a:r>
+            <a:endParaRPr b="1" sz="2000"/>
+          </a:p>
+        </p:txBody>
+      </p:sp>
+      <p:sp>
+        <p:nvSpPr>
+          <p:cNvPr id="104" name="Google Shape;104;p19"/>
+          <p:cNvSpPr/>
+          <p:nvPr/>
+        </p:nvSpPr>
+        <p:spPr>
+          <a:xfrm>
+            <a:off x="6461600" y="2850425"/>
+            <a:ext cx="1497300" cy="429900"/>
+          </a:xfrm>
+          <a:prstGeom prst="rect">
+            <a:avLst/>
+          </a:prstGeom>
+          <a:solidFill>
+            <a:srgbClr val="7ECFE5"/>
+          </a:solidFill>
+          <a:ln cap="flat" cmpd="sng" w="9525">
+            <a:solidFill>
+              <a:schemeClr val="dk2"/>
+            </a:solidFill>
+            <a:prstDash val="solid"/>
+            <a:round/>
+            <a:headEnd len="sm" w="sm" type="none"/>
+            <a:tailEnd len="sm" w="sm" type="none"/>
+          </a:ln>
+        </p:spPr>
+        <p:txBody>
+          <a:bodyPr anchorCtr="0" anchor="ctr" bIns="91425" lIns="91425" spcFirstLastPara="1" rIns="91425" wrap="square" tIns="91425">
+            <a:noAutofit/>
+          </a:bodyPr>
+          <a:lstStyle/>
+          <a:p>
+            <a:pPr indent="0" lvl="0" marL="0" rtl="0" algn="ctr">
+              <a:spcBef>
+                <a:spcPts val="0"/>
+              </a:spcBef>
+              <a:spcAft>
+                <a:spcPts val="0"/>
+              </a:spcAft>
+              <a:buNone/>
+            </a:pPr>
+            <a:r>
+              <a:rPr b="1" lang="en" sz="2000"/>
+              <a:t>Answer</a:t>
+            </a:r>
+            <a:endParaRPr b="1" sz="2000"/>
+          </a:p>
+        </p:txBody>
+      </p:sp>
+      <p:sp>
+        <p:nvSpPr>
+          <p:cNvPr id="105" name="Google Shape;105;p19"/>
+          <p:cNvSpPr/>
+          <p:nvPr/>
+        </p:nvSpPr>
+        <p:spPr>
+          <a:xfrm>
+            <a:off x="4464500" y="2850425"/>
+            <a:ext cx="1497300" cy="429900"/>
+          </a:xfrm>
+          <a:prstGeom prst="rect">
+            <a:avLst/>
+          </a:prstGeom>
+          <a:solidFill>
+            <a:srgbClr val="7ECFE5"/>
+          </a:solidFill>
+          <a:ln cap="flat" cmpd="sng" w="9525">
+            <a:solidFill>
+              <a:schemeClr val="dk2"/>
+            </a:solidFill>
+            <a:prstDash val="solid"/>
+            <a:round/>
+            <a:headEnd len="sm" w="sm" type="none"/>
+            <a:tailEnd len="sm" w="sm" type="none"/>
+          </a:ln>
+        </p:spPr>
+        <p:txBody>
+          <a:bodyPr anchorCtr="0" anchor="ctr" bIns="91425" lIns="91425" spcFirstLastPara="1" rIns="91425" wrap="square" tIns="91425">
+            <a:noAutofit/>
+          </a:bodyPr>
+          <a:lstStyle/>
+          <a:p>
+            <a:pPr indent="0" lvl="0" marL="0" rtl="0" algn="ctr">
+              <a:spcBef>
+                <a:spcPts val="0"/>
+              </a:spcBef>
+              <a:spcAft>
+                <a:spcPts val="0"/>
+              </a:spcAft>
+              <a:buNone/>
+            </a:pPr>
+            <a:r>
+              <a:rPr b="1" lang="en" sz="2000"/>
+              <a:t>Question</a:t>
+            </a:r>
+            <a:endParaRPr b="1" sz="2000"/>
+          </a:p>
+        </p:txBody>
+      </p:sp>
+      <p:sp>
+        <p:nvSpPr>
+          <p:cNvPr id="106" name="Google Shape;106;p19"/>
+          <p:cNvSpPr/>
+          <p:nvPr/>
+        </p:nvSpPr>
+        <p:spPr>
+          <a:xfrm>
+            <a:off x="5369300" y="1399350"/>
+            <a:ext cx="1615500" cy="877500"/>
+          </a:xfrm>
+          <a:prstGeom prst="roundRect">
+            <a:avLst>
+              <a:gd fmla="val 16667" name="adj"/>
+            </a:avLst>
+          </a:prstGeom>
+          <a:solidFill>
+            <a:srgbClr val="FFD966"/>
+          </a:solidFill>
+          <a:ln cap="flat" cmpd="sng" w="9525">
+            <a:solidFill>
+              <a:schemeClr val="dk2"/>
+            </a:solidFill>
+            <a:prstDash val="solid"/>
+            <a:round/>
+            <a:headEnd len="sm" w="sm" type="none"/>
+            <a:tailEnd len="sm" w="sm" type="none"/>
+          </a:ln>
+        </p:spPr>
+        <p:txBody>
+          <a:bodyPr anchorCtr="0" anchor="ctr" bIns="91425" lIns="91425" spcFirstLastPara="1" rIns="91425" wrap="square" tIns="91425">
+            <a:noAutofit/>
+          </a:bodyPr>
+          <a:lstStyle/>
+          <a:p>
+            <a:pPr indent="0" lvl="0" marL="0" rtl="0" algn="ctr">
+              <a:spcBef>
+                <a:spcPts val="0"/>
+              </a:spcBef>
+              <a:spcAft>
+                <a:spcPts val="0"/>
+              </a:spcAft>
+              <a:buNone/>
+            </a:pPr>
+            <a:r>
+              <a:rPr b="1" lang="en" sz="2000">
+                <a:solidFill>
+                  <a:schemeClr val="dk2"/>
+                </a:solidFill>
+              </a:rPr>
+              <a:t>Q/A Generator</a:t>
+            </a:r>
+            <a:endParaRPr/>
+          </a:p>
+        </p:txBody>
+      </p:sp>
+      <p:cxnSp>
+        <p:nvCxnSpPr>
+          <p:cNvPr id="107" name="Google Shape;107;p19"/>
+          <p:cNvCxnSpPr>
+            <a:stCxn id="103" idx="2"/>
+            <a:endCxn id="106" idx="0"/>
+          </p:cNvCxnSpPr>
+          <p:nvPr/>
+        </p:nvCxnSpPr>
+        <p:spPr>
+          <a:xfrm>
+            <a:off x="6177050" y="978175"/>
+            <a:ext cx="0" cy="421200"/>
+          </a:xfrm>
+          <a:prstGeom prst="straightConnector1">
+            <a:avLst/>
+          </a:prstGeom>
+          <a:noFill/>
+          <a:ln cap="flat" cmpd="sng" w="9525">
+            <a:solidFill>
+              <a:schemeClr val="dk2"/>
+            </a:solidFill>
+            <a:prstDash val="solid"/>
+            <a:round/>
+            <a:headEnd len="med" w="med" type="none"/>
+            <a:tailEnd len="med" w="med" type="triangle"/>
+          </a:ln>
+        </p:spPr>
+      </p:cxnSp>
+      <p:cxnSp>
+        <p:nvCxnSpPr>
+          <p:cNvPr id="108" name="Google Shape;108;p19"/>
+          <p:cNvCxnSpPr>
+            <a:stCxn id="106" idx="2"/>
+            <a:endCxn id="105" idx="0"/>
+          </p:cNvCxnSpPr>
+          <p:nvPr/>
+        </p:nvCxnSpPr>
+        <p:spPr>
+          <a:xfrm flipH="1">
+            <a:off x="5213150" y="2276850"/>
+            <a:ext cx="963900" cy="573600"/>
+          </a:xfrm>
+          <a:prstGeom prst="straightConnector1">
+            <a:avLst/>
+          </a:prstGeom>
+          <a:noFill/>
+          <a:ln cap="flat" cmpd="sng" w="9525">
+            <a:solidFill>
+              <a:schemeClr val="dk2"/>
+            </a:solidFill>
+            <a:prstDash val="solid"/>
+            <a:round/>
+            <a:headEnd len="med" w="med" type="none"/>
+            <a:tailEnd len="med" w="med" type="triangle"/>
+          </a:ln>
+        </p:spPr>
+      </p:cxnSp>
+      <p:cxnSp>
+        <p:nvCxnSpPr>
+          <p:cNvPr id="109" name="Google Shape;109;p19"/>
+          <p:cNvCxnSpPr>
+            <a:stCxn id="106" idx="2"/>
+            <a:endCxn id="104" idx="0"/>
+          </p:cNvCxnSpPr>
+          <p:nvPr/>
+        </p:nvCxnSpPr>
+        <p:spPr>
+          <a:xfrm>
+            <a:off x="6177050" y="2276850"/>
+            <a:ext cx="1033200" cy="573600"/>
+          </a:xfrm>
+          <a:prstGeom prst="straightConnector1">
+            <a:avLst/>
+          </a:prstGeom>
+          <a:noFill/>
+          <a:ln cap="flat" cmpd="sng" w="9525">
+            <a:solidFill>
+              <a:schemeClr val="dk2"/>
+            </a:solidFill>
+            <a:prstDash val="solid"/>
+            <a:round/>
+            <a:headEnd len="med" w="med" type="none"/>
+            <a:tailEnd len="med" w="med" type="triangle"/>
+          </a:ln>
+        </p:spPr>
+      </p:cxnSp>
+      <p:sp>
+        <p:nvSpPr>
+          <p:cNvPr id="110" name="Google Shape;110;p19"/>
+          <p:cNvSpPr/>
+          <p:nvPr/>
+        </p:nvSpPr>
+        <p:spPr>
+          <a:xfrm>
+            <a:off x="3931100" y="3702700"/>
+            <a:ext cx="4596400" cy="429900"/>
+          </a:xfrm>
+          <a:prstGeom prst="flowChartInputOutput">
+            <a:avLst/>
+          </a:prstGeom>
+          <a:solidFill>
+            <a:srgbClr val="FFE599"/>
+          </a:solidFill>
+          <a:ln cap="flat" cmpd="sng" w="9525">
+            <a:solidFill>
+              <a:schemeClr val="dk2"/>
+            </a:solidFill>
+            <a:prstDash val="solid"/>
+            <a:round/>
+            <a:headEnd len="sm" w="sm" type="none"/>
+            <a:tailEnd len="sm" w="sm" type="none"/>
+          </a:ln>
+        </p:spPr>
+        <p:txBody>
+          <a:bodyPr anchorCtr="0" anchor="ctr" bIns="91425" lIns="91425" spcFirstLastPara="1" rIns="91425" wrap="square" tIns="91425">
+            <a:noAutofit/>
+          </a:bodyPr>
+          <a:lstStyle/>
+          <a:p>
+            <a:pPr indent="0" lvl="0" marL="0" rtl="0" algn="ctr">
+              <a:spcBef>
+                <a:spcPts val="0"/>
+              </a:spcBef>
+              <a:spcAft>
+                <a:spcPts val="0"/>
+              </a:spcAft>
+              <a:buNone/>
+            </a:pPr>
+            <a:r>
+              <a:rPr b="1" lang="en" sz="1800"/>
+              <a:t>Filter</a:t>
+            </a:r>
+            <a:endParaRPr b="1" sz="1800"/>
+          </a:p>
+        </p:txBody>
+      </p:sp>
+      <p:sp>
+        <p:nvSpPr>
+          <p:cNvPr id="111" name="Google Shape;111;p19"/>
+          <p:cNvSpPr/>
+          <p:nvPr/>
+        </p:nvSpPr>
+        <p:spPr>
+          <a:xfrm>
+            <a:off x="3479700" y="4361400"/>
+            <a:ext cx="5358900" cy="401100"/>
+          </a:xfrm>
+          <a:prstGeom prst="rect">
+            <a:avLst/>
+          </a:prstGeom>
+          <a:solidFill>
+            <a:srgbClr val="7ECFE5"/>
+          </a:solidFill>
+          <a:ln cap="flat" cmpd="sng" w="9525">
+            <a:solidFill>
+              <a:schemeClr val="dk2"/>
+            </a:solidFill>
+            <a:prstDash val="solid"/>
+            <a:round/>
+            <a:headEnd len="sm" w="sm" type="none"/>
+            <a:tailEnd len="sm" w="sm" type="none"/>
+          </a:ln>
+        </p:spPr>
+        <p:txBody>
+          <a:bodyPr anchorCtr="0" anchor="ctr" bIns="91425" lIns="91425" spcFirstLastPara="1" rIns="91425" wrap="square" tIns="91425">
+            <a:noAutofit/>
+          </a:bodyPr>
+          <a:lstStyle/>
+          <a:p>
+            <a:pPr indent="0" lvl="0" marL="0" rtl="0" algn="l">
+              <a:spcBef>
+                <a:spcPts val="0"/>
+              </a:spcBef>
+              <a:spcAft>
+                <a:spcPts val="0"/>
+              </a:spcAft>
+              <a:buNone/>
+            </a:pPr>
+            <a:r>
+              <a:rPr b="1" lang="en" sz="2000"/>
+              <a:t>Under-represented Question-Answer Pairs</a:t>
+            </a:r>
+            <a:endParaRPr b="1" sz="2000"/>
+          </a:p>
+        </p:txBody>
+      </p:sp>
+      <p:cxnSp>
+        <p:nvCxnSpPr>
+          <p:cNvPr id="112" name="Google Shape;112;p19"/>
+          <p:cNvCxnSpPr/>
+          <p:nvPr/>
+        </p:nvCxnSpPr>
+        <p:spPr>
+          <a:xfrm>
+            <a:off x="6225200" y="3141075"/>
+            <a:ext cx="4200" cy="485400"/>
+          </a:xfrm>
+          <a:prstGeom prst="straightConnector1">
+            <a:avLst/>
+          </a:prstGeom>
+          <a:noFill/>
+          <a:ln cap="flat" cmpd="sng" w="9525">
+            <a:solidFill>
+              <a:schemeClr val="dk2"/>
+            </a:solidFill>
+            <a:prstDash val="solid"/>
+            <a:round/>
+            <a:headEnd len="med" w="med" type="none"/>
+            <a:tailEnd len="med" w="med" type="triangle"/>
+          </a:ln>
+        </p:spPr>
+      </p:cxnSp>
+    </p:spTree>
+  </p:cSld>
+  <p:clrMapOvr>
+    <a:masterClrMapping/>
+  </p:clrMapOvr>
+  <p:timing>
+    <p:tnLst>
+      <p:par>
+        <p:cTn dur="indefinite" nodeType="tmRoot" restart="never">
+          <p:childTnLst>
+            <p:seq concurrent="1" nextAc="seek">
+              <p:cTn dur="indefinite" id="2" nodeType="mainSeq">
+                <p:childTnLst>
+                  <p:par>
+                    <p:cTn fill="hold">
+                      <p:stCondLst>
+                        <p:cond delay="indefinite"/>
+                      </p:stCondLst>
+                      <p:childTnLst>
+                        <p:par>
+                          <p:cTn fill="hold">
+                            <p:stCondLst>
+                              <p:cond delay="0"/>
+                            </p:stCondLst>
+                            <p:childTnLst>
+                              <p:par>
+                                <p:cTn fill="hold" nodeType="clickEffect" presetClass="entr" presetID="2" presetSubtype="1">
+                                  <p:stCondLst>
+                                    <p:cond delay="0"/>
+                                  </p:stCondLst>
+                                  <p:childTnLst>
+                                    <p:set>
+                                      <p:cBhvr>
+                                        <p:cTn dur="1" fill="hold">
+                                          <p:stCondLst>
+                                            <p:cond delay="0"/>
+                                          </p:stCondLst>
+                                        </p:cTn>
+                                        <p:tgtEl>
+                                          <p:spTgt spid="103"/>
+                                        </p:tgtEl>
+                                        <p:attrNameLst>
+                                          <p:attrName>style.visibility</p:attrName>
+                                        </p:attrNameLst>
+                                      </p:cBhvr>
+                                      <p:to>
+                                        <p:strVal val="visible"/>
+                                      </p:to>
+                                    </p:set>
+                                    <p:anim calcmode="lin" valueType="num">
+                                      <p:cBhvr additive="base">
+                                        <p:cTn dur="1000"/>
+                                        <p:tgtEl>
+                                          <p:spTgt spid="103"/>
+                                        </p:tgtEl>
+                                        <p:attrNameLst>
+                                          <p:attrName>ppt_y</p:attrName>
+                                        </p:attrNameLst>
+                                      </p:cBhvr>
+                                      <p:tavLst>
+                                        <p:tav fmla="" tm="0">
+                                          <p:val>
+                                            <p:strVal val="#ppt_y-1"/>
+                                          </p:val>
+                                        </p:tav>
+                                        <p:tav fmla="" tm="100000">
+                                          <p:val>
+                                            <p:strVal val="#ppt_y"/>
+                                          </p:val>
+                                        </p:tav>
+                                      </p:tavLst>
+                                    </p:anim>
+                                  </p:childTnLst>
+                                </p:cTn>
+                              </p:par>
+                              <p:par>
+                                <p:cTn fill="hold" nodeType="withEffect" presetClass="entr" presetID="2" presetSubtype="1">
+                                  <p:stCondLst>
+                                    <p:cond delay="0"/>
+                                  </p:stCondLst>
+                                  <p:childTnLst>
+                                    <p:set>
+                                      <p:cBhvr>
+                                        <p:cTn dur="1" fill="hold">
+                                          <p:stCondLst>
+                                            <p:cond delay="0"/>
+                                          </p:stCondLst>
+                                        </p:cTn>
+                                        <p:tgtEl>
+                                          <p:spTgt spid="107"/>
+                                        </p:tgtEl>
+                                        <p:attrNameLst>
+                                          <p:attrName>style.visibility</p:attrName>
+                                        </p:attrNameLst>
+                                      </p:cBhvr>
+                                      <p:to>
+                                        <p:strVal val="visible"/>
+                                      </p:to>
+                                    </p:set>
+                                    <p:anim calcmode="lin" valueType="num">
+                                      <p:cBhvr additive="base">
+                                        <p:cTn dur="1000"/>
+                                        <p:tgtEl>
+                                          <p:spTgt spid="107"/>
+                                        </p:tgtEl>
+                                        <p:attrNameLst>
+                                          <p:attrName>ppt_y</p:attrName>
+                                        </p:attrNameLst>
+                                      </p:cBhvr>
+                                      <p:tavLst>
+                                        <p:tav fmla="" tm="0">
+                                          <p:val>
+                                            <p:strVal val="#ppt_y-1"/>
+                                          </p:val>
+                                        </p:tav>
+                                        <p:tav fmla="" tm="100000">
+                                          <p:val>
+                                            <p:strVal val="#ppt_y"/>
+                                          </p:val>
+                                        </p:tav>
+                                      </p:tavLst>
+                                    </p:anim>
+                                  </p:childTnLst>
+                                </p:cTn>
+                              </p:par>
+                            </p:childTnLst>
+                          </p:cTn>
+                        </p:par>
+                      </p:childTnLst>
+                    </p:cTn>
+                  </p:par>
+                  <p:par>
+                    <p:cTn fill="hold">
+                      <p:stCondLst>
+                        <p:cond delay="indefinite"/>
+                      </p:stCondLst>
+                      <p:childTnLst>
+                        <p:par>
+                          <p:cTn fill="hold">
+                            <p:stCondLst>
+                              <p:cond delay="0"/>
+                            </p:stCondLst>
+                            <p:childTnLst>
+                              <p:par>
+                                <p:cTn fill="hold" nodeType="clickEffect" presetClass="emph" presetID="8" presetSubtype="0">
+                                  <p:stCondLst>
+                                    <p:cond delay="0"/>
+                                  </p:stCondLst>
+                                  <p:childTnLst>
+                                    <p:animRot by="-21600000">
+                                      <p:cBhvr>
+                                        <p:cTn dur="1000" fill="hold"/>
+                                        <p:tgtEl>
+                                          <p:spTgt spid="106"/>
+                                        </p:tgtEl>
+                                        <p:attrNameLst>
+                                          <p:attrName>r</p:attrName>
+                                        </p:attrNameLst>
+                                      </p:cBhvr>
+                                    </p:animRot>
+                                  </p:childTnLst>
+                                </p:cTn>
+                              </p:par>
+                            </p:childTnLst>
+                          </p:cTn>
+                        </p:par>
+                      </p:childTnLst>
+                    </p:cTn>
+                  </p:par>
+                  <p:par>
+                    <p:cTn fill="hold">
+                      <p:stCondLst>
+                        <p:cond delay="indefinite"/>
+                      </p:stCondLst>
+                      <p:childTnLst>
+                        <p:par>
+                          <p:cTn fill="hold">
+                            <p:stCondLst>
+                              <p:cond delay="0"/>
+                            </p:stCondLst>
+                            <p:childTnLst>
+                              <p:par>
+                                <p:cTn fill="hold" nodeType="clickEffect" presetClass="entr" presetID="10" presetSubtype="0">
+                                  <p:stCondLst>
+                                    <p:cond delay="0"/>
+                                  </p:stCondLst>
+                                  <p:childTnLst>
+                                    <p:set>
+                                      <p:cBhvr>
+                                        <p:cTn dur="1" fill="hold">
+                                          <p:stCondLst>
+                                            <p:cond delay="0"/>
+                                          </p:stCondLst>
+                                        </p:cTn>
+                                        <p:tgtEl>
+                                          <p:spTgt spid="105"/>
+                                        </p:tgtEl>
+                                        <p:attrNameLst>
+                                          <p:attrName>style.visibility</p:attrName>
+                                        </p:attrNameLst>
+                                      </p:cBhvr>
+                                      <p:to>
+                                        <p:strVal val="visible"/>
+                                      </p:to>
+                                    </p:set>
+                                    <p:animEffect filter="fade" transition="in">
+                                      <p:cBhvr>
+                                        <p:cTn dur="1000"/>
+                                        <p:tgtEl>
+                                          <p:spTgt spid="105"/>
+                                        </p:tgtEl>
+                                      </p:cBhvr>
+                                    </p:animEffect>
+                                  </p:childTnLst>
+                                </p:cTn>
+                              </p:par>
+                              <p:par>
+                                <p:cTn fill="hold" nodeType="withEffect" presetClass="entr" presetID="10" presetSubtype="0">
+                                  <p:stCondLst>
+                                    <p:cond delay="0"/>
+                                  </p:stCondLst>
+                                  <p:childTnLst>
+                                    <p:set>
+                                      <p:cBhvr>
+                                        <p:cTn dur="1" fill="hold">
+                                          <p:stCondLst>
+                                            <p:cond delay="0"/>
+                                          </p:stCondLst>
+                                        </p:cTn>
+                                        <p:tgtEl>
+                                          <p:spTgt spid="108"/>
+                                        </p:tgtEl>
+                                        <p:attrNameLst>
+                                          <p:attrName>style.visibility</p:attrName>
+                                        </p:attrNameLst>
+                                      </p:cBhvr>
+                                      <p:to>
+                                        <p:strVal val="visible"/>
+                                      </p:to>
+                                    </p:set>
+                                    <p:animEffect filter="fade" transition="in">
+                                      <p:cBhvr>
+                                        <p:cTn dur="1000"/>
+                                        <p:tgtEl>
+                                          <p:spTgt spid="108"/>
+                                        </p:tgtEl>
+                                      </p:cBhvr>
+                                    </p:animEffect>
+                                  </p:childTnLst>
+                                </p:cTn>
+                              </p:par>
+                              <p:par>
+                                <p:cTn fill="hold" nodeType="withEffect" presetClass="entr" presetID="10" presetSubtype="0">
+                                  <p:stCondLst>
+                                    <p:cond delay="0"/>
+                                  </p:stCondLst>
+                                  <p:childTnLst>
+                                    <p:set>
+                                      <p:cBhvr>
+                                        <p:cTn dur="1" fill="hold">
+                                          <p:stCondLst>
+                                            <p:cond delay="0"/>
+                                          </p:stCondLst>
+                                        </p:cTn>
+                                        <p:tgtEl>
+                                          <p:spTgt spid="109"/>
+                                        </p:tgtEl>
+                                        <p:attrNameLst>
+                                          <p:attrName>style.visibility</p:attrName>
+                                        </p:attrNameLst>
+                                      </p:cBhvr>
+                                      <p:to>
+                                        <p:strVal val="visible"/>
+                                      </p:to>
+                                    </p:set>
+                                    <p:animEffect filter="fade" transition="in">
+                                      <p:cBhvr>
+                                        <p:cTn dur="1000"/>
+                                        <p:tgtEl>
+                                          <p:spTgt spid="109"/>
+                                        </p:tgtEl>
+                                      </p:cBhvr>
+                                    </p:animEffect>
+                                  </p:childTnLst>
+                                </p:cTn>
+                              </p:par>
+                              <p:par>
+                                <p:cTn fill="hold" nodeType="withEffect" presetClass="entr" presetID="10" presetSubtype="0">
+                                  <p:stCondLst>
+                                    <p:cond delay="0"/>
+                                  </p:stCondLst>
+                                  <p:childTnLst>
+                                    <p:set>
+                                      <p:cBhvr>
+                                        <p:cTn dur="1" fill="hold">
+                                          <p:stCondLst>
+                                            <p:cond delay="0"/>
+                                          </p:stCondLst>
+                                        </p:cTn>
+                                        <p:tgtEl>
+                                          <p:spTgt spid="104"/>
+                                        </p:tgtEl>
+                                        <p:attrNameLst>
+                                          <p:attrName>style.visibility</p:attrName>
+                                        </p:attrNameLst>
+                                      </p:cBhvr>
+                                      <p:to>
+                                        <p:strVal val="visible"/>
+                                      </p:to>
+                                    </p:set>
+                                    <p:animEffect filter="fade" transition="in">
+                                      <p:cBhvr>
+                                        <p:cTn dur="1000"/>
+                                        <p:tgtEl>
+                                          <p:spTgt spid="104"/>
+                                        </p:tgtEl>
+                                      </p:cBhvr>
+                                    </p:animEffect>
+                                  </p:childTnLst>
+                                </p:cTn>
+                              </p:par>
+                            </p:childTnLst>
+                          </p:cTn>
+                        </p:par>
+                      </p:childTnLst>
+                    </p:cTn>
+                  </p:par>
+                  <p:par>
+                    <p:cTn fill="hold">
+                      <p:stCondLst>
+                        <p:cond delay="indefinite"/>
+                      </p:stCondLst>
+                      <p:childTnLst>
+                        <p:par>
+                          <p:cTn fill="hold">
+                            <p:stCondLst>
+                              <p:cond delay="0"/>
+                            </p:stCondLst>
+                            <p:childTnLst>
+                              <p:par>
+                                <p:cTn fill="hold" nodeType="clickEffect" presetClass="entr" presetID="10" presetSubtype="0">
+                                  <p:stCondLst>
+                                    <p:cond delay="0"/>
+                                  </p:stCondLst>
+                                  <p:childTnLst>
+                                    <p:set>
+                                      <p:cBhvr>
+                                        <p:cTn dur="1" fill="hold">
+                                          <p:stCondLst>
+                                            <p:cond delay="0"/>
+                                          </p:stCondLst>
+                                        </p:cTn>
+                                        <p:tgtEl>
+                                          <p:spTgt spid="112"/>
+                                        </p:tgtEl>
+                                        <p:attrNameLst>
+                                          <p:attrName>style.visibility</p:attrName>
+                                        </p:attrNameLst>
+                                      </p:cBhvr>
+                                      <p:to>
+                                        <p:strVal val="visible"/>
+                                      </p:to>
+                                    </p:set>
+                                    <p:animEffect filter="fade" transition="in">
+                                      <p:cBhvr>
+                                        <p:cTn dur="1000"/>
+                                        <p:tgtEl>
+                                          <p:spTgt spid="112"/>
+                                        </p:tgtEl>
+                                      </p:cBhvr>
+                                    </p:animEffect>
+                                  </p:childTnLst>
+                                </p:cTn>
+                              </p:par>
+                              <p:par>
+                                <p:cTn fill="hold" nodeType="withEffect" presetClass="entr" presetID="23" presetSubtype="16">
+                                  <p:stCondLst>
+                                    <p:cond delay="0"/>
+                                  </p:stCondLst>
+                                  <p:childTnLst>
+                                    <p:set>
+                                      <p:cBhvr>
+                                        <p:cTn dur="1" fill="hold">
+                                          <p:stCondLst>
+                                            <p:cond delay="0"/>
+                                          </p:stCondLst>
+                                        </p:cTn>
+                                        <p:tgtEl>
+                                          <p:spTgt spid="110"/>
+                                        </p:tgtEl>
+                                        <p:attrNameLst>
+                                          <p:attrName>style.visibility</p:attrName>
+                                        </p:attrNameLst>
+                                      </p:cBhvr>
+                                      <p:to>
+                                        <p:strVal val="visible"/>
+                                      </p:to>
+                                    </p:set>
+                                    <p:anim calcmode="lin" valueType="num">
+                                      <p:cBhvr additive="base">
+                                        <p:cTn dur="1000"/>
+                                        <p:tgtEl>
+                                          <p:spTgt spid="110"/>
+                                        </p:tgtEl>
+                                        <p:attrNameLst>
+                                          <p:attrName>ppt_w</p:attrName>
+                                        </p:attrNameLst>
+                                      </p:cBhvr>
+                                      <p:tavLst>
+                                        <p:tav fmla="" tm="0">
+                                          <p:val>
+                                            <p:strVal val="0"/>
+                                          </p:val>
+                                        </p:tav>
+                                        <p:tav fmla="" tm="100000">
+                                          <p:val>
+                                            <p:strVal val="#ppt_w"/>
+                                          </p:val>
+                                        </p:tav>
+                                      </p:tavLst>
+                                    </p:anim>
+                                    <p:anim calcmode="lin" valueType="num">
+                                      <p:cBhvr additive="base">
+                                        <p:cTn dur="1000"/>
+                                        <p:tgtEl>
+                                          <p:spTgt spid="110"/>
+                                        </p:tgtEl>
+                                        <p:attrNameLst>
+                                          <p:attrName>ppt_h</p:attrName>
+                                        </p:attrNameLst>
+                                      </p:cBhvr>
+                                      <p:tavLst>
+                                        <p:tav fmla="" tm="0">
+                                          <p:val>
+                                            <p:strVal val="0"/>
+                                          </p:val>
+                                        </p:tav>
+                                        <p:tav fmla="" tm="100000">
+                                          <p:val>
+                                            <p:strVal val="#ppt_h"/>
+                                          </p:val>
+                                        </p:tav>
+                                      </p:tavLst>
+                                    </p:anim>
+                                  </p:childTnLst>
+                                </p:cTn>
+                              </p:par>
+                            </p:childTnLst>
+                          </p:cTn>
+                        </p:par>
+                      </p:childTnLst>
+                    </p:cTn>
+                  </p:par>
+                  <p:par>
+                    <p:cTn fill="hold">
+                      <p:stCondLst>
+                        <p:cond delay="indefinite"/>
+                      </p:stCondLst>
+                      <p:childTnLst>
+                        <p:par>
+                          <p:cTn fill="hold">
+                            <p:stCondLst>
+                              <p:cond delay="0"/>
+                            </p:stCondLst>
+                            <p:childTnLst>
+                              <p:par>
+                                <p:cTn fill="hold" nodeType="clickEffect" presetClass="entr" presetID="10" presetSubtype="0">
+                                  <p:stCondLst>
+                                    <p:cond delay="0"/>
+                                  </p:stCondLst>
+                                  <p:childTnLst>
+                                    <p:set>
+                                      <p:cBhvr>
+                                        <p:cTn dur="1" fill="hold">
+                                          <p:stCondLst>
+                                            <p:cond delay="0"/>
+                                          </p:stCondLst>
+                                        </p:cTn>
+                                        <p:tgtEl>
+                                          <p:spTgt spid="111"/>
+                                        </p:tgtEl>
+                                        <p:attrNameLst>
+                                          <p:attrName>style.visibility</p:attrName>
+                                        </p:attrNameLst>
+                                      </p:cBhvr>
+                                      <p:to>
+                                        <p:strVal val="visible"/>
+                                      </p:to>
+                                    </p:set>
+                                    <p:animEffect filter="fade" transition="in">
+                                      <p:cBhvr>
+                                        <p:cTn dur="1000"/>
+                                        <p:tgtEl>
+                                          <p:spTgt spid="111"/>
+                                        </p:tgtEl>
+                                      </p:cBhvr>
+                                    </p:animEffect>
+                                  </p:childTnLst>
+                                </p:cTn>
+                              </p:par>
+                            </p:childTnLst>
+                          </p:cTn>
+                        </p:par>
+                      </p:childTnLst>
+                    </p:cTn>
+                  </p:par>
+                </p:childTnLst>
+              </p:cTn>
+              <p:prevCondLst>
+                <p:cond evt="onPrev">
+                  <p:tgtEl>
+                    <p:sldTgt/>
+                  </p:tgtEl>
+                </p:cond>
+              </p:prevCondLst>
+              <p:nextCondLst>
+                <p:cond evt="onNext">
+                  <p:tgtEl>
+                    <p:sldTgt/>
+                  </p:tgtEl>
+                </p:cond>
+              </p:nextCondLst>
+            </p:seq>
+          </p:childTnLst>
+        </p:cTn>
+      </p:par>
+    </p:tnLst>
+  </p:timing>
+</p:sld>
+</file>
+
+<file path=ppt/slides/slide8.xml><?xml version="1.0" encoding="utf-8"?>
+<p:sld xmlns:a="http://schemas.openxmlformats.org/drawingml/2006/main" xmlns:r="http://schemas.openxmlformats.org/officeDocument/2006/relationships" xmlns:mc="http://schemas.openxmlformats.org/markup-compatibility/2006" xmlns:mv="urn:schemas-microsoft-com:mac:vml" xmlns:p="http://schemas.openxmlformats.org/presentationml/2006/main" xmlns:c="http://schemas.openxmlformats.org/drawingml/2006/chart" xmlns:dgm="http://schemas.openxmlformats.org/drawingml/2006/diagram" xmlns:o="urn:schemas-microsoft-com:office:office" xmlns:v="urn:schemas-microsoft-com:vml" xmlns:pvml="urn:schemas-microsoft-com:office:powerpoint" xmlns:com="http://schemas.openxmlformats.org/drawingml/2006/compatibility" xmlns:p14="http://schemas.microsoft.com/office/powerpoint/2010/main" xmlns:p15="http://schemas.microsoft.com/office/powerpoint/2012/main" xmlns:ahyp="http://schemas.microsoft.com/office/drawing/2018/hyperlinkcolor">
+  <p:cSld>
+    <p:spTree>
+      <p:nvGrpSpPr>
+        <p:cNvPr id="116" name="Shape 116"/>
+        <p:cNvGrpSpPr/>
+        <p:nvPr/>
+      </p:nvGrpSpPr>
+      <p:grpSpPr>
+        <a:xfrm>
+          <a:off x="0" y="0"/>
+          <a:ext cx="0" cy="0"/>
+          <a:chOff x="0" y="0"/>
+          <a:chExt cx="0" cy="0"/>
+        </a:xfrm>
+      </p:grpSpPr>
+      <p:sp>
+        <p:nvSpPr>
+          <p:cNvPr id="117" name="Google Shape;117;p20"/>
+          <p:cNvSpPr txBox="1"/>
+          <p:nvPr>
+            <p:ph type="title"/>
+          </p:nvPr>
+        </p:nvSpPr>
+        <p:spPr>
+          <a:xfrm>
+            <a:off x="311700" y="445025"/>
+            <a:ext cx="8520600" cy="572700"/>
+          </a:xfrm>
+          <a:prstGeom prst="rect">
+            <a:avLst/>
+          </a:prstGeom>
+        </p:spPr>
+        <p:txBody>
+          <a:bodyPr anchorCtr="0" anchor="t" bIns="91425" lIns="91425" spcFirstLastPara="1" rIns="91425" wrap="square" tIns="91425">
+            <a:normAutofit fontScale="90000"/>
+          </a:bodyPr>
+          <a:lstStyle/>
+          <a:p>
+            <a:pPr indent="0" lvl="0" marL="0" rtl="0" algn="l">
+              <a:spcBef>
+                <a:spcPts val="0"/>
+              </a:spcBef>
+              <a:spcAft>
+                <a:spcPts val="0"/>
+              </a:spcAft>
+              <a:buNone/>
+            </a:pPr>
+            <a:r>
+              <a:rPr lang="en"/>
+              <a:t>Approach</a:t>
+            </a:r>
+            <a:endParaRPr/>
+          </a:p>
+        </p:txBody>
+      </p:sp>
+      <p:sp>
+        <p:nvSpPr>
+          <p:cNvPr id="118" name="Google Shape;118;p20"/>
+          <p:cNvSpPr txBox="1"/>
+          <p:nvPr>
+            <p:ph idx="1" type="body"/>
+          </p:nvPr>
+        </p:nvSpPr>
+        <p:spPr>
+          <a:xfrm>
+            <a:off x="311700" y="1234075"/>
+            <a:ext cx="8520600" cy="3334800"/>
+          </a:xfrm>
+          <a:prstGeom prst="rect">
+            <a:avLst/>
+          </a:prstGeom>
+        </p:spPr>
+        <p:txBody>
+          <a:bodyPr anchorCtr="0" anchor="t" bIns="91425" lIns="91425" spcFirstLastPara="1" rIns="91425" wrap="square" tIns="91425">
+            <a:normAutofit/>
+          </a:bodyPr>
+          <a:lstStyle/>
+          <a:p>
+            <a:pPr indent="-342900" lvl="0" marL="457200" rtl="0" algn="l">
+              <a:spcBef>
+                <a:spcPts val="0"/>
+              </a:spcBef>
+              <a:spcAft>
+                <a:spcPts val="0"/>
+              </a:spcAft>
+              <a:buClr>
+                <a:schemeClr val="lt2"/>
+              </a:buClr>
+              <a:buSzPts val="1800"/>
+              <a:buAutoNum type="arabicPeriod"/>
+            </a:pPr>
+            <a:r>
+              <a:rPr lang="en">
+                <a:solidFill>
+                  <a:schemeClr val="lt2"/>
+                </a:solidFill>
+              </a:rPr>
+              <a:t>Undersampling</a:t>
+            </a:r>
+            <a:endParaRPr/>
+          </a:p>
+          <a:p>
+            <a:pPr indent="-342900" lvl="0" marL="457200" rtl="0" algn="l">
+              <a:spcBef>
+                <a:spcPts val="0"/>
+              </a:spcBef>
+              <a:spcAft>
+                <a:spcPts val="0"/>
+              </a:spcAft>
+              <a:buClr>
+                <a:srgbClr val="D9D9D9"/>
+              </a:buClr>
+              <a:buSzPts val="1800"/>
+              <a:buAutoNum type="arabicPeriod"/>
+            </a:pPr>
+            <a:r>
+              <a:rPr lang="en" sz="1800">
+                <a:solidFill>
+                  <a:srgbClr val="D9D9D9"/>
+                </a:solidFill>
+              </a:rPr>
+              <a:t>Question generation</a:t>
+            </a:r>
+            <a:endParaRPr sz="1800">
+              <a:solidFill>
+                <a:srgbClr val="D9D9D9"/>
+              </a:solidFill>
+            </a:endParaRPr>
+          </a:p>
+          <a:p>
+            <a:pPr indent="-342900" lvl="0" marL="457200" rtl="0" algn="l">
+              <a:spcBef>
+                <a:spcPts val="0"/>
+              </a:spcBef>
+              <a:spcAft>
+                <a:spcPts val="0"/>
+              </a:spcAft>
+              <a:buSzPts val="1800"/>
+              <a:buAutoNum type="arabicPeriod"/>
+            </a:pPr>
+            <a:r>
+              <a:rPr lang="en"/>
+              <a:t>CoQA D</a:t>
+            </a:r>
+            <a:r>
+              <a:rPr lang="en" sz="1800"/>
+              <a:t>ataset</a:t>
+            </a:r>
+            <a:endParaRPr/>
+          </a:p>
+        </p:txBody>
+      </p:sp>
+      <p:pic>
+        <p:nvPicPr>
+          <p:cNvPr id="119" name="Google Shape;119;p20"/>
+          <p:cNvPicPr preferRelativeResize="0"/>
+          <p:nvPr/>
+        </p:nvPicPr>
+        <p:blipFill>
+          <a:blip r:embed="rId3">
+            <a:alphaModFix/>
+          </a:blip>
+          <a:stretch>
+            <a:fillRect/>
+          </a:stretch>
+        </p:blipFill>
+        <p:spPr>
+          <a:xfrm>
+            <a:off x="3571963" y="1434625"/>
+            <a:ext cx="5229225" cy="3543300"/>
+          </a:xfrm>
+          <a:prstGeom prst="rect">
+            <a:avLst/>
+          </a:prstGeom>
+          <a:noFill/>
+          <a:ln>
+            <a:noFill/>
+          </a:ln>
+        </p:spPr>
+      </p:pic>
+      <p:pic>
+        <p:nvPicPr>
+          <p:cNvPr id="120" name="Google Shape;120;p20"/>
+          <p:cNvPicPr preferRelativeResize="0"/>
+          <p:nvPr/>
+        </p:nvPicPr>
+        <p:blipFill rotWithShape="1">
+          <a:blip r:embed="rId4">
+            <a:alphaModFix/>
+          </a:blip>
+          <a:srcRect b="-24762" l="14954" r="10273" t="100000"/>
+          <a:stretch/>
+        </p:blipFill>
+        <p:spPr>
+          <a:xfrm>
+            <a:off x="4187225" y="3809350"/>
+            <a:ext cx="3909601" cy="877400"/>
+          </a:xfrm>
+          <a:prstGeom prst="rect">
+            <a:avLst/>
+          </a:prstGeom>
+          <a:noFill/>
+          <a:ln>
+            <a:noFill/>
+          </a:ln>
+        </p:spPr>
+      </p:pic>
+      <p:pic>
+        <p:nvPicPr>
+          <p:cNvPr id="121" name="Google Shape;121;p20"/>
+          <p:cNvPicPr preferRelativeResize="0"/>
+          <p:nvPr/>
+        </p:nvPicPr>
+        <p:blipFill rotWithShape="1">
+          <a:blip r:embed="rId3">
+            <a:alphaModFix/>
+          </a:blip>
+          <a:srcRect b="16185" l="13356" r="8169" t="53050"/>
+          <a:stretch/>
+        </p:blipFill>
+        <p:spPr>
+          <a:xfrm>
+            <a:off x="4263425" y="1671500"/>
+            <a:ext cx="4103625" cy="2751825"/>
+          </a:xfrm>
+          <a:prstGeom prst="rect">
+            <a:avLst/>
+          </a:prstGeom>
+          <a:noFill/>
+          <a:ln>
+            <a:noFill/>
+          </a:ln>
+        </p:spPr>
+      </p:pic>
+      <p:sp>
+        <p:nvSpPr>
+          <p:cNvPr id="122" name="Google Shape;122;p20"/>
+          <p:cNvSpPr/>
+          <p:nvPr/>
+        </p:nvSpPr>
+        <p:spPr>
+          <a:xfrm>
+            <a:off x="5108838" y="1807025"/>
+            <a:ext cx="2155500" cy="429900"/>
+          </a:xfrm>
+          <a:prstGeom prst="rect">
+            <a:avLst/>
+          </a:prstGeom>
+          <a:solidFill>
+            <a:schemeClr val="lt2"/>
+          </a:solidFill>
+          <a:ln cap="flat" cmpd="sng" w="9525">
+            <a:solidFill>
+              <a:schemeClr val="dk2"/>
+            </a:solidFill>
+            <a:prstDash val="solid"/>
+            <a:round/>
+            <a:headEnd len="sm" w="sm" type="none"/>
+            <a:tailEnd len="sm" w="sm" type="none"/>
+          </a:ln>
+        </p:spPr>
+        <p:txBody>
+          <a:bodyPr anchorCtr="0" anchor="ctr" bIns="91425" lIns="91425" spcFirstLastPara="1" rIns="91425" wrap="square" tIns="91425">
+            <a:noAutofit/>
+          </a:bodyPr>
+          <a:lstStyle/>
+          <a:p>
+            <a:pPr indent="0" lvl="0" marL="0" rtl="0" algn="ctr">
+              <a:spcBef>
+                <a:spcPts val="0"/>
+              </a:spcBef>
+              <a:spcAft>
+                <a:spcPts val="0"/>
+              </a:spcAft>
+              <a:buNone/>
+            </a:pPr>
+            <a:r>
+              <a:rPr b="1" lang="en" sz="2000"/>
+              <a:t>CoQA Dataset</a:t>
+            </a:r>
+            <a:endParaRPr b="1" sz="2000"/>
+          </a:p>
+        </p:txBody>
+      </p:sp>
+      <p:sp>
+        <p:nvSpPr>
+          <p:cNvPr id="123" name="Google Shape;123;p20"/>
+          <p:cNvSpPr/>
+          <p:nvPr/>
+        </p:nvSpPr>
+        <p:spPr>
+          <a:xfrm>
+            <a:off x="5108838" y="3864425"/>
+            <a:ext cx="2155500" cy="429900"/>
+          </a:xfrm>
+          <a:prstGeom prst="rect">
+            <a:avLst/>
+          </a:prstGeom>
+          <a:solidFill>
+            <a:schemeClr val="lt2"/>
+          </a:solidFill>
+          <a:ln cap="flat" cmpd="sng" w="9525">
+            <a:solidFill>
+              <a:schemeClr val="dk2"/>
+            </a:solidFill>
+            <a:prstDash val="solid"/>
+            <a:round/>
+            <a:headEnd len="sm" w="sm" type="none"/>
+            <a:tailEnd len="sm" w="sm" type="none"/>
+          </a:ln>
+        </p:spPr>
+        <p:txBody>
+          <a:bodyPr anchorCtr="0" anchor="ctr" bIns="91425" lIns="91425" spcFirstLastPara="1" rIns="91425" wrap="square" tIns="91425">
+            <a:noAutofit/>
+          </a:bodyPr>
+          <a:lstStyle/>
+          <a:p>
+            <a:pPr indent="0" lvl="0" marL="0" rtl="0" algn="ctr">
+              <a:spcBef>
+                <a:spcPts val="0"/>
+              </a:spcBef>
+              <a:spcAft>
+                <a:spcPts val="0"/>
+              </a:spcAft>
+              <a:buNone/>
+            </a:pPr>
+            <a:r>
+              <a:rPr b="1" lang="en" sz="2000"/>
+              <a:t>SQuAD </a:t>
+            </a:r>
+            <a:r>
+              <a:rPr b="1" lang="en" sz="2000"/>
+              <a:t>Dataset</a:t>
+            </a:r>
+            <a:endParaRPr b="1" sz="2000"/>
+          </a:p>
+        </p:txBody>
+      </p:sp>
+    </p:spTree>
+  </p:cSld>
+  <p:clrMapOvr>
+    <a:masterClrMapping/>
+  </p:clrMapOvr>
+  <p:timing>
+    <p:tnLst>
+      <p:par>
+        <p:cTn dur="indefinite" nodeType="tmRoot" restart="never">
+          <p:childTnLst>
+            <p:seq concurrent="1" nextAc="seek">
+              <p:cTn dur="indefinite" id="2" nodeType="mainSeq">
+                <p:childTnLst>
+                  <p:par>
+                    <p:cTn fill="hold">
+                      <p:stCondLst>
+                        <p:cond delay="indefinite"/>
+                      </p:stCondLst>
+                      <p:childTnLst>
+                        <p:par>
+                          <p:cTn fill="hold">
+                            <p:stCondLst>
+                              <p:cond delay="0"/>
+                            </p:stCondLst>
+                            <p:childTnLst>
+                              <p:par>
+                                <p:cTn fill="hold" nodeType="clickEffect" presetClass="entr" presetID="2" presetSubtype="1">
+                                  <p:stCondLst>
+                                    <p:cond delay="0"/>
+                                  </p:stCondLst>
+                                  <p:childTnLst>
+                                    <p:set>
+                                      <p:cBhvr>
+                                        <p:cTn dur="1" fill="hold">
+                                          <p:stCondLst>
+                                            <p:cond delay="0"/>
+                                          </p:stCondLst>
+                                        </p:cTn>
+                                        <p:tgtEl>
+                                          <p:spTgt spid="121"/>
+                                        </p:tgtEl>
+                                        <p:attrNameLst>
+                                          <p:attrName>style.visibility</p:attrName>
+                                        </p:attrNameLst>
+                                      </p:cBhvr>
+                                      <p:to>
+                                        <p:strVal val="visible"/>
+                                      </p:to>
+                                    </p:set>
+                                    <p:anim calcmode="lin" valueType="num">
+                                      <p:cBhvr additive="base">
+                                        <p:cTn dur="3000"/>
+                                        <p:tgtEl>
+                                          <p:spTgt spid="121"/>
+                                        </p:tgtEl>
+                                        <p:attrNameLst>
+                                          <p:attrName>ppt_y</p:attrName>
+                                        </p:attrNameLst>
+                                      </p:cBhvr>
+                                      <p:tavLst>
+                                        <p:tav fmla="" tm="0">
+                                          <p:val>
+                                            <p:strVal val="#ppt_y-1"/>
+                                          </p:val>
+                                        </p:tav>
+                                        <p:tav fmla="" tm="100000">
+                                          <p:val>
+                                            <p:strVal val="#ppt_y"/>
+                                          </p:val>
+                                        </p:tav>
+                                      </p:tavLst>
+                                    </p:anim>
+                                  </p:childTnLst>
+                                </p:cTn>
+                              </p:par>
+                              <p:par>
+                                <p:cTn fill="hold" nodeType="withEffect" presetClass="entr" presetID="2" presetSubtype="1">
+                                  <p:stCondLst>
+                                    <p:cond delay="0"/>
+                                  </p:stCondLst>
+                                  <p:childTnLst>
+                                    <p:set>
+                                      <p:cBhvr>
+                                        <p:cTn dur="1" fill="hold">
+                                          <p:stCondLst>
+                                            <p:cond delay="0"/>
+                                          </p:stCondLst>
+                                        </p:cTn>
+                                        <p:tgtEl>
+                                          <p:spTgt spid="122"/>
+                                        </p:tgtEl>
+                                        <p:attrNameLst>
+                                          <p:attrName>style.visibility</p:attrName>
+                                        </p:attrNameLst>
+                                      </p:cBhvr>
+                                      <p:to>
+                                        <p:strVal val="visible"/>
+                                      </p:to>
+                                    </p:set>
+                                    <p:anim calcmode="lin" valueType="num">
+                                      <p:cBhvr additive="base">
+                                        <p:cTn dur="3000"/>
+                                        <p:tgtEl>
+                                          <p:spTgt spid="122"/>
+                                        </p:tgtEl>
+                                        <p:attrNameLst>
+                                          <p:attrName>ppt_y</p:attrName>
+                                        </p:attrNameLst>
+                                      </p:cBhvr>
+                                      <p:tavLst>
+                                        <p:tav fmla="" tm="0">
+                                          <p:val>
+                                            <p:strVal val="#ppt_y-1"/>
+                                          </p:val>
+                                        </p:tav>
+                                        <p:tav fmla="" tm="100000">
+                                          <p:val>
+                                            <p:strVal val="#ppt_y"/>
+                                          </p:val>
+                                        </p:tav>
+                                      </p:tavLst>
+                                    </p:anim>
+                                  </p:childTnLst>
+                                </p:cTn>
+                              </p:par>
+                            </p:childTnLst>
+                          </p:cTn>
+                        </p:par>
+                      </p:childTnLst>
+                    </p:cTn>
+                  </p:par>
+                </p:childTnLst>
+              </p:cTn>
+              <p:prevCondLst>
+                <p:cond evt="onPrev">
+                  <p:tgtEl>
+                    <p:sldTgt/>
+                  </p:tgtEl>
+                </p:cond>
+              </p:prevCondLst>
+              <p:nextCondLst>
+                <p:cond evt="onNext">
+                  <p:tgtEl>
+                    <p:sldTgt/>
+                  </p:tgtEl>
+                </p:cond>
+              </p:nextCondLst>
+            </p:seq>
+          </p:childTnLst>
+        </p:cTn>
+      </p:par>
+    </p:tnLst>
+  </p:timing>
+</p:sld>
+</file>
+
+<file path=ppt/slides/slide9.xml><?xml version="1.0" encoding="utf-8"?>
+<p:sld xmlns:a="http://schemas.openxmlformats.org/drawingml/2006/main" xmlns:r="http://schemas.openxmlformats.org/officeDocument/2006/relationships" xmlns:mc="http://schemas.openxmlformats.org/markup-compatibility/2006" xmlns:mv="urn:schemas-microsoft-com:mac:vml" xmlns:p="http://schemas.openxmlformats.org/presentationml/2006/main" xmlns:c="http://schemas.openxmlformats.org/drawingml/2006/chart" xmlns:dgm="http://schemas.openxmlformats.org/drawingml/2006/diagram" xmlns:o="urn:schemas-microsoft-com:office:office" xmlns:v="urn:schemas-microsoft-com:vml" xmlns:pvml="urn:schemas-microsoft-com:office:powerpoint" xmlns:com="http://schemas.openxmlformats.org/drawingml/2006/compatibility" xmlns:p14="http://schemas.microsoft.com/office/powerpoint/2010/main" xmlns:p15="http://schemas.microsoft.com/office/powerpoint/2012/main" xmlns:ahyp="http://schemas.microsoft.com/office/drawing/2018/hyperlinkcolor">
+  <p:cSld>
+    <p:spTree>
+      <p:nvGrpSpPr>
+        <p:cNvPr id="127" name="Shape 127"/>
+        <p:cNvGrpSpPr/>
+        <p:nvPr/>
+      </p:nvGrpSpPr>
+      <p:grpSpPr>
+        <a:xfrm>
+          <a:off x="0" y="0"/>
+          <a:ext cx="0" cy="0"/>
+          <a:chOff x="0" y="0"/>
+          <a:chExt cx="0" cy="0"/>
+        </a:xfrm>
+      </p:grpSpPr>
+      <p:sp>
+        <p:nvSpPr>
+          <p:cNvPr id="128" name="Google Shape;128;p21"/>
+          <p:cNvSpPr txBox="1"/>
+          <p:nvPr>
+            <p:ph type="title"/>
+          </p:nvPr>
+        </p:nvSpPr>
+        <p:spPr>
+          <a:xfrm>
+            <a:off x="311700" y="445025"/>
+            <a:ext cx="8520600" cy="572700"/>
+          </a:xfrm>
+          <a:prstGeom prst="rect">
+            <a:avLst/>
+          </a:prstGeom>
+        </p:spPr>
+        <p:txBody>
+          <a:bodyPr anchorCtr="0" anchor="t" bIns="91425" lIns="91425" spcFirstLastPara="1" rIns="91425" wrap="square" tIns="91425">
+            <a:normAutofit fontScale="90000"/>
+          </a:bodyPr>
+          <a:lstStyle/>
+          <a:p>
+            <a:pPr indent="0" lvl="0" marL="0" rtl="0" algn="l">
+              <a:spcBef>
+                <a:spcPts val="0"/>
+              </a:spcBef>
+              <a:spcAft>
+                <a:spcPts val="0"/>
+              </a:spcAft>
+              <a:buNone/>
+            </a:pPr>
+            <a:r>
+              <a:rPr lang="en"/>
               <a:t>Results</a:t>
             </a:r>
             <a:endParaRPr/>
@@ -7510,7 +9983,7 @@
       </p:sp>
       <p:sp>
         <p:nvSpPr>
-          <p:cNvPr id="89" name="Google Shape;89;p18"/>
+          <p:cNvPr id="129" name="Google Shape;129;p21"/>
           <p:cNvSpPr txBox="1"/>
           <p:nvPr>
             <p:ph idx="1" type="body"/>
@@ -7557,6 +10030,285 @@
 </file>
 
 <file path=ppt/theme/theme1.xml><?xml version="1.0" encoding="utf-8"?>
+<a:theme xmlns:a="http://schemas.openxmlformats.org/drawingml/2006/main" xmlns:r="http://schemas.openxmlformats.org/officeDocument/2006/relationships">
+  <a:themeElements>
+    <a:clrScheme name="Default">
+      <a:dk1>
+        <a:srgbClr val="000000"/>
+      </a:dk1>
+      <a:lt1>
+        <a:srgbClr val="FFFFFF"/>
+      </a:lt1>
+      <a:dk2>
+        <a:srgbClr val="158158"/>
+      </a:dk2>
+      <a:lt2>
+        <a:srgbClr val="F3F3F3"/>
+      </a:lt2>
+      <a:accent1>
+        <a:srgbClr val="058DC7"/>
+      </a:accent1>
+      <a:accent2>
+        <a:srgbClr val="50B432"/>
+      </a:accent2>
+      <a:accent3>
+        <a:srgbClr val="ED561B"/>
+      </a:accent3>
+      <a:accent4>
+        <a:srgbClr val="EDEF00"/>
+      </a:accent4>
+      <a:accent5>
+        <a:srgbClr val="24CBE5"/>
+      </a:accent5>
+      <a:accent6>
+        <a:srgbClr val="64E572"/>
+      </a:accent6>
+      <a:hlink>
+        <a:srgbClr val="2200CC"/>
+      </a:hlink>
+      <a:folHlink>
+        <a:srgbClr val="551A8B"/>
+      </a:folHlink>
+    </a:clrScheme>
+    <a:fontScheme name="Office">
+      <a:majorFont>
+        <a:latin typeface="Arial"/>
+        <a:ea typeface=""/>
+        <a:cs typeface=""/>
+        <a:font script="Jpan" typeface="ＭＳ Ｐゴシック"/>
+        <a:font script="Hang" typeface="맑은 고딕"/>
+        <a:font script="Hans" typeface="宋体"/>
+        <a:font script="Hant" typeface="新細明體"/>
+        <a:font script="Arab" typeface="Times New Roman"/>
+        <a:font script="Hebr" typeface="Times New Roman"/>
+        <a:font script="Thai" typeface="Angsana New"/>
+        <a:font script="Ethi" typeface="Nyala"/>
+        <a:font script="Beng" typeface="Vrinda"/>
+        <a:font script="Gujr" typeface="Shruti"/>
+        <a:font script="Khmr" typeface="MoolBoran"/>
+        <a:font script="Knda" typeface="Tunga"/>
+        <a:font script="Guru" typeface="Raavi"/>
+        <a:font script="Cans" typeface="Euphemia"/>
+        <a:font script="Cher" typeface="Plantagenet Cherokee"/>
+        <a:font script="Yiii" typeface="Microsoft Yi Baiti"/>
+        <a:font script="Tibt" typeface="Microsoft Himalaya"/>
+        <a:font script="Thaa" typeface="MV Boli"/>
+        <a:font script="Deva" typeface="Mangal"/>
+        <a:font script="Telu" typeface="Gautami"/>
+        <a:font script="Taml" typeface="Latha"/>
+        <a:font script="Syrc" typeface="Estrangelo Edessa"/>
+        <a:font script="Orya" typeface="Kalinga"/>
+        <a:font script="Mlym" typeface="Kartika"/>
+        <a:font script="Laoo" typeface="DokChampa"/>
+        <a:font script="Sinh" typeface="Iskoola Pota"/>
+        <a:font script="Mong" typeface="Mongolian Baiti"/>
+        <a:font script="Viet" typeface="Times New Roman"/>
+        <a:font script="Uigh" typeface="Microsoft Uighur"/>
+        <a:font script="Geor" typeface="Sylfaen"/>
+      </a:majorFont>
+      <a:minorFont>
+        <a:latin typeface="Arial"/>
+        <a:ea typeface=""/>
+        <a:cs typeface=""/>
+        <a:font script="Jpan" typeface="ＭＳ Ｐゴシック"/>
+        <a:font script="Hang" typeface="맑은 고딕"/>
+        <a:font script="Hans" typeface="宋体"/>
+        <a:font script="Hant" typeface="新細明體"/>
+        <a:font script="Arab" typeface="Arial"/>
+        <a:font script="Hebr" typeface="Arial"/>
+        <a:font script="Thai" typeface="Cordia New"/>
+        <a:font script="Ethi" typeface="Nyala"/>
+        <a:font script="Beng" typeface="Vrinda"/>
+        <a:font script="Gujr" typeface="Shruti"/>
+        <a:font script="Khmr" typeface="DaunPenh"/>
+        <a:font script="Knda" typeface="Tunga"/>
+        <a:font script="Guru" typeface="Raavi"/>
+        <a:font script="Cans" typeface="Euphemia"/>
+        <a:font script="Cher" typeface="Plantagenet Cherokee"/>
+        <a:font script="Yiii" typeface="Microsoft Yi Baiti"/>
+        <a:font script="Tibt" typeface="Microsoft Himalaya"/>
+        <a:font script="Thaa" typeface="MV Boli"/>
+        <a:font script="Deva" typeface="Mangal"/>
+        <a:font script="Telu" typeface="Gautami"/>
+        <a:font script="Taml" typeface="Latha"/>
+        <a:font script="Syrc" typeface="Estrangelo Edessa"/>
+        <a:font script="Orya" typeface="Kalinga"/>
+        <a:font script="Mlym" typeface="Kartika"/>
+        <a:font script="Laoo" typeface="DokChampa"/>
+        <a:font script="Sinh" typeface="Iskoola Pota"/>
+        <a:font script="Mong" typeface="Mongolian Baiti"/>
+        <a:font script="Viet" typeface="Arial"/>
+        <a:font script="Uigh" typeface="Microsoft Uighur"/>
+        <a:font script="Geor" typeface="Sylfaen"/>
+      </a:minorFont>
+    </a:fontScheme>
+    <a:fmtScheme name="Office">
+      <a:fillStyleLst>
+        <a:solidFill>
+          <a:schemeClr val="phClr"/>
+        </a:solidFill>
+        <a:gradFill rotWithShape="1">
+          <a:gsLst>
+            <a:gs pos="0">
+              <a:schemeClr val="phClr">
+                <a:tint val="50000"/>
+                <a:satMod val="300000"/>
+              </a:schemeClr>
+            </a:gs>
+            <a:gs pos="35000">
+              <a:schemeClr val="phClr">
+                <a:tint val="37000"/>
+                <a:satMod val="300000"/>
+              </a:schemeClr>
+            </a:gs>
+            <a:gs pos="100000">
+              <a:schemeClr val="phClr">
+                <a:tint val="15000"/>
+                <a:satMod val="350000"/>
+              </a:schemeClr>
+            </a:gs>
+          </a:gsLst>
+          <a:lin ang="16200000" scaled="1"/>
+        </a:gradFill>
+        <a:gradFill rotWithShape="1">
+          <a:gsLst>
+            <a:gs pos="0">
+              <a:schemeClr val="phClr">
+                <a:tint val="100000"/>
+                <a:shade val="100000"/>
+                <a:satMod val="130000"/>
+              </a:schemeClr>
+            </a:gs>
+            <a:gs pos="100000">
+              <a:schemeClr val="phClr">
+                <a:tint val="50000"/>
+                <a:shade val="100000"/>
+                <a:satMod val="350000"/>
+              </a:schemeClr>
+            </a:gs>
+          </a:gsLst>
+          <a:lin ang="16200000" scaled="0"/>
+        </a:gradFill>
+      </a:fillStyleLst>
+      <a:lnStyleLst>
+        <a:ln w="9525" cap="flat" cmpd="sng" algn="ctr">
+          <a:solidFill>
+            <a:schemeClr val="phClr">
+              <a:shade val="95000"/>
+              <a:satMod val="105000"/>
+            </a:schemeClr>
+          </a:solidFill>
+          <a:prstDash val="solid"/>
+        </a:ln>
+        <a:ln w="25400" cap="flat" cmpd="sng" algn="ctr">
+          <a:solidFill>
+            <a:schemeClr val="phClr"/>
+          </a:solidFill>
+          <a:prstDash val="solid"/>
+        </a:ln>
+        <a:ln w="38100" cap="flat" cmpd="sng" algn="ctr">
+          <a:solidFill>
+            <a:schemeClr val="phClr"/>
+          </a:solidFill>
+          <a:prstDash val="solid"/>
+        </a:ln>
+      </a:lnStyleLst>
+      <a:effectStyleLst>
+        <a:effectStyle>
+          <a:effectLst>
+            <a:outerShdw blurRad="40000" dist="20000" dir="5400000" rotWithShape="0">
+              <a:srgbClr val="000000">
+                <a:alpha val="38000"/>
+              </a:srgbClr>
+            </a:outerShdw>
+          </a:effectLst>
+        </a:effectStyle>
+        <a:effectStyle>
+          <a:effectLst>
+            <a:outerShdw blurRad="40000" dist="23000" dir="5400000" rotWithShape="0">
+              <a:srgbClr val="000000">
+                <a:alpha val="35000"/>
+              </a:srgbClr>
+            </a:outerShdw>
+          </a:effectLst>
+        </a:effectStyle>
+        <a:effectStyle>
+          <a:effectLst>
+            <a:outerShdw blurRad="40000" dist="23000" dir="5400000" rotWithShape="0">
+              <a:srgbClr val="000000">
+                <a:alpha val="35000"/>
+              </a:srgbClr>
+            </a:outerShdw>
+          </a:effectLst>
+          <a:scene3d>
+            <a:camera prst="orthographicFront">
+              <a:rot lat="0" lon="0" rev="0"/>
+            </a:camera>
+            <a:lightRig rig="threePt" dir="t">
+              <a:rot lat="0" lon="0" rev="1200000"/>
+            </a:lightRig>
+          </a:scene3d>
+          <a:sp3d>
+            <a:bevelT w="63500" h="25400"/>
+          </a:sp3d>
+        </a:effectStyle>
+      </a:effectStyleLst>
+      <a:bgFillStyleLst>
+        <a:solidFill>
+          <a:schemeClr val="phClr"/>
+        </a:solidFill>
+        <a:gradFill rotWithShape="1">
+          <a:gsLst>
+            <a:gs pos="0">
+              <a:schemeClr val="phClr">
+                <a:tint val="40000"/>
+                <a:satMod val="350000"/>
+              </a:schemeClr>
+            </a:gs>
+            <a:gs pos="40000">
+              <a:schemeClr val="phClr">
+                <a:tint val="45000"/>
+                <a:shade val="99000"/>
+                <a:satMod val="350000"/>
+              </a:schemeClr>
+            </a:gs>
+            <a:gs pos="100000">
+              <a:schemeClr val="phClr">
+                <a:shade val="20000"/>
+                <a:satMod val="255000"/>
+              </a:schemeClr>
+            </a:gs>
+          </a:gsLst>
+          <a:path path="circle">
+            <a:fillToRect l="50000" t="-80000" r="50000" b="180000"/>
+          </a:path>
+        </a:gradFill>
+        <a:gradFill rotWithShape="1">
+          <a:gsLst>
+            <a:gs pos="0">
+              <a:schemeClr val="phClr">
+                <a:tint val="80000"/>
+                <a:satMod val="300000"/>
+              </a:schemeClr>
+            </a:gs>
+            <a:gs pos="100000">
+              <a:schemeClr val="phClr">
+                <a:shade val="30000"/>
+                <a:satMod val="200000"/>
+              </a:schemeClr>
+            </a:gs>
+          </a:gsLst>
+          <a:path path="circle">
+            <a:fillToRect l="50000" t="50000" r="50000" b="50000"/>
+          </a:path>
+        </a:gradFill>
+      </a:bgFillStyleLst>
+    </a:fmtScheme>
+  </a:themeElements>
+</a:theme>
+</file>
+
+<file path=ppt/theme/theme2.xml><?xml version="1.0" encoding="utf-8"?>
 <a:theme xmlns:a="http://schemas.openxmlformats.org/drawingml/2006/main" xmlns:r="http://schemas.openxmlformats.org/officeDocument/2006/relationships" name="Pop">
   <a:themeElements>
     <a:clrScheme name="Pop">
@@ -7833,283 +10585,4 @@
     </a:fmtScheme>
   </a:themeElements>
 </a:theme>
-</file>
-
-<file path=ppt/theme/theme2.xml><?xml version="1.0" encoding="utf-8"?>
-<a:theme xmlns:a="http://schemas.openxmlformats.org/drawingml/2006/main" xmlns:r="http://schemas.openxmlformats.org/officeDocument/2006/relationships">
-  <a:themeElements>
-    <a:clrScheme name="Default">
-      <a:dk1>
-        <a:srgbClr val="000000"/>
-      </a:dk1>
-      <a:lt1>
-        <a:srgbClr val="FFFFFF"/>
-      </a:lt1>
-      <a:dk2>
-        <a:srgbClr val="158158"/>
-      </a:dk2>
-      <a:lt2>
-        <a:srgbClr val="F3F3F3"/>
-      </a:lt2>
-      <a:accent1>
-        <a:srgbClr val="058DC7"/>
-      </a:accent1>
-      <a:accent2>
-        <a:srgbClr val="50B432"/>
-      </a:accent2>
-      <a:accent3>
-        <a:srgbClr val="ED561B"/>
-      </a:accent3>
-      <a:accent4>
-        <a:srgbClr val="EDEF00"/>
-      </a:accent4>
-      <a:accent5>
-        <a:srgbClr val="24CBE5"/>
-      </a:accent5>
-      <a:accent6>
-        <a:srgbClr val="64E572"/>
-      </a:accent6>
-      <a:hlink>
-        <a:srgbClr val="2200CC"/>
-      </a:hlink>
-      <a:folHlink>
-        <a:srgbClr val="551A8B"/>
-      </a:folHlink>
-    </a:clrScheme>
-    <a:fontScheme name="Office">
-      <a:majorFont>
-        <a:latin typeface="Arial"/>
-        <a:ea typeface=""/>
-        <a:cs typeface=""/>
-        <a:font script="Jpan" typeface="ＭＳ Ｐゴシック"/>
-        <a:font script="Hang" typeface="맑은 고딕"/>
-        <a:font script="Hans" typeface="宋体"/>
-        <a:font script="Hant" typeface="新細明體"/>
-        <a:font script="Arab" typeface="Times New Roman"/>
-        <a:font script="Hebr" typeface="Times New Roman"/>
-        <a:font script="Thai" typeface="Angsana New"/>
-        <a:font script="Ethi" typeface="Nyala"/>
-        <a:font script="Beng" typeface="Vrinda"/>
-        <a:font script="Gujr" typeface="Shruti"/>
-        <a:font script="Khmr" typeface="MoolBoran"/>
-        <a:font script="Knda" typeface="Tunga"/>
-        <a:font script="Guru" typeface="Raavi"/>
-        <a:font script="Cans" typeface="Euphemia"/>
-        <a:font script="Cher" typeface="Plantagenet Cherokee"/>
-        <a:font script="Yiii" typeface="Microsoft Yi Baiti"/>
-        <a:font script="Tibt" typeface="Microsoft Himalaya"/>
-        <a:font script="Thaa" typeface="MV Boli"/>
-        <a:font script="Deva" typeface="Mangal"/>
-        <a:font script="Telu" typeface="Gautami"/>
-        <a:font script="Taml" typeface="Latha"/>
-        <a:font script="Syrc" typeface="Estrangelo Edessa"/>
-        <a:font script="Orya" typeface="Kalinga"/>
-        <a:font script="Mlym" typeface="Kartika"/>
-        <a:font script="Laoo" typeface="DokChampa"/>
-        <a:font script="Sinh" typeface="Iskoola Pota"/>
-        <a:font script="Mong" typeface="Mongolian Baiti"/>
-        <a:font script="Viet" typeface="Times New Roman"/>
-        <a:font script="Uigh" typeface="Microsoft Uighur"/>
-        <a:font script="Geor" typeface="Sylfaen"/>
-      </a:majorFont>
-      <a:minorFont>
-        <a:latin typeface="Arial"/>
-        <a:ea typeface=""/>
-        <a:cs typeface=""/>
-        <a:font script="Jpan" typeface="ＭＳ Ｐゴシック"/>
-        <a:font script="Hang" typeface="맑은 고딕"/>
-        <a:font script="Hans" typeface="宋体"/>
-        <a:font script="Hant" typeface="新細明體"/>
-        <a:font script="Arab" typeface="Arial"/>
-        <a:font script="Hebr" typeface="Arial"/>
-        <a:font script="Thai" typeface="Cordia New"/>
-        <a:font script="Ethi" typeface="Nyala"/>
-        <a:font script="Beng" typeface="Vrinda"/>
-        <a:font script="Gujr" typeface="Shruti"/>
-        <a:font script="Khmr" typeface="DaunPenh"/>
-        <a:font script="Knda" typeface="Tunga"/>
-        <a:font script="Guru" typeface="Raavi"/>
-        <a:font script="Cans" typeface="Euphemia"/>
-        <a:font script="Cher" typeface="Plantagenet Cherokee"/>
-        <a:font script="Yiii" typeface="Microsoft Yi Baiti"/>
-        <a:font script="Tibt" typeface="Microsoft Himalaya"/>
-        <a:font script="Thaa" typeface="MV Boli"/>
-        <a:font script="Deva" typeface="Mangal"/>
-        <a:font script="Telu" typeface="Gautami"/>
-        <a:font script="Taml" typeface="Latha"/>
-        <a:font script="Syrc" typeface="Estrangelo Edessa"/>
-        <a:font script="Orya" typeface="Kalinga"/>
-        <a:font script="Mlym" typeface="Kartika"/>
-        <a:font script="Laoo" typeface="DokChampa"/>
-        <a:font script="Sinh" typeface="Iskoola Pota"/>
-        <a:font script="Mong" typeface="Mongolian Baiti"/>
-        <a:font script="Viet" typeface="Arial"/>
-        <a:font script="Uigh" typeface="Microsoft Uighur"/>
-        <a:font script="Geor" typeface="Sylfaen"/>
-      </a:minorFont>
-    </a:fontScheme>
-    <a:fmtScheme name="Office">
-      <a:fillStyleLst>
-        <a:solidFill>
-          <a:schemeClr val="phClr"/>
-        </a:solidFill>
-        <a:gradFill rotWithShape="1">
-          <a:gsLst>
-            <a:gs pos="0">
-              <a:schemeClr val="phClr">
-                <a:tint val="50000"/>
-                <a:satMod val="300000"/>
-              </a:schemeClr>
-            </a:gs>
-            <a:gs pos="35000">
-              <a:schemeClr val="phClr">
-                <a:tint val="37000"/>
-                <a:satMod val="300000"/>
-              </a:schemeClr>
-            </a:gs>
-            <a:gs pos="100000">
-              <a:schemeClr val="phClr">
-                <a:tint val="15000"/>
-                <a:satMod val="350000"/>
-              </a:schemeClr>
-            </a:gs>
-          </a:gsLst>
-          <a:lin ang="16200000" scaled="1"/>
-        </a:gradFill>
-        <a:gradFill rotWithShape="1">
-          <a:gsLst>
-            <a:gs pos="0">
-              <a:schemeClr val="phClr">
-                <a:tint val="100000"/>
-                <a:shade val="100000"/>
-                <a:satMod val="130000"/>
-              </a:schemeClr>
-            </a:gs>
-            <a:gs pos="100000">
-              <a:schemeClr val="phClr">
-                <a:tint val="50000"/>
-                <a:shade val="100000"/>
-                <a:satMod val="350000"/>
-              </a:schemeClr>
-            </a:gs>
-          </a:gsLst>
-          <a:lin ang="16200000" scaled="0"/>
-        </a:gradFill>
-      </a:fillStyleLst>
-      <a:lnStyleLst>
-        <a:ln w="9525" cap="flat" cmpd="sng" algn="ctr">
-          <a:solidFill>
-            <a:schemeClr val="phClr">
-              <a:shade val="95000"/>
-              <a:satMod val="105000"/>
-            </a:schemeClr>
-          </a:solidFill>
-          <a:prstDash val="solid"/>
-        </a:ln>
-        <a:ln w="25400" cap="flat" cmpd="sng" algn="ctr">
-          <a:solidFill>
-            <a:schemeClr val="phClr"/>
-          </a:solidFill>
-          <a:prstDash val="solid"/>
-        </a:ln>
-        <a:ln w="38100" cap="flat" cmpd="sng" algn="ctr">
-          <a:solidFill>
-            <a:schemeClr val="phClr"/>
-          </a:solidFill>
-          <a:prstDash val="solid"/>
-        </a:ln>
-      </a:lnStyleLst>
-      <a:effectStyleLst>
-        <a:effectStyle>
-          <a:effectLst>
-            <a:outerShdw blurRad="40000" dist="20000" dir="5400000" rotWithShape="0">
-              <a:srgbClr val="000000">
-                <a:alpha val="38000"/>
-              </a:srgbClr>
-            </a:outerShdw>
-          </a:effectLst>
-        </a:effectStyle>
-        <a:effectStyle>
-          <a:effectLst>
-            <a:outerShdw blurRad="40000" dist="23000" dir="5400000" rotWithShape="0">
-              <a:srgbClr val="000000">
-                <a:alpha val="35000"/>
-              </a:srgbClr>
-            </a:outerShdw>
-          </a:effectLst>
-        </a:effectStyle>
-        <a:effectStyle>
-          <a:effectLst>
-            <a:outerShdw blurRad="40000" dist="23000" dir="5400000" rotWithShape="0">
-              <a:srgbClr val="000000">
-                <a:alpha val="35000"/>
-              </a:srgbClr>
-            </a:outerShdw>
-          </a:effectLst>
-          <a:scene3d>
-            <a:camera prst="orthographicFront">
-              <a:rot lat="0" lon="0" rev="0"/>
-            </a:camera>
-            <a:lightRig rig="threePt" dir="t">
-              <a:rot lat="0" lon="0" rev="1200000"/>
-            </a:lightRig>
-          </a:scene3d>
-          <a:sp3d>
-            <a:bevelT w="63500" h="25400"/>
-          </a:sp3d>
-        </a:effectStyle>
-      </a:effectStyleLst>
-      <a:bgFillStyleLst>
-        <a:solidFill>
-          <a:schemeClr val="phClr"/>
-        </a:solidFill>
-        <a:gradFill rotWithShape="1">
-          <a:gsLst>
-            <a:gs pos="0">
-              <a:schemeClr val="phClr">
-                <a:tint val="40000"/>
-                <a:satMod val="350000"/>
-              </a:schemeClr>
-            </a:gs>
-            <a:gs pos="40000">
-              <a:schemeClr val="phClr">
-                <a:tint val="45000"/>
-                <a:shade val="99000"/>
-                <a:satMod val="350000"/>
-              </a:schemeClr>
-            </a:gs>
-            <a:gs pos="100000">
-              <a:schemeClr val="phClr">
-                <a:shade val="20000"/>
-                <a:satMod val="255000"/>
-              </a:schemeClr>
-            </a:gs>
-          </a:gsLst>
-          <a:path path="circle">
-            <a:fillToRect l="50000" t="-80000" r="50000" b="180000"/>
-          </a:path>
-        </a:gradFill>
-        <a:gradFill rotWithShape="1">
-          <a:gsLst>
-            <a:gs pos="0">
-              <a:schemeClr val="phClr">
-                <a:tint val="80000"/>
-                <a:satMod val="300000"/>
-              </a:schemeClr>
-            </a:gs>
-            <a:gs pos="100000">
-              <a:schemeClr val="phClr">
-                <a:shade val="30000"/>
-                <a:satMod val="200000"/>
-              </a:schemeClr>
-            </a:gs>
-          </a:gsLst>
-          <a:path path="circle">
-            <a:fillToRect l="50000" t="50000" r="50000" b="50000"/>
-          </a:path>
-        </a:gradFill>
-      </a:bgFillStyleLst>
-    </a:fmtScheme>
-  </a:themeElements>
-</a:theme>
 </file>
</xml_diff>

<commit_message>
FineTuning - Almost Done
</commit_message>
<xml_diff>
--- a/CS769 Presentation.pptx
+++ b/CS769 Presentation.pptx
@@ -17,28 +17,29 @@
     <p:sldId id="262" r:id="rId12"/>
     <p:sldId id="263" r:id="rId13"/>
     <p:sldId id="264" r:id="rId14"/>
+    <p:sldId id="265" r:id="rId15"/>
   </p:sldIdLst>
   <p:sldSz cy="5143500" cx="9144000"/>
   <p:notesSz cx="6858000" cy="9144000"/>
   <p:embeddedFontLst>
     <p:embeddedFont>
       <p:font typeface="Playfair Display"/>
-      <p:regular r:id="rId15"/>
-      <p:bold r:id="rId16"/>
-      <p:italic r:id="rId17"/>
-      <p:boldItalic r:id="rId18"/>
+      <p:regular r:id="rId16"/>
+      <p:bold r:id="rId17"/>
+      <p:italic r:id="rId18"/>
+      <p:boldItalic r:id="rId19"/>
     </p:embeddedFont>
     <p:embeddedFont>
       <p:font typeface="Montserrat"/>
-      <p:regular r:id="rId19"/>
-      <p:bold r:id="rId20"/>
-      <p:italic r:id="rId21"/>
-      <p:boldItalic r:id="rId22"/>
+      <p:regular r:id="rId20"/>
+      <p:bold r:id="rId21"/>
+      <p:italic r:id="rId22"/>
+      <p:boldItalic r:id="rId23"/>
     </p:embeddedFont>
     <p:embeddedFont>
       <p:font typeface="Oswald"/>
-      <p:regular r:id="rId23"/>
-      <p:bold r:id="rId24"/>
+      <p:regular r:id="rId24"/>
+      <p:bold r:id="rId25"/>
     </p:embeddedFont>
   </p:embeddedFontLst>
   <p:defaultTextStyle>
@@ -814,6 +815,105 @@
 </p:notes>
 </file>
 
+<file path=ppt/notesSlides/notesSlide10.xml><?xml version="1.0" encoding="utf-8"?>
+<p:notes xmlns:a="http://schemas.openxmlformats.org/drawingml/2006/main" xmlns:r="http://schemas.openxmlformats.org/officeDocument/2006/relationships" xmlns:mc="http://schemas.openxmlformats.org/markup-compatibility/2006" xmlns:mv="urn:schemas-microsoft-com:mac:vml" xmlns:p="http://schemas.openxmlformats.org/presentationml/2006/main" xmlns:c="http://schemas.openxmlformats.org/drawingml/2006/chart" xmlns:dgm="http://schemas.openxmlformats.org/drawingml/2006/diagram" xmlns:o="urn:schemas-microsoft-com:office:office" xmlns:v="urn:schemas-microsoft-com:vml" xmlns:pvml="urn:schemas-microsoft-com:office:powerpoint" xmlns:com="http://schemas.openxmlformats.org/drawingml/2006/compatibility" xmlns:p14="http://schemas.microsoft.com/office/powerpoint/2010/main" xmlns:p15="http://schemas.microsoft.com/office/powerpoint/2012/main" xmlns:ahyp="http://schemas.microsoft.com/office/drawing/2018/hyperlinkcolor" showMasterPhAnim="0" showMasterSp="0">
+  <p:cSld>
+    <p:spTree>
+      <p:nvGrpSpPr>
+        <p:cNvPr id="136" name="Shape 136"/>
+        <p:cNvGrpSpPr/>
+        <p:nvPr/>
+      </p:nvGrpSpPr>
+      <p:grpSpPr>
+        <a:xfrm>
+          <a:off x="0" y="0"/>
+          <a:ext cx="0" cy="0"/>
+          <a:chOff x="0" y="0"/>
+          <a:chExt cx="0" cy="0"/>
+        </a:xfrm>
+      </p:grpSpPr>
+      <p:sp>
+        <p:nvSpPr>
+          <p:cNvPr id="137" name="Google Shape;137;g126a86fd376_0_69:notes"/>
+          <p:cNvSpPr/>
+          <p:nvPr>
+            <p:ph idx="2" type="sldImg"/>
+          </p:nvPr>
+        </p:nvSpPr>
+        <p:spPr>
+          <a:xfrm>
+            <a:off x="381300" y="685800"/>
+            <a:ext cx="6096000" cy="3429000"/>
+          </a:xfrm>
+          <a:custGeom>
+            <a:rect b="b" l="l" r="r" t="t"/>
+            <a:pathLst>
+              <a:path extrusionOk="0" h="120000" w="120000">
+                <a:moveTo>
+                  <a:pt x="0" y="0"/>
+                </a:moveTo>
+                <a:lnTo>
+                  <a:pt x="120000" y="0"/>
+                </a:lnTo>
+                <a:lnTo>
+                  <a:pt x="120000" y="120000"/>
+                </a:lnTo>
+                <a:lnTo>
+                  <a:pt x="0" y="120000"/>
+                </a:lnTo>
+                <a:close/>
+              </a:path>
+            </a:pathLst>
+          </a:custGeom>
+        </p:spPr>
+      </p:sp>
+      <p:sp>
+        <p:nvSpPr>
+          <p:cNvPr id="138" name="Google Shape;138;g126a86fd376_0_69:notes"/>
+          <p:cNvSpPr txBox="1"/>
+          <p:nvPr>
+            <p:ph idx="1" type="body"/>
+          </p:nvPr>
+        </p:nvSpPr>
+        <p:spPr>
+          <a:xfrm>
+            <a:off x="685800" y="4343400"/>
+            <a:ext cx="5486400" cy="4114800"/>
+          </a:xfrm>
+          <a:prstGeom prst="rect">
+            <a:avLst/>
+          </a:prstGeom>
+        </p:spPr>
+        <p:txBody>
+          <a:bodyPr anchorCtr="0" anchor="t" bIns="91425" lIns="91425" spcFirstLastPara="1" rIns="91425" wrap="square" tIns="91425">
+            <a:noAutofit/>
+          </a:bodyPr>
+          <a:lstStyle/>
+          <a:p>
+            <a:pPr indent="0" lvl="0" marL="0" rtl="0" algn="l">
+              <a:spcBef>
+                <a:spcPts val="0"/>
+              </a:spcBef>
+              <a:spcAft>
+                <a:spcPts val="0"/>
+              </a:spcAft>
+              <a:buNone/>
+            </a:pPr>
+            <a:r>
+              <a:t/>
+            </a:r>
+            <a:endParaRPr/>
+          </a:p>
+        </p:txBody>
+      </p:sp>
+    </p:spTree>
+  </p:cSld>
+  <p:clrMapOvr>
+    <a:masterClrMapping/>
+  </p:clrMapOvr>
+</p:notes>
+</file>
+
 <file path=ppt/notesSlides/notesSlide2.xml><?xml version="1.0" encoding="utf-8"?>
 <p:notes xmlns:a="http://schemas.openxmlformats.org/drawingml/2006/main" xmlns:r="http://schemas.openxmlformats.org/officeDocument/2006/relationships" xmlns:mc="http://schemas.openxmlformats.org/markup-compatibility/2006" xmlns:mv="urn:schemas-microsoft-com:mac:vml" xmlns:p="http://schemas.openxmlformats.org/presentationml/2006/main" xmlns:c="http://schemas.openxmlformats.org/drawingml/2006/chart" xmlns:dgm="http://schemas.openxmlformats.org/drawingml/2006/diagram" xmlns:o="urn:schemas-microsoft-com:office:office" xmlns:v="urn:schemas-microsoft-com:vml" xmlns:pvml="urn:schemas-microsoft-com:office:powerpoint" xmlns:com="http://schemas.openxmlformats.org/drawingml/2006/compatibility" xmlns:p14="http://schemas.microsoft.com/office/powerpoint/2010/main" xmlns:p15="http://schemas.microsoft.com/office/powerpoint/2012/main" xmlns:ahyp="http://schemas.microsoft.com/office/drawing/2018/hyperlinkcolor" showMasterPhAnim="0" showMasterSp="0">
   <p:cSld>
@@ -899,6 +999,43 @@
               <a:buNone/>
             </a:pPr>
             <a:r>
+              <a:rPr lang="en"/>
+              <a:t>Just like teaching or giving context and asking questions to students in order to check their understanding</a:t>
+            </a:r>
+            <a:endParaRPr/>
+          </a:p>
+          <a:p>
+            <a:pPr indent="0" lvl="0" marL="0" rtl="0" algn="l">
+              <a:spcBef>
+                <a:spcPts val="0"/>
+              </a:spcBef>
+              <a:spcAft>
+                <a:spcPts val="0"/>
+              </a:spcAft>
+              <a:buClr>
+                <a:schemeClr val="dk1"/>
+              </a:buClr>
+              <a:buSzPts val="1100"/>
+              <a:buFont typeface="Arial"/>
+              <a:buNone/>
+            </a:pPr>
+            <a:r>
+              <a:rPr lang="en"/>
+              <a:t>machine comprehension of human language.</a:t>
+            </a:r>
+            <a:endParaRPr/>
+          </a:p>
+          <a:p>
+            <a:pPr indent="0" lvl="0" marL="0" rtl="0" algn="l">
+              <a:spcBef>
+                <a:spcPts val="0"/>
+              </a:spcBef>
+              <a:spcAft>
+                <a:spcPts val="0"/>
+              </a:spcAft>
+              <a:buNone/>
+            </a:pPr>
+            <a:r>
               <a:t/>
             </a:r>
             <a:endParaRPr/>
@@ -932,7 +1069,7 @@
       </p:grpSpPr>
       <p:sp>
         <p:nvSpPr>
-          <p:cNvPr id="70" name="Google Shape;70;g126a86fd376_0_54:notes"/>
+          <p:cNvPr id="70" name="Google Shape;70;g126a86fd376_0_159:notes"/>
           <p:cNvSpPr/>
           <p:nvPr>
             <p:ph idx="2" type="sldImg"/>
@@ -967,7 +1104,7 @@
       </p:sp>
       <p:sp>
         <p:nvSpPr>
-          <p:cNvPr id="71" name="Google Shape;71;g126a86fd376_0_54:notes"/>
+          <p:cNvPr id="71" name="Google Shape;71;g126a86fd376_0_159:notes"/>
           <p:cNvSpPr txBox="1"/>
           <p:nvPr>
             <p:ph idx="1" type="body"/>
@@ -1031,7 +1168,7 @@
       </p:grpSpPr>
       <p:sp>
         <p:nvSpPr>
-          <p:cNvPr id="76" name="Google Shape;76;g126a86fd376_0_145:notes"/>
+          <p:cNvPr id="76" name="Google Shape;76;g126a86fd376_0_165:notes"/>
           <p:cNvSpPr/>
           <p:nvPr>
             <p:ph idx="2" type="sldImg"/>
@@ -1066,7 +1203,7 @@
       </p:sp>
       <p:sp>
         <p:nvSpPr>
-          <p:cNvPr id="77" name="Google Shape;77;g126a86fd376_0_145:notes"/>
+          <p:cNvPr id="77" name="Google Shape;77;g126a86fd376_0_165:notes"/>
           <p:cNvSpPr txBox="1"/>
           <p:nvPr>
             <p:ph idx="1" type="body"/>
@@ -1130,7 +1267,7 @@
       </p:grpSpPr>
       <p:sp>
         <p:nvSpPr>
-          <p:cNvPr id="82" name="Google Shape;82;g126a86fd376_0_59:notes"/>
+          <p:cNvPr id="82" name="Google Shape;82;g126a86fd376_0_54:notes"/>
           <p:cNvSpPr/>
           <p:nvPr>
             <p:ph idx="2" type="sldImg"/>
@@ -1165,7 +1302,7 @@
       </p:sp>
       <p:sp>
         <p:nvSpPr>
-          <p:cNvPr id="83" name="Google Shape;83;g126a86fd376_0_59:notes"/>
+          <p:cNvPr id="83" name="Google Shape;83;g126a86fd376_0_54:notes"/>
           <p:cNvSpPr txBox="1"/>
           <p:nvPr>
             <p:ph idx="1" type="body"/>
@@ -1215,7 +1352,7 @@
   <p:cSld>
     <p:spTree>
       <p:nvGrpSpPr>
-        <p:cNvPr id="87" name="Shape 87"/>
+        <p:cNvPr id="93" name="Shape 93"/>
         <p:cNvGrpSpPr/>
         <p:nvPr/>
       </p:nvGrpSpPr>
@@ -1229,7 +1366,7 @@
       </p:grpSpPr>
       <p:sp>
         <p:nvSpPr>
-          <p:cNvPr id="88" name="Google Shape;88;g126a86fd376_0_64:notes"/>
+          <p:cNvPr id="94" name="Google Shape;94;g126a86fd376_0_59:notes"/>
           <p:cNvSpPr/>
           <p:nvPr>
             <p:ph idx="2" type="sldImg"/>
@@ -1264,7 +1401,7 @@
       </p:sp>
       <p:sp>
         <p:nvSpPr>
-          <p:cNvPr id="89" name="Google Shape;89;g126a86fd376_0_64:notes"/>
+          <p:cNvPr id="95" name="Google Shape;95;g126a86fd376_0_59:notes"/>
           <p:cNvSpPr txBox="1"/>
           <p:nvPr>
             <p:ph idx="1" type="body"/>
@@ -1314,7 +1451,7 @@
   <p:cSld>
     <p:spTree>
       <p:nvGrpSpPr>
-        <p:cNvPr id="96" name="Shape 96"/>
+        <p:cNvPr id="99" name="Shape 99"/>
         <p:cNvGrpSpPr/>
         <p:nvPr/>
       </p:nvGrpSpPr>
@@ -1328,7 +1465,7 @@
       </p:grpSpPr>
       <p:sp>
         <p:nvSpPr>
-          <p:cNvPr id="97" name="Google Shape;97;g126a86fd376_0_103:notes"/>
+          <p:cNvPr id="100" name="Google Shape;100;g126a86fd376_0_64:notes"/>
           <p:cNvSpPr/>
           <p:nvPr>
             <p:ph idx="2" type="sldImg"/>
@@ -1363,7 +1500,7 @@
       </p:sp>
       <p:sp>
         <p:nvSpPr>
-          <p:cNvPr id="98" name="Google Shape;98;g126a86fd376_0_103:notes"/>
+          <p:cNvPr id="101" name="Google Shape;101;g126a86fd376_0_64:notes"/>
           <p:cNvSpPr txBox="1"/>
           <p:nvPr>
             <p:ph idx="1" type="body"/>
@@ -1413,7 +1550,7 @@
   <p:cSld>
     <p:spTree>
       <p:nvGrpSpPr>
-        <p:cNvPr id="113" name="Shape 113"/>
+        <p:cNvPr id="108" name="Shape 108"/>
         <p:cNvGrpSpPr/>
         <p:nvPr/>
       </p:nvGrpSpPr>
@@ -1427,7 +1564,7 @@
       </p:grpSpPr>
       <p:sp>
         <p:nvSpPr>
-          <p:cNvPr id="114" name="Google Shape;114;g126a86fd376_0_80:notes"/>
+          <p:cNvPr id="109" name="Google Shape;109;g126a86fd376_0_103:notes"/>
           <p:cNvSpPr/>
           <p:nvPr>
             <p:ph idx="2" type="sldImg"/>
@@ -1462,7 +1599,7 @@
       </p:sp>
       <p:sp>
         <p:nvSpPr>
-          <p:cNvPr id="115" name="Google Shape;115;g126a86fd376_0_80:notes"/>
+          <p:cNvPr id="110" name="Google Shape;110;g126a86fd376_0_103:notes"/>
           <p:cNvSpPr txBox="1"/>
           <p:nvPr>
             <p:ph idx="1" type="body"/>
@@ -1512,7 +1649,7 @@
   <p:cSld>
     <p:spTree>
       <p:nvGrpSpPr>
-        <p:cNvPr id="124" name="Shape 124"/>
+        <p:cNvPr id="125" name="Shape 125"/>
         <p:cNvGrpSpPr/>
         <p:nvPr/>
       </p:nvGrpSpPr>
@@ -1526,7 +1663,7 @@
       </p:grpSpPr>
       <p:sp>
         <p:nvSpPr>
-          <p:cNvPr id="125" name="Google Shape;125;g126a86fd376_0_69:notes"/>
+          <p:cNvPr id="126" name="Google Shape;126;g126a86fd376_0_80:notes"/>
           <p:cNvSpPr/>
           <p:nvPr>
             <p:ph idx="2" type="sldImg"/>
@@ -1561,7 +1698,7 @@
       </p:sp>
       <p:sp>
         <p:nvSpPr>
-          <p:cNvPr id="126" name="Google Shape;126;g126a86fd376_0_69:notes"/>
+          <p:cNvPr id="127" name="Google Shape;127;g126a86fd376_0_80:notes"/>
           <p:cNvSpPr txBox="1"/>
           <p:nvPr>
             <p:ph idx="1" type="body"/>
@@ -7468,6 +7605,111 @@
 </p:sld>
 </file>
 
+<file path=ppt/slides/slide10.xml><?xml version="1.0" encoding="utf-8"?>
+<p:sld xmlns:a="http://schemas.openxmlformats.org/drawingml/2006/main" xmlns:r="http://schemas.openxmlformats.org/officeDocument/2006/relationships" xmlns:mc="http://schemas.openxmlformats.org/markup-compatibility/2006" xmlns:mv="urn:schemas-microsoft-com:mac:vml" xmlns:p="http://schemas.openxmlformats.org/presentationml/2006/main" xmlns:c="http://schemas.openxmlformats.org/drawingml/2006/chart" xmlns:dgm="http://schemas.openxmlformats.org/drawingml/2006/diagram" xmlns:o="urn:schemas-microsoft-com:office:office" xmlns:v="urn:schemas-microsoft-com:vml" xmlns:pvml="urn:schemas-microsoft-com:office:powerpoint" xmlns:com="http://schemas.openxmlformats.org/drawingml/2006/compatibility" xmlns:p14="http://schemas.microsoft.com/office/powerpoint/2010/main" xmlns:p15="http://schemas.microsoft.com/office/powerpoint/2012/main" xmlns:ahyp="http://schemas.microsoft.com/office/drawing/2018/hyperlinkcolor">
+  <p:cSld>
+    <p:spTree>
+      <p:nvGrpSpPr>
+        <p:cNvPr id="139" name="Shape 139"/>
+        <p:cNvGrpSpPr/>
+        <p:nvPr/>
+      </p:nvGrpSpPr>
+      <p:grpSpPr>
+        <a:xfrm>
+          <a:off x="0" y="0"/>
+          <a:ext cx="0" cy="0"/>
+          <a:chOff x="0" y="0"/>
+          <a:chExt cx="0" cy="0"/>
+        </a:xfrm>
+      </p:grpSpPr>
+      <p:sp>
+        <p:nvSpPr>
+          <p:cNvPr id="140" name="Google Shape;140;p22"/>
+          <p:cNvSpPr txBox="1"/>
+          <p:nvPr>
+            <p:ph type="title"/>
+          </p:nvPr>
+        </p:nvSpPr>
+        <p:spPr>
+          <a:xfrm>
+            <a:off x="311700" y="445025"/>
+            <a:ext cx="8520600" cy="572700"/>
+          </a:xfrm>
+          <a:prstGeom prst="rect">
+            <a:avLst/>
+          </a:prstGeom>
+        </p:spPr>
+        <p:txBody>
+          <a:bodyPr anchorCtr="0" anchor="t" bIns="91425" lIns="91425" spcFirstLastPara="1" rIns="91425" wrap="square" tIns="91425">
+            <a:normAutofit fontScale="90000"/>
+          </a:bodyPr>
+          <a:lstStyle/>
+          <a:p>
+            <a:pPr indent="0" lvl="0" marL="0" rtl="0" algn="l">
+              <a:spcBef>
+                <a:spcPts val="0"/>
+              </a:spcBef>
+              <a:spcAft>
+                <a:spcPts val="0"/>
+              </a:spcAft>
+              <a:buNone/>
+            </a:pPr>
+            <a:r>
+              <a:rPr lang="en"/>
+              <a:t>Results</a:t>
+            </a:r>
+            <a:endParaRPr/>
+          </a:p>
+        </p:txBody>
+      </p:sp>
+      <p:sp>
+        <p:nvSpPr>
+          <p:cNvPr id="141" name="Google Shape;141;p22"/>
+          <p:cNvSpPr txBox="1"/>
+          <p:nvPr>
+            <p:ph idx="1" type="body"/>
+          </p:nvPr>
+        </p:nvSpPr>
+        <p:spPr>
+          <a:xfrm>
+            <a:off x="311700" y="1234075"/>
+            <a:ext cx="8520600" cy="3334800"/>
+          </a:xfrm>
+          <a:prstGeom prst="rect">
+            <a:avLst/>
+          </a:prstGeom>
+        </p:spPr>
+        <p:txBody>
+          <a:bodyPr anchorCtr="0" anchor="t" bIns="91425" lIns="91425" spcFirstLastPara="1" rIns="91425" wrap="square" tIns="91425">
+            <a:normAutofit/>
+          </a:bodyPr>
+          <a:lstStyle/>
+          <a:p>
+            <a:pPr indent="0" lvl="0" marL="0" rtl="0" algn="l">
+              <a:spcBef>
+                <a:spcPts val="0"/>
+              </a:spcBef>
+              <a:spcAft>
+                <a:spcPts val="1200"/>
+              </a:spcAft>
+              <a:buNone/>
+            </a:pPr>
+            <a:r>
+              <a:rPr lang="en"/>
+              <a:t>Graphs and accuracies</a:t>
+            </a:r>
+            <a:endParaRPr/>
+          </a:p>
+        </p:txBody>
+      </p:sp>
+    </p:spTree>
+  </p:cSld>
+  <p:clrMapOvr>
+    <a:masterClrMapping/>
+  </p:clrMapOvr>
+</p:sld>
+</file>
+
 <file path=ppt/slides/slide2.xml><?xml version="1.0" encoding="utf-8"?>
 <p:sld xmlns:a="http://schemas.openxmlformats.org/drawingml/2006/main" xmlns:r="http://schemas.openxmlformats.org/officeDocument/2006/relationships" xmlns:mc="http://schemas.openxmlformats.org/markup-compatibility/2006" xmlns:mv="urn:schemas-microsoft-com:mac:vml" xmlns:p="http://schemas.openxmlformats.org/presentationml/2006/main" xmlns:c="http://schemas.openxmlformats.org/drawingml/2006/chart" xmlns:dgm="http://schemas.openxmlformats.org/drawingml/2006/diagram" xmlns:o="urn:schemas-microsoft-com:office:office" xmlns:v="urn:schemas-microsoft-com:vml" xmlns:pvml="urn:schemas-microsoft-com:office:powerpoint" xmlns:com="http://schemas.openxmlformats.org/drawingml/2006/compatibility" xmlns:p14="http://schemas.microsoft.com/office/powerpoint/2010/main" xmlns:p15="http://schemas.microsoft.com/office/powerpoint/2012/main" xmlns:ahyp="http://schemas.microsoft.com/office/drawing/2018/hyperlinkcolor">
   <p:cSld>
@@ -7577,7 +7819,7 @@
             </a:pPr>
             <a:r>
               <a:rPr lang="en"/>
-              <a:t>Types of Question Answering</a:t>
+              <a:t>Why is it important ?</a:t>
             </a:r>
             <a:endParaRPr/>
           </a:p>
@@ -7594,7 +7836,7 @@
             </a:pPr>
             <a:r>
               <a:rPr lang="en"/>
-              <a:t>What is SQuAD?</a:t>
+              <a:t>Types of Question Answers</a:t>
             </a:r>
             <a:endParaRPr/>
           </a:p>
@@ -7631,7 +7873,7 @@
         </p:blipFill>
         <p:spPr>
           <a:xfrm>
-            <a:off x="4572000" y="1017725"/>
+            <a:off x="4461100" y="1260900"/>
             <a:ext cx="4095326" cy="2730226"/>
           </a:xfrm>
           <a:prstGeom prst="rect">
@@ -7702,52 +7944,40 @@
             </a:pPr>
             <a:r>
               <a:rPr lang="en"/>
-              <a:t>Motivation</a:t>
+              <a:t>Task</a:t>
             </a:r>
             <a:endParaRPr/>
           </a:p>
         </p:txBody>
       </p:sp>
-      <p:sp>
-        <p:nvSpPr>
+      <p:pic>
+        <p:nvPicPr>
           <p:cNvPr id="74" name="Google Shape;74;p15"/>
-          <p:cNvSpPr txBox="1"/>
-          <p:nvPr>
-            <p:ph idx="1" type="body"/>
-          </p:nvPr>
-        </p:nvSpPr>
+          <p:cNvPicPr preferRelativeResize="0"/>
+          <p:nvPr/>
+        </p:nvPicPr>
+        <p:blipFill>
+          <a:blip r:embed="rId3">
+            <a:alphaModFix/>
+          </a:blip>
+          <a:stretch>
+            <a:fillRect/>
+          </a:stretch>
+        </p:blipFill>
         <p:spPr>
           <a:xfrm>
-            <a:off x="311700" y="1234075"/>
-            <a:ext cx="8520600" cy="3334800"/>
+            <a:off x="1319338" y="1017727"/>
+            <a:ext cx="6505325" cy="3741100"/>
           </a:xfrm>
           <a:prstGeom prst="rect">
             <a:avLst/>
           </a:prstGeom>
+          <a:noFill/>
+          <a:ln>
+            <a:noFill/>
+          </a:ln>
         </p:spPr>
-        <p:txBody>
-          <a:bodyPr anchorCtr="0" anchor="t" bIns="91425" lIns="91425" spcFirstLastPara="1" rIns="91425" wrap="square" tIns="91425">
-            <a:normAutofit/>
-          </a:bodyPr>
-          <a:lstStyle/>
-          <a:p>
-            <a:pPr indent="0" lvl="0" marL="0" rtl="0" algn="l">
-              <a:spcBef>
-                <a:spcPts val="0"/>
-              </a:spcBef>
-              <a:spcAft>
-                <a:spcPts val="1200"/>
-              </a:spcAft>
-              <a:buNone/>
-            </a:pPr>
-            <a:r>
-              <a:rPr lang="en"/>
-              <a:t>Assignment - 3 Analysis</a:t>
-            </a:r>
-            <a:endParaRPr/>
-          </a:p>
-        </p:txBody>
-      </p:sp>
+      </p:pic>
     </p:spTree>
   </p:cSld>
   <p:clrMapOvr>
@@ -7807,7 +8037,7 @@
             </a:pPr>
             <a:r>
               <a:rPr lang="en"/>
-              <a:t>Contribution</a:t>
+              <a:t>SQuAD</a:t>
             </a:r>
             <a:endParaRPr/>
           </a:p>
@@ -7819,17 +8049,18 @@
           <p:cNvPicPr preferRelativeResize="0"/>
           <p:nvPr/>
         </p:nvPicPr>
-        <p:blipFill rotWithShape="1">
+        <p:blipFill>
           <a:blip r:embed="rId3">
             <a:alphaModFix/>
           </a:blip>
-          <a:srcRect b="19389" l="0" r="0" t="17267"/>
-          <a:stretch/>
+          <a:stretch>
+            <a:fillRect/>
+          </a:stretch>
         </p:blipFill>
         <p:spPr>
           <a:xfrm>
-            <a:off x="2845443" y="1941150"/>
-            <a:ext cx="3453119" cy="2187300"/>
+            <a:off x="1712250" y="643375"/>
+            <a:ext cx="6060350" cy="4236799"/>
           </a:xfrm>
           <a:prstGeom prst="rect">
             <a:avLst/>
@@ -7899,6 +8130,528 @@
             </a:pPr>
             <a:r>
               <a:rPr lang="en"/>
+              <a:t>Motivation</a:t>
+            </a:r>
+            <a:endParaRPr/>
+          </a:p>
+        </p:txBody>
+      </p:sp>
+      <p:sp>
+        <p:nvSpPr>
+          <p:cNvPr id="86" name="Google Shape;86;p17"/>
+          <p:cNvSpPr txBox="1"/>
+          <p:nvPr>
+            <p:ph idx="1" type="body"/>
+          </p:nvPr>
+        </p:nvSpPr>
+        <p:spPr>
+          <a:xfrm>
+            <a:off x="311700" y="1234075"/>
+            <a:ext cx="5054100" cy="3334800"/>
+          </a:xfrm>
+          <a:prstGeom prst="rect">
+            <a:avLst/>
+          </a:prstGeom>
+        </p:spPr>
+        <p:txBody>
+          <a:bodyPr anchorCtr="0" anchor="t" bIns="91425" lIns="91425" spcFirstLastPara="1" rIns="91425" wrap="square" tIns="91425">
+            <a:normAutofit/>
+          </a:bodyPr>
+          <a:lstStyle/>
+          <a:p>
+            <a:pPr indent="-342900" lvl="0" marL="457200" rtl="0" algn="l">
+              <a:spcBef>
+                <a:spcPts val="0"/>
+              </a:spcBef>
+              <a:spcAft>
+                <a:spcPts val="0"/>
+              </a:spcAft>
+              <a:buSzPts val="1800"/>
+              <a:buChar char="●"/>
+            </a:pPr>
+            <a:r>
+              <a:rPr lang="en"/>
+              <a:t>Doesn’t work well in real-world scenarios</a:t>
+            </a:r>
+            <a:endParaRPr/>
+          </a:p>
+          <a:p>
+            <a:pPr indent="-342900" lvl="0" marL="457200" rtl="0" algn="l">
+              <a:spcBef>
+                <a:spcPts val="0"/>
+              </a:spcBef>
+              <a:spcAft>
+                <a:spcPts val="0"/>
+              </a:spcAft>
+              <a:buSzPts val="1800"/>
+              <a:buChar char="●"/>
+            </a:pPr>
+            <a:r>
+              <a:rPr lang="en"/>
+              <a:t>All questions - equally important</a:t>
+            </a:r>
+            <a:endParaRPr/>
+          </a:p>
+          <a:p>
+            <a:pPr indent="-342900" lvl="0" marL="457200" rtl="0" algn="l">
+              <a:spcBef>
+                <a:spcPts val="0"/>
+              </a:spcBef>
+              <a:spcAft>
+                <a:spcPts val="0"/>
+              </a:spcAft>
+              <a:buSzPts val="1800"/>
+              <a:buChar char="●"/>
+            </a:pPr>
+            <a:r>
+              <a:rPr lang="en"/>
+              <a:t>Data Imbalance</a:t>
+            </a:r>
+            <a:endParaRPr/>
+          </a:p>
+          <a:p>
+            <a:pPr indent="0" lvl="0" marL="0" rtl="0" algn="l">
+              <a:spcBef>
+                <a:spcPts val="1200"/>
+              </a:spcBef>
+              <a:spcAft>
+                <a:spcPts val="1200"/>
+              </a:spcAft>
+              <a:buNone/>
+            </a:pPr>
+            <a:r>
+              <a:t/>
+            </a:r>
+            <a:endParaRPr/>
+          </a:p>
+        </p:txBody>
+      </p:sp>
+      <p:pic>
+        <p:nvPicPr>
+          <p:cNvPr id="87" name="Google Shape;87;p17"/>
+          <p:cNvPicPr preferRelativeResize="0"/>
+          <p:nvPr/>
+        </p:nvPicPr>
+        <p:blipFill>
+          <a:blip r:embed="rId3">
+            <a:alphaModFix/>
+          </a:blip>
+          <a:stretch>
+            <a:fillRect/>
+          </a:stretch>
+        </p:blipFill>
+        <p:spPr>
+          <a:xfrm>
+            <a:off x="5815313" y="76525"/>
+            <a:ext cx="2819400" cy="2190750"/>
+          </a:xfrm>
+          <a:prstGeom prst="rect">
+            <a:avLst/>
+          </a:prstGeom>
+          <a:noFill/>
+          <a:ln>
+            <a:noFill/>
+          </a:ln>
+        </p:spPr>
+      </p:pic>
+      <p:pic>
+        <p:nvPicPr>
+          <p:cNvPr id="88" name="Google Shape;88;p17"/>
+          <p:cNvPicPr preferRelativeResize="0"/>
+          <p:nvPr/>
+        </p:nvPicPr>
+        <p:blipFill>
+          <a:blip r:embed="rId4">
+            <a:alphaModFix/>
+          </a:blip>
+          <a:stretch>
+            <a:fillRect/>
+          </a:stretch>
+        </p:blipFill>
+        <p:spPr>
+          <a:xfrm>
+            <a:off x="5405022" y="2495550"/>
+            <a:ext cx="3539253" cy="2395525"/>
+          </a:xfrm>
+          <a:prstGeom prst="rect">
+            <a:avLst/>
+          </a:prstGeom>
+          <a:noFill/>
+          <a:ln>
+            <a:noFill/>
+          </a:ln>
+        </p:spPr>
+      </p:pic>
+      <p:sp>
+        <p:nvSpPr>
+          <p:cNvPr id="89" name="Google Shape;89;p17"/>
+          <p:cNvSpPr txBox="1"/>
+          <p:nvPr/>
+        </p:nvSpPr>
+        <p:spPr>
+          <a:xfrm>
+            <a:off x="6093300" y="4743300"/>
+            <a:ext cx="2162700" cy="400200"/>
+          </a:xfrm>
+          <a:prstGeom prst="rect">
+            <a:avLst/>
+          </a:prstGeom>
+          <a:noFill/>
+          <a:ln>
+            <a:noFill/>
+          </a:ln>
+        </p:spPr>
+        <p:txBody>
+          <a:bodyPr anchorCtr="0" anchor="t" bIns="91425" lIns="91425" spcFirstLastPara="1" rIns="91425" wrap="square" tIns="91425">
+            <a:spAutoFit/>
+          </a:bodyPr>
+          <a:lstStyle/>
+          <a:p>
+            <a:pPr indent="0" lvl="0" marL="0" rtl="0" algn="l">
+              <a:spcBef>
+                <a:spcPts val="0"/>
+              </a:spcBef>
+              <a:spcAft>
+                <a:spcPts val="0"/>
+              </a:spcAft>
+              <a:buNone/>
+            </a:pPr>
+            <a:r>
+              <a:rPr lang="en">
+                <a:latin typeface="Playfair Display"/>
+                <a:ea typeface="Playfair Display"/>
+                <a:cs typeface="Playfair Display"/>
+                <a:sym typeface="Playfair Display"/>
+              </a:rPr>
+              <a:t>Corresponding F1 scores</a:t>
+            </a:r>
+            <a:endParaRPr>
+              <a:latin typeface="Playfair Display"/>
+              <a:ea typeface="Playfair Display"/>
+              <a:cs typeface="Playfair Display"/>
+              <a:sym typeface="Playfair Display"/>
+            </a:endParaRPr>
+          </a:p>
+        </p:txBody>
+      </p:sp>
+      <p:sp>
+        <p:nvSpPr>
+          <p:cNvPr id="90" name="Google Shape;90;p17"/>
+          <p:cNvSpPr txBox="1"/>
+          <p:nvPr/>
+        </p:nvSpPr>
+        <p:spPr>
+          <a:xfrm>
+            <a:off x="6143675" y="2109400"/>
+            <a:ext cx="2162700" cy="400200"/>
+          </a:xfrm>
+          <a:prstGeom prst="rect">
+            <a:avLst/>
+          </a:prstGeom>
+          <a:noFill/>
+          <a:ln>
+            <a:noFill/>
+          </a:ln>
+        </p:spPr>
+        <p:txBody>
+          <a:bodyPr anchorCtr="0" anchor="t" bIns="91425" lIns="91425" spcFirstLastPara="1" rIns="91425" wrap="square" tIns="91425">
+            <a:spAutoFit/>
+          </a:bodyPr>
+          <a:lstStyle/>
+          <a:p>
+            <a:pPr indent="0" lvl="0" marL="0" rtl="0" algn="ctr">
+              <a:spcBef>
+                <a:spcPts val="0"/>
+              </a:spcBef>
+              <a:spcAft>
+                <a:spcPts val="0"/>
+              </a:spcAft>
+              <a:buNone/>
+            </a:pPr>
+            <a:r>
+              <a:rPr lang="en">
+                <a:latin typeface="Playfair Display"/>
+                <a:ea typeface="Playfair Display"/>
+                <a:cs typeface="Playfair Display"/>
+                <a:sym typeface="Playfair Display"/>
+              </a:rPr>
+              <a:t>Question </a:t>
+            </a:r>
+            <a:r>
+              <a:rPr lang="en">
+                <a:latin typeface="Playfair Display"/>
+                <a:ea typeface="Playfair Display"/>
+                <a:cs typeface="Playfair Display"/>
+                <a:sym typeface="Playfair Display"/>
+              </a:rPr>
+              <a:t>Split Up</a:t>
+            </a:r>
+            <a:endParaRPr>
+              <a:latin typeface="Playfair Display"/>
+              <a:ea typeface="Playfair Display"/>
+              <a:cs typeface="Playfair Display"/>
+              <a:sym typeface="Playfair Display"/>
+            </a:endParaRPr>
+          </a:p>
+        </p:txBody>
+      </p:sp>
+      <p:pic>
+        <p:nvPicPr>
+          <p:cNvPr id="91" name="Google Shape;91;p17"/>
+          <p:cNvPicPr preferRelativeResize="0"/>
+          <p:nvPr/>
+        </p:nvPicPr>
+        <p:blipFill>
+          <a:blip r:embed="rId5">
+            <a:alphaModFix/>
+          </a:blip>
+          <a:stretch>
+            <a:fillRect/>
+          </a:stretch>
+        </p:blipFill>
+        <p:spPr>
+          <a:xfrm>
+            <a:off x="1310026" y="2633985"/>
+            <a:ext cx="2492922" cy="2190750"/>
+          </a:xfrm>
+          <a:prstGeom prst="rect">
+            <a:avLst/>
+          </a:prstGeom>
+          <a:noFill/>
+          <a:ln>
+            <a:noFill/>
+          </a:ln>
+        </p:spPr>
+      </p:pic>
+      <p:sp>
+        <p:nvSpPr>
+          <p:cNvPr id="92" name="Google Shape;92;p17"/>
+          <p:cNvSpPr txBox="1"/>
+          <p:nvPr/>
+        </p:nvSpPr>
+        <p:spPr>
+          <a:xfrm>
+            <a:off x="1045313" y="4721275"/>
+            <a:ext cx="3202500" cy="400200"/>
+          </a:xfrm>
+          <a:prstGeom prst="rect">
+            <a:avLst/>
+          </a:prstGeom>
+          <a:noFill/>
+          <a:ln>
+            <a:noFill/>
+          </a:ln>
+        </p:spPr>
+        <p:txBody>
+          <a:bodyPr anchorCtr="0" anchor="t" bIns="91425" lIns="91425" spcFirstLastPara="1" rIns="91425" wrap="square" tIns="91425">
+            <a:spAutoFit/>
+          </a:bodyPr>
+          <a:lstStyle/>
+          <a:p>
+            <a:pPr indent="0" lvl="0" marL="0" rtl="0" algn="l">
+              <a:spcBef>
+                <a:spcPts val="0"/>
+              </a:spcBef>
+              <a:spcAft>
+                <a:spcPts val="0"/>
+              </a:spcAft>
+              <a:buNone/>
+            </a:pPr>
+            <a:r>
+              <a:rPr lang="en">
+                <a:latin typeface="Playfair Display"/>
+                <a:ea typeface="Playfair Display"/>
+                <a:cs typeface="Playfair Display"/>
+                <a:sym typeface="Playfair Display"/>
+              </a:rPr>
+              <a:t>Numeric vs Non-Numeric F1 scores</a:t>
+            </a:r>
+            <a:endParaRPr>
+              <a:latin typeface="Playfair Display"/>
+              <a:ea typeface="Playfair Display"/>
+              <a:cs typeface="Playfair Display"/>
+              <a:sym typeface="Playfair Display"/>
+            </a:endParaRPr>
+          </a:p>
+        </p:txBody>
+      </p:sp>
+    </p:spTree>
+  </p:cSld>
+  <p:clrMapOvr>
+    <a:masterClrMapping/>
+  </p:clrMapOvr>
+  <p:timing>
+    <p:tnLst>
+      <p:par>
+        <p:cTn dur="indefinite" nodeType="tmRoot" restart="never">
+          <p:childTnLst>
+            <p:seq concurrent="1" nextAc="seek">
+              <p:cTn dur="indefinite" id="2" nodeType="mainSeq">
+                <p:childTnLst>
+                  <p:par>
+                    <p:cTn fill="hold">
+                      <p:stCondLst>
+                        <p:cond delay="indefinite"/>
+                      </p:stCondLst>
+                      <p:childTnLst>
+                        <p:par>
+                          <p:cTn fill="hold">
+                            <p:stCondLst>
+                              <p:cond delay="0"/>
+                            </p:stCondLst>
+                            <p:childTnLst>
+                              <p:par>
+                                <p:cTn fill="hold" nodeType="clickEffect" presetClass="exit" presetID="10" presetSubtype="0">
+                                  <p:stCondLst>
+                                    <p:cond delay="0"/>
+                                  </p:stCondLst>
+                                  <p:childTnLst>
+                                    <p:animEffect filter="fade" transition="out">
+                                      <p:cBhvr>
+                                        <p:cTn dur="1300"/>
+                                        <p:tgtEl>
+                                          <p:spTgt spid="91"/>
+                                        </p:tgtEl>
+                                      </p:cBhvr>
+                                    </p:animEffect>
+                                    <p:set>
+                                      <p:cBhvr>
+                                        <p:cTn dur="1" fill="hold">
+                                          <p:stCondLst>
+                                            <p:cond delay="1300"/>
+                                          </p:stCondLst>
+                                        </p:cTn>
+                                        <p:tgtEl>
+                                          <p:spTgt spid="91"/>
+                                        </p:tgtEl>
+                                        <p:attrNameLst>
+                                          <p:attrName>style.visibility</p:attrName>
+                                        </p:attrNameLst>
+                                      </p:cBhvr>
+                                      <p:to>
+                                        <p:strVal val="hidden"/>
+                                      </p:to>
+                                    </p:set>
+                                  </p:childTnLst>
+                                </p:cTn>
+                              </p:par>
+                              <p:par>
+                                <p:cTn fill="hold" nodeType="withEffect" presetClass="exit" presetID="10" presetSubtype="0">
+                                  <p:stCondLst>
+                                    <p:cond delay="0"/>
+                                  </p:stCondLst>
+                                  <p:childTnLst>
+                                    <p:animEffect filter="fade" transition="out">
+                                      <p:cBhvr>
+                                        <p:cTn dur="1300"/>
+                                        <p:tgtEl>
+                                          <p:spTgt spid="92"/>
+                                        </p:tgtEl>
+                                      </p:cBhvr>
+                                    </p:animEffect>
+                                    <p:set>
+                                      <p:cBhvr>
+                                        <p:cTn dur="1" fill="hold">
+                                          <p:stCondLst>
+                                            <p:cond delay="1300"/>
+                                          </p:stCondLst>
+                                        </p:cTn>
+                                        <p:tgtEl>
+                                          <p:spTgt spid="92"/>
+                                        </p:tgtEl>
+                                        <p:attrNameLst>
+                                          <p:attrName>style.visibility</p:attrName>
+                                        </p:attrNameLst>
+                                      </p:cBhvr>
+                                      <p:to>
+                                        <p:strVal val="hidden"/>
+                                      </p:to>
+                                    </p:set>
+                                  </p:childTnLst>
+                                </p:cTn>
+                              </p:par>
+                            </p:childTnLst>
+                          </p:cTn>
+                        </p:par>
+                      </p:childTnLst>
+                    </p:cTn>
+                  </p:par>
+                </p:childTnLst>
+              </p:cTn>
+              <p:prevCondLst>
+                <p:cond evt="onPrev">
+                  <p:tgtEl>
+                    <p:sldTgt/>
+                  </p:tgtEl>
+                </p:cond>
+              </p:prevCondLst>
+              <p:nextCondLst>
+                <p:cond evt="onNext">
+                  <p:tgtEl>
+                    <p:sldTgt/>
+                  </p:tgtEl>
+                </p:cond>
+              </p:nextCondLst>
+            </p:seq>
+          </p:childTnLst>
+        </p:cTn>
+      </p:par>
+    </p:tnLst>
+  </p:timing>
+</p:sld>
+</file>
+
+<file path=ppt/slides/slide6.xml><?xml version="1.0" encoding="utf-8"?>
+<p:sld xmlns:a="http://schemas.openxmlformats.org/drawingml/2006/main" xmlns:r="http://schemas.openxmlformats.org/officeDocument/2006/relationships" xmlns:mc="http://schemas.openxmlformats.org/markup-compatibility/2006" xmlns:mv="urn:schemas-microsoft-com:mac:vml" xmlns:p="http://schemas.openxmlformats.org/presentationml/2006/main" xmlns:c="http://schemas.openxmlformats.org/drawingml/2006/chart" xmlns:dgm="http://schemas.openxmlformats.org/drawingml/2006/diagram" xmlns:o="urn:schemas-microsoft-com:office:office" xmlns:v="urn:schemas-microsoft-com:vml" xmlns:pvml="urn:schemas-microsoft-com:office:powerpoint" xmlns:com="http://schemas.openxmlformats.org/drawingml/2006/compatibility" xmlns:p14="http://schemas.microsoft.com/office/powerpoint/2010/main" xmlns:p15="http://schemas.microsoft.com/office/powerpoint/2012/main" xmlns:ahyp="http://schemas.microsoft.com/office/drawing/2018/hyperlinkcolor">
+  <p:cSld>
+    <p:spTree>
+      <p:nvGrpSpPr>
+        <p:cNvPr id="96" name="Shape 96"/>
+        <p:cNvGrpSpPr/>
+        <p:nvPr/>
+      </p:nvGrpSpPr>
+      <p:grpSpPr>
+        <a:xfrm>
+          <a:off x="0" y="0"/>
+          <a:ext cx="0" cy="0"/>
+          <a:chOff x="0" y="0"/>
+          <a:chExt cx="0" cy="0"/>
+        </a:xfrm>
+      </p:grpSpPr>
+      <p:sp>
+        <p:nvSpPr>
+          <p:cNvPr id="97" name="Google Shape;97;p18"/>
+          <p:cNvSpPr txBox="1"/>
+          <p:nvPr>
+            <p:ph type="title"/>
+          </p:nvPr>
+        </p:nvSpPr>
+        <p:spPr>
+          <a:xfrm>
+            <a:off x="311700" y="445025"/>
+            <a:ext cx="8520600" cy="572700"/>
+          </a:xfrm>
+          <a:prstGeom prst="rect">
+            <a:avLst/>
+          </a:prstGeom>
+        </p:spPr>
+        <p:txBody>
+          <a:bodyPr anchorCtr="0" anchor="t" bIns="91425" lIns="91425" spcFirstLastPara="1" rIns="91425" wrap="square" tIns="91425">
+            <a:normAutofit fontScale="90000"/>
+          </a:bodyPr>
+          <a:lstStyle/>
+          <a:p>
+            <a:pPr indent="0" lvl="0" marL="0" rtl="0" algn="l">
+              <a:spcBef>
+                <a:spcPts val="0"/>
+              </a:spcBef>
+              <a:spcAft>
+                <a:spcPts val="0"/>
+              </a:spcAft>
+              <a:buNone/>
+            </a:pPr>
+            <a:r>
+              <a:rPr lang="en"/>
               <a:t>Related Work</a:t>
             </a:r>
             <a:endParaRPr/>
@@ -7907,7 +8660,7 @@
       </p:sp>
       <p:sp>
         <p:nvSpPr>
-          <p:cNvPr id="86" name="Google Shape;86;p17"/>
+          <p:cNvPr id="98" name="Google Shape;98;p18"/>
           <p:cNvSpPr txBox="1"/>
           <p:nvPr>
             <p:ph idx="1" type="body"/>
@@ -7952,12 +8705,12 @@
 </p:sld>
 </file>
 
-<file path=ppt/slides/slide6.xml><?xml version="1.0" encoding="utf-8"?>
+<file path=ppt/slides/slide7.xml><?xml version="1.0" encoding="utf-8"?>
 <p:sld xmlns:a="http://schemas.openxmlformats.org/drawingml/2006/main" xmlns:r="http://schemas.openxmlformats.org/officeDocument/2006/relationships" xmlns:mc="http://schemas.openxmlformats.org/markup-compatibility/2006" xmlns:mv="urn:schemas-microsoft-com:mac:vml" xmlns:p="http://schemas.openxmlformats.org/presentationml/2006/main" xmlns:c="http://schemas.openxmlformats.org/drawingml/2006/chart" xmlns:dgm="http://schemas.openxmlformats.org/drawingml/2006/diagram" xmlns:o="urn:schemas-microsoft-com:office:office" xmlns:v="urn:schemas-microsoft-com:vml" xmlns:pvml="urn:schemas-microsoft-com:office:powerpoint" xmlns:com="http://schemas.openxmlformats.org/drawingml/2006/compatibility" xmlns:p14="http://schemas.microsoft.com/office/powerpoint/2010/main" xmlns:p15="http://schemas.microsoft.com/office/powerpoint/2012/main" xmlns:ahyp="http://schemas.microsoft.com/office/drawing/2018/hyperlinkcolor">
   <p:cSld>
     <p:spTree>
       <p:nvGrpSpPr>
-        <p:cNvPr id="90" name="Shape 90"/>
+        <p:cNvPr id="102" name="Shape 102"/>
         <p:cNvGrpSpPr/>
         <p:nvPr/>
       </p:nvGrpSpPr>
@@ -7971,7 +8724,7 @@
       </p:grpSpPr>
       <p:sp>
         <p:nvSpPr>
-          <p:cNvPr id="91" name="Google Shape;91;p18"/>
+          <p:cNvPr id="103" name="Google Shape;103;p19"/>
           <p:cNvSpPr txBox="1"/>
           <p:nvPr>
             <p:ph type="title"/>
@@ -8011,7 +8764,7 @@
       </p:sp>
       <p:sp>
         <p:nvSpPr>
-          <p:cNvPr id="92" name="Google Shape;92;p18"/>
+          <p:cNvPr id="104" name="Google Shape;104;p19"/>
           <p:cNvSpPr txBox="1"/>
           <p:nvPr>
             <p:ph idx="1" type="body"/>
@@ -8100,7 +8853,22 @@
                   <a:schemeClr val="lt2"/>
                 </a:solidFill>
               </a:rPr>
-              <a:t>CoQA Dataset</a:t>
+              <a:t>CoQA Dataset </a:t>
+            </a:r>
+            <a:br>
+              <a:rPr lang="en">
+                <a:solidFill>
+                  <a:schemeClr val="lt2"/>
+                </a:solidFill>
+              </a:rPr>
+            </a:br>
+            <a:r>
+              <a:rPr lang="en">
+                <a:solidFill>
+                  <a:schemeClr val="lt2"/>
+                </a:solidFill>
+              </a:rPr>
+              <a:t>Augmentation</a:t>
             </a:r>
             <a:endParaRPr sz="1800">
               <a:solidFill>
@@ -8112,7 +8880,7 @@
       </p:sp>
       <p:pic>
         <p:nvPicPr>
-          <p:cNvPr id="93" name="Google Shape;93;p18"/>
+          <p:cNvPr id="105" name="Google Shape;105;p19"/>
           <p:cNvPicPr preferRelativeResize="0"/>
           <p:nvPr/>
         </p:nvPicPr>
@@ -8139,7 +8907,7 @@
       </p:pic>
       <p:pic>
         <p:nvPicPr>
-          <p:cNvPr id="94" name="Google Shape;94;p18"/>
+          <p:cNvPr id="106" name="Google Shape;106;p19"/>
           <p:cNvPicPr preferRelativeResize="0"/>
           <p:nvPr/>
         </p:nvPicPr>
@@ -8166,7 +8934,7 @@
       </p:pic>
       <p:pic>
         <p:nvPicPr>
-          <p:cNvPr id="95" name="Google Shape;95;p18"/>
+          <p:cNvPr id="107" name="Google Shape;107;p19"/>
           <p:cNvPicPr preferRelativeResize="0"/>
           <p:nvPr/>
         </p:nvPicPr>
@@ -8226,7 +8994,7 @@
                                       <p:cBhvr additive="base">
                                         <p:cTn dur="3000"/>
                                         <p:tgtEl>
-                                          <p:spTgt spid="94"/>
+                                          <p:spTgt spid="106"/>
                                         </p:tgtEl>
                                         <p:attrNameLst>
                                           <p:attrName>ppt_y</p:attrName>
@@ -8253,7 +9021,7 @@
                                           </p:stCondLst>
                                         </p:cTn>
                                         <p:tgtEl>
-                                          <p:spTgt spid="94"/>
+                                          <p:spTgt spid="106"/>
                                         </p:tgtEl>
                                         <p:attrNameLst>
                                           <p:attrName>style.visibility</p:attrName>
@@ -8297,12 +9065,12 @@
 </p:sld>
 </file>
 
-<file path=ppt/slides/slide7.xml><?xml version="1.0" encoding="utf-8"?>
+<file path=ppt/slides/slide8.xml><?xml version="1.0" encoding="utf-8"?>
 <p:sld xmlns:a="http://schemas.openxmlformats.org/drawingml/2006/main" xmlns:r="http://schemas.openxmlformats.org/officeDocument/2006/relationships" xmlns:mc="http://schemas.openxmlformats.org/markup-compatibility/2006" xmlns:mv="urn:schemas-microsoft-com:mac:vml" xmlns:p="http://schemas.openxmlformats.org/presentationml/2006/main" xmlns:c="http://schemas.openxmlformats.org/drawingml/2006/chart" xmlns:dgm="http://schemas.openxmlformats.org/drawingml/2006/diagram" xmlns:o="urn:schemas-microsoft-com:office:office" xmlns:v="urn:schemas-microsoft-com:vml" xmlns:pvml="urn:schemas-microsoft-com:office:powerpoint" xmlns:com="http://schemas.openxmlformats.org/drawingml/2006/compatibility" xmlns:p14="http://schemas.microsoft.com/office/powerpoint/2010/main" xmlns:p15="http://schemas.microsoft.com/office/powerpoint/2012/main" xmlns:ahyp="http://schemas.microsoft.com/office/drawing/2018/hyperlinkcolor">
   <p:cSld>
     <p:spTree>
       <p:nvGrpSpPr>
-        <p:cNvPr id="99" name="Shape 99"/>
+        <p:cNvPr id="111" name="Shape 111"/>
         <p:cNvGrpSpPr/>
         <p:nvPr/>
       </p:nvGrpSpPr>
@@ -8316,7 +9084,7 @@
       </p:grpSpPr>
       <p:sp>
         <p:nvSpPr>
-          <p:cNvPr id="100" name="Google Shape;100;p19"/>
+          <p:cNvPr id="112" name="Google Shape;112;p20"/>
           <p:cNvSpPr txBox="1"/>
           <p:nvPr>
             <p:ph type="title"/>
@@ -8356,7 +9124,7 @@
       </p:sp>
       <p:sp>
         <p:nvSpPr>
-          <p:cNvPr id="101" name="Google Shape;101;p19"/>
+          <p:cNvPr id="113" name="Google Shape;113;p20"/>
           <p:cNvSpPr txBox="1"/>
           <p:nvPr>
             <p:ph idx="1" type="body"/>
@@ -8443,6 +9211,21 @@
               </a:rPr>
               <a:t>CoQA Dataset</a:t>
             </a:r>
+            <a:br>
+              <a:rPr lang="en">
+                <a:solidFill>
+                  <a:schemeClr val="lt2"/>
+                </a:solidFill>
+              </a:rPr>
+            </a:br>
+            <a:r>
+              <a:rPr lang="en">
+                <a:solidFill>
+                  <a:schemeClr val="lt2"/>
+                </a:solidFill>
+              </a:rPr>
+              <a:t>Augmentation</a:t>
+            </a:r>
             <a:endParaRPr>
               <a:solidFill>
                 <a:schemeClr val="lt2"/>
@@ -8453,7 +9236,7 @@
       </p:sp>
       <p:pic>
         <p:nvPicPr>
-          <p:cNvPr id="102" name="Google Shape;102;p19"/>
+          <p:cNvPr id="114" name="Google Shape;114;p20"/>
           <p:cNvPicPr preferRelativeResize="0"/>
           <p:nvPr/>
         </p:nvPicPr>
@@ -8480,7 +9263,7 @@
       </p:pic>
       <p:sp>
         <p:nvSpPr>
-          <p:cNvPr id="103" name="Google Shape;103;p19"/>
+          <p:cNvPr id="115" name="Google Shape;115;p20"/>
           <p:cNvSpPr/>
           <p:nvPr/>
         </p:nvSpPr>
@@ -8530,7 +9313,7 @@
       </p:sp>
       <p:sp>
         <p:nvSpPr>
-          <p:cNvPr id="104" name="Google Shape;104;p19"/>
+          <p:cNvPr id="116" name="Google Shape;116;p20"/>
           <p:cNvSpPr/>
           <p:nvPr/>
         </p:nvSpPr>
@@ -8580,7 +9363,7 @@
       </p:sp>
       <p:sp>
         <p:nvSpPr>
-          <p:cNvPr id="105" name="Google Shape;105;p19"/>
+          <p:cNvPr id="117" name="Google Shape;117;p20"/>
           <p:cNvSpPr/>
           <p:nvPr/>
         </p:nvSpPr>
@@ -8630,7 +9413,7 @@
       </p:sp>
       <p:sp>
         <p:nvSpPr>
-          <p:cNvPr id="106" name="Google Shape;106;p19"/>
+          <p:cNvPr id="118" name="Google Shape;118;p20"/>
           <p:cNvSpPr/>
           <p:nvPr/>
         </p:nvSpPr>
@@ -8686,10 +9469,10 @@
       </p:sp>
       <p:cxnSp>
         <p:nvCxnSpPr>
-          <p:cNvPr id="107" name="Google Shape;107;p19"/>
+          <p:cNvPr id="119" name="Google Shape;119;p20"/>
           <p:cNvCxnSpPr>
-            <a:stCxn id="103" idx="2"/>
-            <a:endCxn id="106" idx="0"/>
+            <a:stCxn id="115" idx="2"/>
+            <a:endCxn id="118" idx="0"/>
           </p:cNvCxnSpPr>
           <p:nvPr/>
         </p:nvCxnSpPr>
@@ -8715,10 +9498,10 @@
       </p:cxnSp>
       <p:cxnSp>
         <p:nvCxnSpPr>
-          <p:cNvPr id="108" name="Google Shape;108;p19"/>
+          <p:cNvPr id="120" name="Google Shape;120;p20"/>
           <p:cNvCxnSpPr>
-            <a:stCxn id="106" idx="2"/>
-            <a:endCxn id="105" idx="0"/>
+            <a:stCxn id="118" idx="2"/>
+            <a:endCxn id="117" idx="0"/>
           </p:cNvCxnSpPr>
           <p:nvPr/>
         </p:nvCxnSpPr>
@@ -8744,10 +9527,10 @@
       </p:cxnSp>
       <p:cxnSp>
         <p:nvCxnSpPr>
-          <p:cNvPr id="109" name="Google Shape;109;p19"/>
+          <p:cNvPr id="121" name="Google Shape;121;p20"/>
           <p:cNvCxnSpPr>
-            <a:stCxn id="106" idx="2"/>
-            <a:endCxn id="104" idx="0"/>
+            <a:stCxn id="118" idx="2"/>
+            <a:endCxn id="116" idx="0"/>
           </p:cNvCxnSpPr>
           <p:nvPr/>
         </p:nvCxnSpPr>
@@ -8773,7 +9556,7 @@
       </p:cxnSp>
       <p:sp>
         <p:nvSpPr>
-          <p:cNvPr id="110" name="Google Shape;110;p19"/>
+          <p:cNvPr id="122" name="Google Shape;122;p20"/>
           <p:cNvSpPr/>
           <p:nvPr/>
         </p:nvSpPr>
@@ -8823,7 +9606,7 @@
       </p:sp>
       <p:sp>
         <p:nvSpPr>
-          <p:cNvPr id="111" name="Google Shape;111;p19"/>
+          <p:cNvPr id="123" name="Google Shape;123;p20"/>
           <p:cNvSpPr/>
           <p:nvPr/>
         </p:nvSpPr>
@@ -8873,7 +9656,7 @@
       </p:sp>
       <p:cxnSp>
         <p:nvCxnSpPr>
-          <p:cNvPr id="112" name="Google Shape;112;p19"/>
+          <p:cNvPr id="124" name="Google Shape;124;p20"/>
           <p:cNvCxnSpPr/>
           <p:nvPr/>
         </p:nvCxnSpPr>
@@ -8936,7 +9719,7 @@
                                           </p:stCondLst>
                                         </p:cTn>
                                         <p:tgtEl>
-                                          <p:spTgt spid="103"/>
+                                          <p:spTgt spid="115"/>
                                         </p:tgtEl>
                                         <p:attrNameLst>
                                           <p:attrName>style.visibility</p:attrName>
@@ -8950,7 +9733,7 @@
                                       <p:cBhvr additive="base">
                                         <p:cTn dur="1000"/>
                                         <p:tgtEl>
-                                          <p:spTgt spid="103"/>
+                                          <p:spTgt spid="115"/>
                                         </p:tgtEl>
                                         <p:attrNameLst>
                                           <p:attrName>ppt_y</p:attrName>
@@ -8986,7 +9769,7 @@
                                           </p:stCondLst>
                                         </p:cTn>
                                         <p:tgtEl>
-                                          <p:spTgt spid="107"/>
+                                          <p:spTgt spid="119"/>
                                         </p:tgtEl>
                                         <p:attrNameLst>
                                           <p:attrName>style.visibility</p:attrName>
@@ -9000,7 +9783,7 @@
                                       <p:cBhvr additive="base">
                                         <p:cTn dur="1000"/>
                                         <p:tgtEl>
-                                          <p:spTgt spid="107"/>
+                                          <p:spTgt spid="119"/>
                                         </p:tgtEl>
                                         <p:attrNameLst>
                                           <p:attrName>ppt_y</p:attrName>
@@ -9041,45 +9824,7 @@
                             </p:stCondLst>
                             <p:childTnLst>
                               <p:par>
-                                <p:cTn fill="hold" nodeType="clickEffect" presetClass="emph" presetID="8" presetSubtype="0">
-                                  <p:stCondLst>
-                                    <p:cond delay="0"/>
-                                  </p:stCondLst>
-                                  <p:childTnLst>
-                                    <p:animRot by="-21600000">
-                                      <p:cBhvr>
-                                        <p:cTn dur="1000" fill="hold"/>
-                                        <p:tgtEl>
-                                          <p:spTgt spid="106"/>
-                                        </p:tgtEl>
-                                        <p:attrNameLst>
-                                          <p:attrName>r</p:attrName>
-                                        </p:attrNameLst>
-                                      </p:cBhvr>
-                                    </p:animRot>
-                                  </p:childTnLst>
-                                </p:cTn>
-                              </p:par>
-                            </p:childTnLst>
-                          </p:cTn>
-                        </p:par>
-                      </p:childTnLst>
-                    </p:cTn>
-                  </p:par>
-                  <p:par>
-                    <p:cTn fill="hold">
-                      <p:stCondLst>
-                        <p:cond delay="indefinite"/>
-                      </p:stCondLst>
-                      <p:childTnLst>
-                        <p:par>
-                          <p:cTn fill="hold">
-                            <p:stCondLst>
-                              <p:cond delay="0"/>
-                            </p:stCondLst>
-                            <p:childTnLst>
-                              <p:par>
-                                <p:cTn fill="hold" nodeType="clickEffect" presetClass="entr" presetID="10" presetSubtype="0">
+                                <p:cTn fill="hold" nodeType="clickEffect" presetClass="entr" presetID="23" presetSubtype="16">
                                   <p:stCondLst>
                                     <p:cond delay="0"/>
                                   </p:stCondLst>
@@ -9092,200 +9837,7 @@
                                           </p:stCondLst>
                                         </p:cTn>
                                         <p:tgtEl>
-                                          <p:spTgt spid="105"/>
-                                        </p:tgtEl>
-                                        <p:attrNameLst>
-                                          <p:attrName>style.visibility</p:attrName>
-                                        </p:attrNameLst>
-                                      </p:cBhvr>
-                                      <p:to>
-                                        <p:strVal val="visible"/>
-                                      </p:to>
-                                    </p:set>
-                                    <p:animEffect filter="fade" transition="in">
-                                      <p:cBhvr>
-                                        <p:cTn dur="1000"/>
-                                        <p:tgtEl>
-                                          <p:spTgt spid="105"/>
-                                        </p:tgtEl>
-                                      </p:cBhvr>
-                                    </p:animEffect>
-                                  </p:childTnLst>
-                                </p:cTn>
-                              </p:par>
-                              <p:par>
-                                <p:cTn fill="hold" nodeType="withEffect" presetClass="entr" presetID="10" presetSubtype="0">
-                                  <p:stCondLst>
-                                    <p:cond delay="0"/>
-                                  </p:stCondLst>
-                                  <p:childTnLst>
-                                    <p:set>
-                                      <p:cBhvr>
-                                        <p:cTn dur="1" fill="hold">
-                                          <p:stCondLst>
-                                            <p:cond delay="0"/>
-                                          </p:stCondLst>
-                                        </p:cTn>
-                                        <p:tgtEl>
-                                          <p:spTgt spid="108"/>
-                                        </p:tgtEl>
-                                        <p:attrNameLst>
-                                          <p:attrName>style.visibility</p:attrName>
-                                        </p:attrNameLst>
-                                      </p:cBhvr>
-                                      <p:to>
-                                        <p:strVal val="visible"/>
-                                      </p:to>
-                                    </p:set>
-                                    <p:animEffect filter="fade" transition="in">
-                                      <p:cBhvr>
-                                        <p:cTn dur="1000"/>
-                                        <p:tgtEl>
-                                          <p:spTgt spid="108"/>
-                                        </p:tgtEl>
-                                      </p:cBhvr>
-                                    </p:animEffect>
-                                  </p:childTnLst>
-                                </p:cTn>
-                              </p:par>
-                              <p:par>
-                                <p:cTn fill="hold" nodeType="withEffect" presetClass="entr" presetID="10" presetSubtype="0">
-                                  <p:stCondLst>
-                                    <p:cond delay="0"/>
-                                  </p:stCondLst>
-                                  <p:childTnLst>
-                                    <p:set>
-                                      <p:cBhvr>
-                                        <p:cTn dur="1" fill="hold">
-                                          <p:stCondLst>
-                                            <p:cond delay="0"/>
-                                          </p:stCondLst>
-                                        </p:cTn>
-                                        <p:tgtEl>
-                                          <p:spTgt spid="109"/>
-                                        </p:tgtEl>
-                                        <p:attrNameLst>
-                                          <p:attrName>style.visibility</p:attrName>
-                                        </p:attrNameLst>
-                                      </p:cBhvr>
-                                      <p:to>
-                                        <p:strVal val="visible"/>
-                                      </p:to>
-                                    </p:set>
-                                    <p:animEffect filter="fade" transition="in">
-                                      <p:cBhvr>
-                                        <p:cTn dur="1000"/>
-                                        <p:tgtEl>
-                                          <p:spTgt spid="109"/>
-                                        </p:tgtEl>
-                                      </p:cBhvr>
-                                    </p:animEffect>
-                                  </p:childTnLst>
-                                </p:cTn>
-                              </p:par>
-                              <p:par>
-                                <p:cTn fill="hold" nodeType="withEffect" presetClass="entr" presetID="10" presetSubtype="0">
-                                  <p:stCondLst>
-                                    <p:cond delay="0"/>
-                                  </p:stCondLst>
-                                  <p:childTnLst>
-                                    <p:set>
-                                      <p:cBhvr>
-                                        <p:cTn dur="1" fill="hold">
-                                          <p:stCondLst>
-                                            <p:cond delay="0"/>
-                                          </p:stCondLst>
-                                        </p:cTn>
-                                        <p:tgtEl>
-                                          <p:spTgt spid="104"/>
-                                        </p:tgtEl>
-                                        <p:attrNameLst>
-                                          <p:attrName>style.visibility</p:attrName>
-                                        </p:attrNameLst>
-                                      </p:cBhvr>
-                                      <p:to>
-                                        <p:strVal val="visible"/>
-                                      </p:to>
-                                    </p:set>
-                                    <p:animEffect filter="fade" transition="in">
-                                      <p:cBhvr>
-                                        <p:cTn dur="1000"/>
-                                        <p:tgtEl>
-                                          <p:spTgt spid="104"/>
-                                        </p:tgtEl>
-                                      </p:cBhvr>
-                                    </p:animEffect>
-                                  </p:childTnLst>
-                                </p:cTn>
-                              </p:par>
-                            </p:childTnLst>
-                          </p:cTn>
-                        </p:par>
-                      </p:childTnLst>
-                    </p:cTn>
-                  </p:par>
-                  <p:par>
-                    <p:cTn fill="hold">
-                      <p:stCondLst>
-                        <p:cond delay="indefinite"/>
-                      </p:stCondLst>
-                      <p:childTnLst>
-                        <p:par>
-                          <p:cTn fill="hold">
-                            <p:stCondLst>
-                              <p:cond delay="0"/>
-                            </p:stCondLst>
-                            <p:childTnLst>
-                              <p:par>
-                                <p:cTn fill="hold" nodeType="clickEffect" presetClass="entr" presetID="10" presetSubtype="0">
-                                  <p:stCondLst>
-                                    <p:cond delay="0"/>
-                                  </p:stCondLst>
-                                  <p:childTnLst>
-                                    <p:set>
-                                      <p:cBhvr>
-                                        <p:cTn dur="1" fill="hold">
-                                          <p:stCondLst>
-                                            <p:cond delay="0"/>
-                                          </p:stCondLst>
-                                        </p:cTn>
-                                        <p:tgtEl>
-                                          <p:spTgt spid="112"/>
-                                        </p:tgtEl>
-                                        <p:attrNameLst>
-                                          <p:attrName>style.visibility</p:attrName>
-                                        </p:attrNameLst>
-                                      </p:cBhvr>
-                                      <p:to>
-                                        <p:strVal val="visible"/>
-                                      </p:to>
-                                    </p:set>
-                                    <p:animEffect filter="fade" transition="in">
-                                      <p:cBhvr>
-                                        <p:cTn dur="1000"/>
-                                        <p:tgtEl>
-                                          <p:spTgt spid="112"/>
-                                        </p:tgtEl>
-                                      </p:cBhvr>
-                                    </p:animEffect>
-                                  </p:childTnLst>
-                                </p:cTn>
-                              </p:par>
-                              <p:par>
-                                <p:cTn fill="hold" nodeType="withEffect" presetClass="entr" presetID="23" presetSubtype="16">
-                                  <p:stCondLst>
-                                    <p:cond delay="0"/>
-                                  </p:stCondLst>
-                                  <p:childTnLst>
-                                    <p:set>
-                                      <p:cBhvr>
-                                        <p:cTn dur="1" fill="hold">
-                                          <p:stCondLst>
-                                            <p:cond delay="0"/>
-                                          </p:stCondLst>
-                                        </p:cTn>
-                                        <p:tgtEl>
-                                          <p:spTgt spid="110"/>
+                                          <p:spTgt spid="118"/>
                                         </p:tgtEl>
                                         <p:attrNameLst>
                                           <p:attrName>style.visibility</p:attrName>
@@ -9299,7 +9851,7 @@
                                       <p:cBhvr additive="base">
                                         <p:cTn dur="1000"/>
                                         <p:tgtEl>
-                                          <p:spTgt spid="110"/>
+                                          <p:spTgt spid="118"/>
                                         </p:tgtEl>
                                         <p:attrNameLst>
                                           <p:attrName>ppt_w</p:attrName>
@@ -9322,7 +9874,7 @@
                                       <p:cBhvr additive="base">
                                         <p:cTn dur="1000"/>
                                         <p:tgtEl>
-                                          <p:spTgt spid="110"/>
+                                          <p:spTgt spid="118"/>
                                         </p:tgtEl>
                                         <p:attrNameLst>
                                           <p:attrName>ppt_h</p:attrName>
@@ -9376,7 +9928,7 @@
                                           </p:stCondLst>
                                         </p:cTn>
                                         <p:tgtEl>
-                                          <p:spTgt spid="111"/>
+                                          <p:spTgt spid="117"/>
                                         </p:tgtEl>
                                         <p:attrNameLst>
                                           <p:attrName>style.visibility</p:attrName>
@@ -9390,7 +9942,291 @@
                                       <p:cBhvr>
                                         <p:cTn dur="1000"/>
                                         <p:tgtEl>
-                                          <p:spTgt spid="111"/>
+                                          <p:spTgt spid="117"/>
+                                        </p:tgtEl>
+                                      </p:cBhvr>
+                                    </p:animEffect>
+                                  </p:childTnLst>
+                                </p:cTn>
+                              </p:par>
+                              <p:par>
+                                <p:cTn fill="hold" nodeType="withEffect" presetClass="entr" presetID="10" presetSubtype="0">
+                                  <p:stCondLst>
+                                    <p:cond delay="0"/>
+                                  </p:stCondLst>
+                                  <p:childTnLst>
+                                    <p:set>
+                                      <p:cBhvr>
+                                        <p:cTn dur="1" fill="hold">
+                                          <p:stCondLst>
+                                            <p:cond delay="0"/>
+                                          </p:stCondLst>
+                                        </p:cTn>
+                                        <p:tgtEl>
+                                          <p:spTgt spid="120"/>
+                                        </p:tgtEl>
+                                        <p:attrNameLst>
+                                          <p:attrName>style.visibility</p:attrName>
+                                        </p:attrNameLst>
+                                      </p:cBhvr>
+                                      <p:to>
+                                        <p:strVal val="visible"/>
+                                      </p:to>
+                                    </p:set>
+                                    <p:animEffect filter="fade" transition="in">
+                                      <p:cBhvr>
+                                        <p:cTn dur="1000"/>
+                                        <p:tgtEl>
+                                          <p:spTgt spid="120"/>
+                                        </p:tgtEl>
+                                      </p:cBhvr>
+                                    </p:animEffect>
+                                  </p:childTnLst>
+                                </p:cTn>
+                              </p:par>
+                              <p:par>
+                                <p:cTn fill="hold" nodeType="withEffect" presetClass="entr" presetID="10" presetSubtype="0">
+                                  <p:stCondLst>
+                                    <p:cond delay="0"/>
+                                  </p:stCondLst>
+                                  <p:childTnLst>
+                                    <p:set>
+                                      <p:cBhvr>
+                                        <p:cTn dur="1" fill="hold">
+                                          <p:stCondLst>
+                                            <p:cond delay="0"/>
+                                          </p:stCondLst>
+                                        </p:cTn>
+                                        <p:tgtEl>
+                                          <p:spTgt spid="121"/>
+                                        </p:tgtEl>
+                                        <p:attrNameLst>
+                                          <p:attrName>style.visibility</p:attrName>
+                                        </p:attrNameLst>
+                                      </p:cBhvr>
+                                      <p:to>
+                                        <p:strVal val="visible"/>
+                                      </p:to>
+                                    </p:set>
+                                    <p:animEffect filter="fade" transition="in">
+                                      <p:cBhvr>
+                                        <p:cTn dur="1000"/>
+                                        <p:tgtEl>
+                                          <p:spTgt spid="121"/>
+                                        </p:tgtEl>
+                                      </p:cBhvr>
+                                    </p:animEffect>
+                                  </p:childTnLst>
+                                </p:cTn>
+                              </p:par>
+                              <p:par>
+                                <p:cTn fill="hold" nodeType="withEffect" presetClass="entr" presetID="10" presetSubtype="0">
+                                  <p:stCondLst>
+                                    <p:cond delay="0"/>
+                                  </p:stCondLst>
+                                  <p:childTnLst>
+                                    <p:set>
+                                      <p:cBhvr>
+                                        <p:cTn dur="1" fill="hold">
+                                          <p:stCondLst>
+                                            <p:cond delay="0"/>
+                                          </p:stCondLst>
+                                        </p:cTn>
+                                        <p:tgtEl>
+                                          <p:spTgt spid="116"/>
+                                        </p:tgtEl>
+                                        <p:attrNameLst>
+                                          <p:attrName>style.visibility</p:attrName>
+                                        </p:attrNameLst>
+                                      </p:cBhvr>
+                                      <p:to>
+                                        <p:strVal val="visible"/>
+                                      </p:to>
+                                    </p:set>
+                                    <p:animEffect filter="fade" transition="in">
+                                      <p:cBhvr>
+                                        <p:cTn dur="1000"/>
+                                        <p:tgtEl>
+                                          <p:spTgt spid="116"/>
+                                        </p:tgtEl>
+                                      </p:cBhvr>
+                                    </p:animEffect>
+                                  </p:childTnLst>
+                                </p:cTn>
+                              </p:par>
+                            </p:childTnLst>
+                          </p:cTn>
+                        </p:par>
+                      </p:childTnLst>
+                    </p:cTn>
+                  </p:par>
+                  <p:par>
+                    <p:cTn fill="hold">
+                      <p:stCondLst>
+                        <p:cond delay="indefinite"/>
+                      </p:stCondLst>
+                      <p:childTnLst>
+                        <p:par>
+                          <p:cTn fill="hold">
+                            <p:stCondLst>
+                              <p:cond delay="0"/>
+                            </p:stCondLst>
+                            <p:childTnLst>
+                              <p:par>
+                                <p:cTn fill="hold" nodeType="clickEffect" presetClass="entr" presetID="10" presetSubtype="0">
+                                  <p:stCondLst>
+                                    <p:cond delay="0"/>
+                                  </p:stCondLst>
+                                  <p:childTnLst>
+                                    <p:set>
+                                      <p:cBhvr>
+                                        <p:cTn dur="1" fill="hold">
+                                          <p:stCondLst>
+                                            <p:cond delay="0"/>
+                                          </p:stCondLst>
+                                        </p:cTn>
+                                        <p:tgtEl>
+                                          <p:spTgt spid="124"/>
+                                        </p:tgtEl>
+                                        <p:attrNameLst>
+                                          <p:attrName>style.visibility</p:attrName>
+                                        </p:attrNameLst>
+                                      </p:cBhvr>
+                                      <p:to>
+                                        <p:strVal val="visible"/>
+                                      </p:to>
+                                    </p:set>
+                                    <p:animEffect filter="fade" transition="in">
+                                      <p:cBhvr>
+                                        <p:cTn dur="1000"/>
+                                        <p:tgtEl>
+                                          <p:spTgt spid="124"/>
+                                        </p:tgtEl>
+                                      </p:cBhvr>
+                                    </p:animEffect>
+                                  </p:childTnLst>
+                                </p:cTn>
+                              </p:par>
+                              <p:par>
+                                <p:cTn fill="hold" nodeType="withEffect" presetClass="entr" presetID="23" presetSubtype="16">
+                                  <p:stCondLst>
+                                    <p:cond delay="0"/>
+                                  </p:stCondLst>
+                                  <p:childTnLst>
+                                    <p:set>
+                                      <p:cBhvr>
+                                        <p:cTn dur="1" fill="hold">
+                                          <p:stCondLst>
+                                            <p:cond delay="0"/>
+                                          </p:stCondLst>
+                                        </p:cTn>
+                                        <p:tgtEl>
+                                          <p:spTgt spid="122"/>
+                                        </p:tgtEl>
+                                        <p:attrNameLst>
+                                          <p:attrName>style.visibility</p:attrName>
+                                        </p:attrNameLst>
+                                      </p:cBhvr>
+                                      <p:to>
+                                        <p:strVal val="visible"/>
+                                      </p:to>
+                                    </p:set>
+                                    <p:anim calcmode="lin" valueType="num">
+                                      <p:cBhvr additive="base">
+                                        <p:cTn dur="1000"/>
+                                        <p:tgtEl>
+                                          <p:spTgt spid="122"/>
+                                        </p:tgtEl>
+                                        <p:attrNameLst>
+                                          <p:attrName>ppt_w</p:attrName>
+                                        </p:attrNameLst>
+                                      </p:cBhvr>
+                                      <p:tavLst>
+                                        <p:tav fmla="" tm="0">
+                                          <p:val>
+                                            <p:strVal val="0"/>
+                                          </p:val>
+                                        </p:tav>
+                                        <p:tav fmla="" tm="100000">
+                                          <p:val>
+                                            <p:strVal val="#ppt_w"/>
+                                          </p:val>
+                                        </p:tav>
+                                      </p:tavLst>
+                                    </p:anim>
+                                    <p:anim calcmode="lin" valueType="num">
+                                      <p:cBhvr additive="base">
+                                        <p:cTn dur="1000"/>
+                                        <p:tgtEl>
+                                          <p:spTgt spid="122"/>
+                                        </p:tgtEl>
+                                        <p:attrNameLst>
+                                          <p:attrName>ppt_h</p:attrName>
+                                        </p:attrNameLst>
+                                      </p:cBhvr>
+                                      <p:tavLst>
+                                        <p:tav fmla="" tm="0">
+                                          <p:val>
+                                            <p:strVal val="0"/>
+                                          </p:val>
+                                        </p:tav>
+                                        <p:tav fmla="" tm="100000">
+                                          <p:val>
+                                            <p:strVal val="#ppt_h"/>
+                                          </p:val>
+                                        </p:tav>
+                                      </p:tavLst>
+                                    </p:anim>
+                                  </p:childTnLst>
+                                </p:cTn>
+                              </p:par>
+                            </p:childTnLst>
+                          </p:cTn>
+                        </p:par>
+                      </p:childTnLst>
+                    </p:cTn>
+                  </p:par>
+                  <p:par>
+                    <p:cTn fill="hold">
+                      <p:stCondLst>
+                        <p:cond delay="indefinite"/>
+                      </p:stCondLst>
+                      <p:childTnLst>
+                        <p:par>
+                          <p:cTn fill="hold">
+                            <p:stCondLst>
+                              <p:cond delay="0"/>
+                            </p:stCondLst>
+                            <p:childTnLst>
+                              <p:par>
+                                <p:cTn fill="hold" nodeType="clickEffect" presetClass="entr" presetID="10" presetSubtype="0">
+                                  <p:stCondLst>
+                                    <p:cond delay="0"/>
+                                  </p:stCondLst>
+                                  <p:childTnLst>
+                                    <p:set>
+                                      <p:cBhvr>
+                                        <p:cTn dur="1" fill="hold">
+                                          <p:stCondLst>
+                                            <p:cond delay="0"/>
+                                          </p:stCondLst>
+                                        </p:cTn>
+                                        <p:tgtEl>
+                                          <p:spTgt spid="123"/>
+                                        </p:tgtEl>
+                                        <p:attrNameLst>
+                                          <p:attrName>style.visibility</p:attrName>
+                                        </p:attrNameLst>
+                                      </p:cBhvr>
+                                      <p:to>
+                                        <p:strVal val="visible"/>
+                                      </p:to>
+                                    </p:set>
+                                    <p:animEffect filter="fade" transition="in">
+                                      <p:cBhvr>
+                                        <p:cTn dur="1000"/>
+                                        <p:tgtEl>
+                                          <p:spTgt spid="123"/>
                                         </p:tgtEl>
                                       </p:cBhvr>
                                     </p:animEffect>
@@ -9428,12 +10264,12 @@
 </p:sld>
 </file>
 
-<file path=ppt/slides/slide8.xml><?xml version="1.0" encoding="utf-8"?>
+<file path=ppt/slides/slide9.xml><?xml version="1.0" encoding="utf-8"?>
 <p:sld xmlns:a="http://schemas.openxmlformats.org/drawingml/2006/main" xmlns:r="http://schemas.openxmlformats.org/officeDocument/2006/relationships" xmlns:mc="http://schemas.openxmlformats.org/markup-compatibility/2006" xmlns:mv="urn:schemas-microsoft-com:mac:vml" xmlns:p="http://schemas.openxmlformats.org/presentationml/2006/main" xmlns:c="http://schemas.openxmlformats.org/drawingml/2006/chart" xmlns:dgm="http://schemas.openxmlformats.org/drawingml/2006/diagram" xmlns:o="urn:schemas-microsoft-com:office:office" xmlns:v="urn:schemas-microsoft-com:vml" xmlns:pvml="urn:schemas-microsoft-com:office:powerpoint" xmlns:com="http://schemas.openxmlformats.org/drawingml/2006/compatibility" xmlns:p14="http://schemas.microsoft.com/office/powerpoint/2010/main" xmlns:p15="http://schemas.microsoft.com/office/powerpoint/2012/main" xmlns:ahyp="http://schemas.microsoft.com/office/drawing/2018/hyperlinkcolor">
   <p:cSld>
     <p:spTree>
       <p:nvGrpSpPr>
-        <p:cNvPr id="116" name="Shape 116"/>
+        <p:cNvPr id="128" name="Shape 128"/>
         <p:cNvGrpSpPr/>
         <p:nvPr/>
       </p:nvGrpSpPr>
@@ -9447,7 +10283,7 @@
       </p:grpSpPr>
       <p:sp>
         <p:nvSpPr>
-          <p:cNvPr id="117" name="Google Shape;117;p20"/>
+          <p:cNvPr id="129" name="Google Shape;129;p21"/>
           <p:cNvSpPr txBox="1"/>
           <p:nvPr>
             <p:ph type="title"/>
@@ -9487,7 +10323,7 @@
       </p:sp>
       <p:sp>
         <p:nvSpPr>
-          <p:cNvPr id="118" name="Google Shape;118;p20"/>
+          <p:cNvPr id="130" name="Google Shape;130;p21"/>
           <p:cNvSpPr txBox="1"/>
           <p:nvPr>
             <p:ph idx="1" type="body"/>
@@ -9576,7 +10412,14 @@
             </a:r>
             <a:r>
               <a:rPr lang="en" sz="1800"/>
-              <a:t>ataset</a:t>
+              <a:t>ataset </a:t>
+            </a:r>
+            <a:br>
+              <a:rPr lang="en" sz="1800"/>
+            </a:br>
+            <a:r>
+              <a:rPr lang="en" sz="1800"/>
+              <a:t>Augmentation</a:t>
             </a:r>
             <a:endParaRPr/>
           </a:p>
@@ -9584,7 +10427,7 @@
       </p:sp>
       <p:pic>
         <p:nvPicPr>
-          <p:cNvPr id="119" name="Google Shape;119;p20"/>
+          <p:cNvPr id="131" name="Google Shape;131;p21"/>
           <p:cNvPicPr preferRelativeResize="0"/>
           <p:nvPr/>
         </p:nvPicPr>
@@ -9612,7 +10455,7 @@
       </p:pic>
       <p:pic>
         <p:nvPicPr>
-          <p:cNvPr id="120" name="Google Shape;120;p20"/>
+          <p:cNvPr id="132" name="Google Shape;132;p21"/>
           <p:cNvPicPr preferRelativeResize="0"/>
           <p:nvPr/>
         </p:nvPicPr>
@@ -9639,7 +10482,7 @@
       </p:pic>
       <p:pic>
         <p:nvPicPr>
-          <p:cNvPr id="121" name="Google Shape;121;p20"/>
+          <p:cNvPr id="133" name="Google Shape;133;p21"/>
           <p:cNvPicPr preferRelativeResize="0"/>
           <p:nvPr/>
         </p:nvPicPr>
@@ -9666,7 +10509,7 @@
       </p:pic>
       <p:sp>
         <p:nvSpPr>
-          <p:cNvPr id="122" name="Google Shape;122;p20"/>
+          <p:cNvPr id="134" name="Google Shape;134;p21"/>
           <p:cNvSpPr/>
           <p:nvPr/>
         </p:nvSpPr>
@@ -9716,7 +10559,7 @@
       </p:sp>
       <p:sp>
         <p:nvSpPr>
-          <p:cNvPr id="123" name="Google Shape;123;p20"/>
+          <p:cNvPr id="135" name="Google Shape;135;p21"/>
           <p:cNvSpPr/>
           <p:nvPr/>
         </p:nvSpPr>
@@ -9807,7 +10650,7 @@
                                           </p:stCondLst>
                                         </p:cTn>
                                         <p:tgtEl>
-                                          <p:spTgt spid="121"/>
+                                          <p:spTgt spid="133"/>
                                         </p:tgtEl>
                                         <p:attrNameLst>
                                           <p:attrName>style.visibility</p:attrName>
@@ -9821,7 +10664,7 @@
                                       <p:cBhvr additive="base">
                                         <p:cTn dur="3000"/>
                                         <p:tgtEl>
-                                          <p:spTgt spid="121"/>
+                                          <p:spTgt spid="133"/>
                                         </p:tgtEl>
                                         <p:attrNameLst>
                                           <p:attrName>ppt_y</p:attrName>
@@ -9857,7 +10700,7 @@
                                           </p:stCondLst>
                                         </p:cTn>
                                         <p:tgtEl>
-                                          <p:spTgt spid="122"/>
+                                          <p:spTgt spid="134"/>
                                         </p:tgtEl>
                                         <p:attrNameLst>
                                           <p:attrName>style.visibility</p:attrName>
@@ -9871,7 +10714,7 @@
                                       <p:cBhvr additive="base">
                                         <p:cTn dur="3000"/>
                                         <p:tgtEl>
-                                          <p:spTgt spid="122"/>
+                                          <p:spTgt spid="134"/>
                                         </p:tgtEl>
                                         <p:attrNameLst>
                                           <p:attrName>ppt_y</p:attrName>
@@ -9924,112 +10767,286 @@
 </p:sld>
 </file>
 
-<file path=ppt/slides/slide9.xml><?xml version="1.0" encoding="utf-8"?>
-<p:sld xmlns:a="http://schemas.openxmlformats.org/drawingml/2006/main" xmlns:r="http://schemas.openxmlformats.org/officeDocument/2006/relationships" xmlns:mc="http://schemas.openxmlformats.org/markup-compatibility/2006" xmlns:mv="urn:schemas-microsoft-com:mac:vml" xmlns:p="http://schemas.openxmlformats.org/presentationml/2006/main" xmlns:c="http://schemas.openxmlformats.org/drawingml/2006/chart" xmlns:dgm="http://schemas.openxmlformats.org/drawingml/2006/diagram" xmlns:o="urn:schemas-microsoft-com:office:office" xmlns:v="urn:schemas-microsoft-com:vml" xmlns:pvml="urn:schemas-microsoft-com:office:powerpoint" xmlns:com="http://schemas.openxmlformats.org/drawingml/2006/compatibility" xmlns:p14="http://schemas.microsoft.com/office/powerpoint/2010/main" xmlns:p15="http://schemas.microsoft.com/office/powerpoint/2012/main" xmlns:ahyp="http://schemas.microsoft.com/office/drawing/2018/hyperlinkcolor">
-  <p:cSld>
-    <p:spTree>
-      <p:nvGrpSpPr>
-        <p:cNvPr id="127" name="Shape 127"/>
-        <p:cNvGrpSpPr/>
-        <p:nvPr/>
-      </p:nvGrpSpPr>
-      <p:grpSpPr>
-        <a:xfrm>
-          <a:off x="0" y="0"/>
-          <a:ext cx="0" cy="0"/>
-          <a:chOff x="0" y="0"/>
-          <a:chExt cx="0" cy="0"/>
-        </a:xfrm>
-      </p:grpSpPr>
-      <p:sp>
-        <p:nvSpPr>
-          <p:cNvPr id="128" name="Google Shape;128;p21"/>
-          <p:cNvSpPr txBox="1"/>
-          <p:nvPr>
-            <p:ph type="title"/>
-          </p:nvPr>
-        </p:nvSpPr>
-        <p:spPr>
-          <a:xfrm>
-            <a:off x="311700" y="445025"/>
-            <a:ext cx="8520600" cy="572700"/>
-          </a:xfrm>
-          <a:prstGeom prst="rect">
-            <a:avLst/>
-          </a:prstGeom>
-        </p:spPr>
-        <p:txBody>
-          <a:bodyPr anchorCtr="0" anchor="t" bIns="91425" lIns="91425" spcFirstLastPara="1" rIns="91425" wrap="square" tIns="91425">
-            <a:normAutofit fontScale="90000"/>
-          </a:bodyPr>
-          <a:lstStyle/>
-          <a:p>
-            <a:pPr indent="0" lvl="0" marL="0" rtl="0" algn="l">
-              <a:spcBef>
-                <a:spcPts val="0"/>
-              </a:spcBef>
-              <a:spcAft>
-                <a:spcPts val="0"/>
-              </a:spcAft>
-              <a:buNone/>
-            </a:pPr>
-            <a:r>
-              <a:rPr lang="en"/>
-              <a:t>Results</a:t>
-            </a:r>
-            <a:endParaRPr/>
-          </a:p>
-        </p:txBody>
-      </p:sp>
-      <p:sp>
-        <p:nvSpPr>
-          <p:cNvPr id="129" name="Google Shape;129;p21"/>
-          <p:cNvSpPr txBox="1"/>
-          <p:nvPr>
-            <p:ph idx="1" type="body"/>
-          </p:nvPr>
-        </p:nvSpPr>
-        <p:spPr>
-          <a:xfrm>
-            <a:off x="311700" y="1234075"/>
-            <a:ext cx="8520600" cy="3334800"/>
-          </a:xfrm>
-          <a:prstGeom prst="rect">
-            <a:avLst/>
-          </a:prstGeom>
-        </p:spPr>
-        <p:txBody>
-          <a:bodyPr anchorCtr="0" anchor="t" bIns="91425" lIns="91425" spcFirstLastPara="1" rIns="91425" wrap="square" tIns="91425">
-            <a:normAutofit/>
-          </a:bodyPr>
-          <a:lstStyle/>
-          <a:p>
-            <a:pPr indent="0" lvl="0" marL="0" rtl="0" algn="l">
-              <a:spcBef>
-                <a:spcPts val="0"/>
-              </a:spcBef>
-              <a:spcAft>
-                <a:spcPts val="1200"/>
-              </a:spcAft>
-              <a:buNone/>
-            </a:pPr>
-            <a:r>
-              <a:rPr lang="en"/>
-              <a:t>Graphs and accuracies</a:t>
-            </a:r>
-            <a:endParaRPr/>
-          </a:p>
-        </p:txBody>
-      </p:sp>
-    </p:spTree>
-  </p:cSld>
-  <p:clrMapOvr>
-    <a:masterClrMapping/>
-  </p:clrMapOvr>
-</p:sld>
+<file path=ppt/theme/theme1.xml><?xml version="1.0" encoding="utf-8"?>
+<a:theme xmlns:a="http://schemas.openxmlformats.org/drawingml/2006/main" xmlns:r="http://schemas.openxmlformats.org/officeDocument/2006/relationships" name="Pop">
+  <a:themeElements>
+    <a:clrScheme name="Pop">
+      <a:dk1>
+        <a:srgbClr val="F8E71C"/>
+      </a:dk1>
+      <a:lt1>
+        <a:srgbClr val="FFFFFF"/>
+      </a:lt1>
+      <a:dk2>
+        <a:srgbClr val="000000"/>
+      </a:dk2>
+      <a:lt2>
+        <a:srgbClr val="D9D9D9"/>
+      </a:lt2>
+      <a:accent1>
+        <a:srgbClr val="666666"/>
+      </a:accent1>
+      <a:accent2>
+        <a:srgbClr val="483165"/>
+      </a:accent2>
+      <a:accent3>
+        <a:srgbClr val="EB1E95"/>
+      </a:accent3>
+      <a:accent4>
+        <a:srgbClr val="01AFD1"/>
+      </a:accent4>
+      <a:accent5>
+        <a:srgbClr val="0F9D58"/>
+      </a:accent5>
+      <a:accent6>
+        <a:srgbClr val="9C27B0"/>
+      </a:accent6>
+      <a:hlink>
+        <a:srgbClr val="0F9D58"/>
+      </a:hlink>
+      <a:folHlink>
+        <a:srgbClr val="0F9D58"/>
+      </a:folHlink>
+    </a:clrScheme>
+    <a:fontScheme name="Office">
+      <a:majorFont>
+        <a:latin typeface="Arial"/>
+        <a:ea typeface=""/>
+        <a:cs typeface=""/>
+        <a:font script="Jpan" typeface="ＭＳ Ｐゴシック"/>
+        <a:font script="Hang" typeface="맑은 고딕"/>
+        <a:font script="Hans" typeface="宋体"/>
+        <a:font script="Hant" typeface="新細明體"/>
+        <a:font script="Arab" typeface="Times New Roman"/>
+        <a:font script="Hebr" typeface="Times New Roman"/>
+        <a:font script="Thai" typeface="Angsana New"/>
+        <a:font script="Ethi" typeface="Nyala"/>
+        <a:font script="Beng" typeface="Vrinda"/>
+        <a:font script="Gujr" typeface="Shruti"/>
+        <a:font script="Khmr" typeface="MoolBoran"/>
+        <a:font script="Knda" typeface="Tunga"/>
+        <a:font script="Guru" typeface="Raavi"/>
+        <a:font script="Cans" typeface="Euphemia"/>
+        <a:font script="Cher" typeface="Plantagenet Cherokee"/>
+        <a:font script="Yiii" typeface="Microsoft Yi Baiti"/>
+        <a:font script="Tibt" typeface="Microsoft Himalaya"/>
+        <a:font script="Thaa" typeface="MV Boli"/>
+        <a:font script="Deva" typeface="Mangal"/>
+        <a:font script="Telu" typeface="Gautami"/>
+        <a:font script="Taml" typeface="Latha"/>
+        <a:font script="Syrc" typeface="Estrangelo Edessa"/>
+        <a:font script="Orya" typeface="Kalinga"/>
+        <a:font script="Mlym" typeface="Kartika"/>
+        <a:font script="Laoo" typeface="DokChampa"/>
+        <a:font script="Sinh" typeface="Iskoola Pota"/>
+        <a:font script="Mong" typeface="Mongolian Baiti"/>
+        <a:font script="Viet" typeface="Times New Roman"/>
+        <a:font script="Uigh" typeface="Microsoft Uighur"/>
+        <a:font script="Geor" typeface="Sylfaen"/>
+      </a:majorFont>
+      <a:minorFont>
+        <a:latin typeface="Arial"/>
+        <a:ea typeface=""/>
+        <a:cs typeface=""/>
+        <a:font script="Jpan" typeface="ＭＳ Ｐゴシック"/>
+        <a:font script="Hang" typeface="맑은 고딕"/>
+        <a:font script="Hans" typeface="宋体"/>
+        <a:font script="Hant" typeface="新細明體"/>
+        <a:font script="Arab" typeface="Arial"/>
+        <a:font script="Hebr" typeface="Arial"/>
+        <a:font script="Thai" typeface="Cordia New"/>
+        <a:font script="Ethi" typeface="Nyala"/>
+        <a:font script="Beng" typeface="Vrinda"/>
+        <a:font script="Gujr" typeface="Shruti"/>
+        <a:font script="Khmr" typeface="DaunPenh"/>
+        <a:font script="Knda" typeface="Tunga"/>
+        <a:font script="Guru" typeface="Raavi"/>
+        <a:font script="Cans" typeface="Euphemia"/>
+        <a:font script="Cher" typeface="Plantagenet Cherokee"/>
+        <a:font script="Yiii" typeface="Microsoft Yi Baiti"/>
+        <a:font script="Tibt" typeface="Microsoft Himalaya"/>
+        <a:font script="Thaa" typeface="MV Boli"/>
+        <a:font script="Deva" typeface="Mangal"/>
+        <a:font script="Telu" typeface="Gautami"/>
+        <a:font script="Taml" typeface="Latha"/>
+        <a:font script="Syrc" typeface="Estrangelo Edessa"/>
+        <a:font script="Orya" typeface="Kalinga"/>
+        <a:font script="Mlym" typeface="Kartika"/>
+        <a:font script="Laoo" typeface="DokChampa"/>
+        <a:font script="Sinh" typeface="Iskoola Pota"/>
+        <a:font script="Mong" typeface="Mongolian Baiti"/>
+        <a:font script="Viet" typeface="Arial"/>
+        <a:font script="Uigh" typeface="Microsoft Uighur"/>
+        <a:font script="Geor" typeface="Sylfaen"/>
+      </a:minorFont>
+    </a:fontScheme>
+    <a:fmtScheme name="Office">
+      <a:fillStyleLst>
+        <a:solidFill>
+          <a:schemeClr val="phClr"/>
+        </a:solidFill>
+        <a:gradFill rotWithShape="1">
+          <a:gsLst>
+            <a:gs pos="0">
+              <a:schemeClr val="phClr">
+                <a:tint val="50000"/>
+                <a:satMod val="300000"/>
+              </a:schemeClr>
+            </a:gs>
+            <a:gs pos="35000">
+              <a:schemeClr val="phClr">
+                <a:tint val="37000"/>
+                <a:satMod val="300000"/>
+              </a:schemeClr>
+            </a:gs>
+            <a:gs pos="100000">
+              <a:schemeClr val="phClr">
+                <a:tint val="15000"/>
+                <a:satMod val="350000"/>
+              </a:schemeClr>
+            </a:gs>
+          </a:gsLst>
+          <a:lin ang="16200000" scaled="1"/>
+        </a:gradFill>
+        <a:gradFill rotWithShape="1">
+          <a:gsLst>
+            <a:gs pos="0">
+              <a:schemeClr val="phClr">
+                <a:tint val="100000"/>
+                <a:shade val="100000"/>
+                <a:satMod val="130000"/>
+              </a:schemeClr>
+            </a:gs>
+            <a:gs pos="100000">
+              <a:schemeClr val="phClr">
+                <a:tint val="50000"/>
+                <a:shade val="100000"/>
+                <a:satMod val="350000"/>
+              </a:schemeClr>
+            </a:gs>
+          </a:gsLst>
+          <a:lin ang="16200000" scaled="0"/>
+        </a:gradFill>
+      </a:fillStyleLst>
+      <a:lnStyleLst>
+        <a:ln w="9525" cap="flat" cmpd="sng" algn="ctr">
+          <a:solidFill>
+            <a:schemeClr val="phClr">
+              <a:shade val="95000"/>
+              <a:satMod val="105000"/>
+            </a:schemeClr>
+          </a:solidFill>
+          <a:prstDash val="solid"/>
+        </a:ln>
+        <a:ln w="25400" cap="flat" cmpd="sng" algn="ctr">
+          <a:solidFill>
+            <a:schemeClr val="phClr"/>
+          </a:solidFill>
+          <a:prstDash val="solid"/>
+        </a:ln>
+        <a:ln w="38100" cap="flat" cmpd="sng" algn="ctr">
+          <a:solidFill>
+            <a:schemeClr val="phClr"/>
+          </a:solidFill>
+          <a:prstDash val="solid"/>
+        </a:ln>
+      </a:lnStyleLst>
+      <a:effectStyleLst>
+        <a:effectStyle>
+          <a:effectLst>
+            <a:outerShdw blurRad="40000" dist="20000" dir="5400000" rotWithShape="0">
+              <a:srgbClr val="000000">
+                <a:alpha val="38000"/>
+              </a:srgbClr>
+            </a:outerShdw>
+          </a:effectLst>
+        </a:effectStyle>
+        <a:effectStyle>
+          <a:effectLst>
+            <a:outerShdw blurRad="40000" dist="23000" dir="5400000" rotWithShape="0">
+              <a:srgbClr val="000000">
+                <a:alpha val="35000"/>
+              </a:srgbClr>
+            </a:outerShdw>
+          </a:effectLst>
+        </a:effectStyle>
+        <a:effectStyle>
+          <a:effectLst>
+            <a:outerShdw blurRad="40000" dist="23000" dir="5400000" rotWithShape="0">
+              <a:srgbClr val="000000">
+                <a:alpha val="35000"/>
+              </a:srgbClr>
+            </a:outerShdw>
+          </a:effectLst>
+          <a:scene3d>
+            <a:camera prst="orthographicFront">
+              <a:rot lat="0" lon="0" rev="0"/>
+            </a:camera>
+            <a:lightRig rig="threePt" dir="t">
+              <a:rot lat="0" lon="0" rev="1200000"/>
+            </a:lightRig>
+          </a:scene3d>
+          <a:sp3d>
+            <a:bevelT w="63500" h="25400"/>
+          </a:sp3d>
+        </a:effectStyle>
+      </a:effectStyleLst>
+      <a:bgFillStyleLst>
+        <a:solidFill>
+          <a:schemeClr val="phClr"/>
+        </a:solidFill>
+        <a:gradFill rotWithShape="1">
+          <a:gsLst>
+            <a:gs pos="0">
+              <a:schemeClr val="phClr">
+                <a:tint val="40000"/>
+                <a:satMod val="350000"/>
+              </a:schemeClr>
+            </a:gs>
+            <a:gs pos="40000">
+              <a:schemeClr val="phClr">
+                <a:tint val="45000"/>
+                <a:shade val="99000"/>
+                <a:satMod val="350000"/>
+              </a:schemeClr>
+            </a:gs>
+            <a:gs pos="100000">
+              <a:schemeClr val="phClr">
+                <a:shade val="20000"/>
+                <a:satMod val="255000"/>
+              </a:schemeClr>
+            </a:gs>
+          </a:gsLst>
+          <a:path path="circle">
+            <a:fillToRect l="50000" t="-80000" r="50000" b="180000"/>
+          </a:path>
+        </a:gradFill>
+        <a:gradFill rotWithShape="1">
+          <a:gsLst>
+            <a:gs pos="0">
+              <a:schemeClr val="phClr">
+                <a:tint val="80000"/>
+                <a:satMod val="300000"/>
+              </a:schemeClr>
+            </a:gs>
+            <a:gs pos="100000">
+              <a:schemeClr val="phClr">
+                <a:shade val="30000"/>
+                <a:satMod val="200000"/>
+              </a:schemeClr>
+            </a:gs>
+          </a:gsLst>
+          <a:path path="circle">
+            <a:fillToRect l="50000" t="50000" r="50000" b="50000"/>
+          </a:path>
+        </a:gradFill>
+      </a:bgFillStyleLst>
+    </a:fmtScheme>
+  </a:themeElements>
+</a:theme>
 </file>
 
-<file path=ppt/theme/theme1.xml><?xml version="1.0" encoding="utf-8"?>
+<file path=ppt/theme/theme2.xml><?xml version="1.0" encoding="utf-8"?>
 <a:theme xmlns:a="http://schemas.openxmlformats.org/drawingml/2006/main" xmlns:r="http://schemas.openxmlformats.org/officeDocument/2006/relationships">
   <a:themeElements>
     <a:clrScheme name="Default">
@@ -10306,283 +11323,4 @@
     </a:fmtScheme>
   </a:themeElements>
 </a:theme>
-</file>
-
-<file path=ppt/theme/theme2.xml><?xml version="1.0" encoding="utf-8"?>
-<a:theme xmlns:a="http://schemas.openxmlformats.org/drawingml/2006/main" xmlns:r="http://schemas.openxmlformats.org/officeDocument/2006/relationships" name="Pop">
-  <a:themeElements>
-    <a:clrScheme name="Pop">
-      <a:dk1>
-        <a:srgbClr val="F8E71C"/>
-      </a:dk1>
-      <a:lt1>
-        <a:srgbClr val="FFFFFF"/>
-      </a:lt1>
-      <a:dk2>
-        <a:srgbClr val="000000"/>
-      </a:dk2>
-      <a:lt2>
-        <a:srgbClr val="D9D9D9"/>
-      </a:lt2>
-      <a:accent1>
-        <a:srgbClr val="666666"/>
-      </a:accent1>
-      <a:accent2>
-        <a:srgbClr val="483165"/>
-      </a:accent2>
-      <a:accent3>
-        <a:srgbClr val="EB1E95"/>
-      </a:accent3>
-      <a:accent4>
-        <a:srgbClr val="01AFD1"/>
-      </a:accent4>
-      <a:accent5>
-        <a:srgbClr val="0F9D58"/>
-      </a:accent5>
-      <a:accent6>
-        <a:srgbClr val="9C27B0"/>
-      </a:accent6>
-      <a:hlink>
-        <a:srgbClr val="0F9D58"/>
-      </a:hlink>
-      <a:folHlink>
-        <a:srgbClr val="0F9D58"/>
-      </a:folHlink>
-    </a:clrScheme>
-    <a:fontScheme name="Office">
-      <a:majorFont>
-        <a:latin typeface="Arial"/>
-        <a:ea typeface=""/>
-        <a:cs typeface=""/>
-        <a:font script="Jpan" typeface="ＭＳ Ｐゴシック"/>
-        <a:font script="Hang" typeface="맑은 고딕"/>
-        <a:font script="Hans" typeface="宋体"/>
-        <a:font script="Hant" typeface="新細明體"/>
-        <a:font script="Arab" typeface="Times New Roman"/>
-        <a:font script="Hebr" typeface="Times New Roman"/>
-        <a:font script="Thai" typeface="Angsana New"/>
-        <a:font script="Ethi" typeface="Nyala"/>
-        <a:font script="Beng" typeface="Vrinda"/>
-        <a:font script="Gujr" typeface="Shruti"/>
-        <a:font script="Khmr" typeface="MoolBoran"/>
-        <a:font script="Knda" typeface="Tunga"/>
-        <a:font script="Guru" typeface="Raavi"/>
-        <a:font script="Cans" typeface="Euphemia"/>
-        <a:font script="Cher" typeface="Plantagenet Cherokee"/>
-        <a:font script="Yiii" typeface="Microsoft Yi Baiti"/>
-        <a:font script="Tibt" typeface="Microsoft Himalaya"/>
-        <a:font script="Thaa" typeface="MV Boli"/>
-        <a:font script="Deva" typeface="Mangal"/>
-        <a:font script="Telu" typeface="Gautami"/>
-        <a:font script="Taml" typeface="Latha"/>
-        <a:font script="Syrc" typeface="Estrangelo Edessa"/>
-        <a:font script="Orya" typeface="Kalinga"/>
-        <a:font script="Mlym" typeface="Kartika"/>
-        <a:font script="Laoo" typeface="DokChampa"/>
-        <a:font script="Sinh" typeface="Iskoola Pota"/>
-        <a:font script="Mong" typeface="Mongolian Baiti"/>
-        <a:font script="Viet" typeface="Times New Roman"/>
-        <a:font script="Uigh" typeface="Microsoft Uighur"/>
-        <a:font script="Geor" typeface="Sylfaen"/>
-      </a:majorFont>
-      <a:minorFont>
-        <a:latin typeface="Arial"/>
-        <a:ea typeface=""/>
-        <a:cs typeface=""/>
-        <a:font script="Jpan" typeface="ＭＳ Ｐゴシック"/>
-        <a:font script="Hang" typeface="맑은 고딕"/>
-        <a:font script="Hans" typeface="宋体"/>
-        <a:font script="Hant" typeface="新細明體"/>
-        <a:font script="Arab" typeface="Arial"/>
-        <a:font script="Hebr" typeface="Arial"/>
-        <a:font script="Thai" typeface="Cordia New"/>
-        <a:font script="Ethi" typeface="Nyala"/>
-        <a:font script="Beng" typeface="Vrinda"/>
-        <a:font script="Gujr" typeface="Shruti"/>
-        <a:font script="Khmr" typeface="DaunPenh"/>
-        <a:font script="Knda" typeface="Tunga"/>
-        <a:font script="Guru" typeface="Raavi"/>
-        <a:font script="Cans" typeface="Euphemia"/>
-        <a:font script="Cher" typeface="Plantagenet Cherokee"/>
-        <a:font script="Yiii" typeface="Microsoft Yi Baiti"/>
-        <a:font script="Tibt" typeface="Microsoft Himalaya"/>
-        <a:font script="Thaa" typeface="MV Boli"/>
-        <a:font script="Deva" typeface="Mangal"/>
-        <a:font script="Telu" typeface="Gautami"/>
-        <a:font script="Taml" typeface="Latha"/>
-        <a:font script="Syrc" typeface="Estrangelo Edessa"/>
-        <a:font script="Orya" typeface="Kalinga"/>
-        <a:font script="Mlym" typeface="Kartika"/>
-        <a:font script="Laoo" typeface="DokChampa"/>
-        <a:font script="Sinh" typeface="Iskoola Pota"/>
-        <a:font script="Mong" typeface="Mongolian Baiti"/>
-        <a:font script="Viet" typeface="Arial"/>
-        <a:font script="Uigh" typeface="Microsoft Uighur"/>
-        <a:font script="Geor" typeface="Sylfaen"/>
-      </a:minorFont>
-    </a:fontScheme>
-    <a:fmtScheme name="Office">
-      <a:fillStyleLst>
-        <a:solidFill>
-          <a:schemeClr val="phClr"/>
-        </a:solidFill>
-        <a:gradFill rotWithShape="1">
-          <a:gsLst>
-            <a:gs pos="0">
-              <a:schemeClr val="phClr">
-                <a:tint val="50000"/>
-                <a:satMod val="300000"/>
-              </a:schemeClr>
-            </a:gs>
-            <a:gs pos="35000">
-              <a:schemeClr val="phClr">
-                <a:tint val="37000"/>
-                <a:satMod val="300000"/>
-              </a:schemeClr>
-            </a:gs>
-            <a:gs pos="100000">
-              <a:schemeClr val="phClr">
-                <a:tint val="15000"/>
-                <a:satMod val="350000"/>
-              </a:schemeClr>
-            </a:gs>
-          </a:gsLst>
-          <a:lin ang="16200000" scaled="1"/>
-        </a:gradFill>
-        <a:gradFill rotWithShape="1">
-          <a:gsLst>
-            <a:gs pos="0">
-              <a:schemeClr val="phClr">
-                <a:tint val="100000"/>
-                <a:shade val="100000"/>
-                <a:satMod val="130000"/>
-              </a:schemeClr>
-            </a:gs>
-            <a:gs pos="100000">
-              <a:schemeClr val="phClr">
-                <a:tint val="50000"/>
-                <a:shade val="100000"/>
-                <a:satMod val="350000"/>
-              </a:schemeClr>
-            </a:gs>
-          </a:gsLst>
-          <a:lin ang="16200000" scaled="0"/>
-        </a:gradFill>
-      </a:fillStyleLst>
-      <a:lnStyleLst>
-        <a:ln w="9525" cap="flat" cmpd="sng" algn="ctr">
-          <a:solidFill>
-            <a:schemeClr val="phClr">
-              <a:shade val="95000"/>
-              <a:satMod val="105000"/>
-            </a:schemeClr>
-          </a:solidFill>
-          <a:prstDash val="solid"/>
-        </a:ln>
-        <a:ln w="25400" cap="flat" cmpd="sng" algn="ctr">
-          <a:solidFill>
-            <a:schemeClr val="phClr"/>
-          </a:solidFill>
-          <a:prstDash val="solid"/>
-        </a:ln>
-        <a:ln w="38100" cap="flat" cmpd="sng" algn="ctr">
-          <a:solidFill>
-            <a:schemeClr val="phClr"/>
-          </a:solidFill>
-          <a:prstDash val="solid"/>
-        </a:ln>
-      </a:lnStyleLst>
-      <a:effectStyleLst>
-        <a:effectStyle>
-          <a:effectLst>
-            <a:outerShdw blurRad="40000" dist="20000" dir="5400000" rotWithShape="0">
-              <a:srgbClr val="000000">
-                <a:alpha val="38000"/>
-              </a:srgbClr>
-            </a:outerShdw>
-          </a:effectLst>
-        </a:effectStyle>
-        <a:effectStyle>
-          <a:effectLst>
-            <a:outerShdw blurRad="40000" dist="23000" dir="5400000" rotWithShape="0">
-              <a:srgbClr val="000000">
-                <a:alpha val="35000"/>
-              </a:srgbClr>
-            </a:outerShdw>
-          </a:effectLst>
-        </a:effectStyle>
-        <a:effectStyle>
-          <a:effectLst>
-            <a:outerShdw blurRad="40000" dist="23000" dir="5400000" rotWithShape="0">
-              <a:srgbClr val="000000">
-                <a:alpha val="35000"/>
-              </a:srgbClr>
-            </a:outerShdw>
-          </a:effectLst>
-          <a:scene3d>
-            <a:camera prst="orthographicFront">
-              <a:rot lat="0" lon="0" rev="0"/>
-            </a:camera>
-            <a:lightRig rig="threePt" dir="t">
-              <a:rot lat="0" lon="0" rev="1200000"/>
-            </a:lightRig>
-          </a:scene3d>
-          <a:sp3d>
-            <a:bevelT w="63500" h="25400"/>
-          </a:sp3d>
-        </a:effectStyle>
-      </a:effectStyleLst>
-      <a:bgFillStyleLst>
-        <a:solidFill>
-          <a:schemeClr val="phClr"/>
-        </a:solidFill>
-        <a:gradFill rotWithShape="1">
-          <a:gsLst>
-            <a:gs pos="0">
-              <a:schemeClr val="phClr">
-                <a:tint val="40000"/>
-                <a:satMod val="350000"/>
-              </a:schemeClr>
-            </a:gs>
-            <a:gs pos="40000">
-              <a:schemeClr val="phClr">
-                <a:tint val="45000"/>
-                <a:shade val="99000"/>
-                <a:satMod val="350000"/>
-              </a:schemeClr>
-            </a:gs>
-            <a:gs pos="100000">
-              <a:schemeClr val="phClr">
-                <a:shade val="20000"/>
-                <a:satMod val="255000"/>
-              </a:schemeClr>
-            </a:gs>
-          </a:gsLst>
-          <a:path path="circle">
-            <a:fillToRect l="50000" t="-80000" r="50000" b="180000"/>
-          </a:path>
-        </a:gradFill>
-        <a:gradFill rotWithShape="1">
-          <a:gsLst>
-            <a:gs pos="0">
-              <a:schemeClr val="phClr">
-                <a:tint val="80000"/>
-                <a:satMod val="300000"/>
-              </a:schemeClr>
-            </a:gs>
-            <a:gs pos="100000">
-              <a:schemeClr val="phClr">
-                <a:shade val="30000"/>
-                <a:satMod val="200000"/>
-              </a:schemeClr>
-            </a:gs>
-          </a:gsLst>
-          <a:path path="circle">
-            <a:fillToRect l="50000" t="50000" r="50000" b="50000"/>
-          </a:path>
-        </a:gradFill>
-      </a:bgFillStyleLst>
-    </a:fmtScheme>
-  </a:themeElements>
-</a:theme>
 </file>
</xml_diff>